<commit_message>
Falta diapositiva de timer
</commit_message>
<xml_diff>
--- a/Control de Acceso.pptx
+++ b/Control de Acceso.pptx
@@ -10,13 +10,15 @@
     <p:sldId id="257" r:id="rId4"/>
     <p:sldId id="262" r:id="rId5"/>
     <p:sldId id="259" r:id="rId6"/>
-    <p:sldId id="260" r:id="rId7"/>
-    <p:sldId id="261" r:id="rId8"/>
-    <p:sldId id="263" r:id="rId9"/>
-    <p:sldId id="264" r:id="rId10"/>
-    <p:sldId id="265" r:id="rId11"/>
-    <p:sldId id="267" r:id="rId12"/>
-    <p:sldId id="266" r:id="rId13"/>
+    <p:sldId id="268" r:id="rId7"/>
+    <p:sldId id="269" r:id="rId8"/>
+    <p:sldId id="260" r:id="rId9"/>
+    <p:sldId id="261" r:id="rId10"/>
+    <p:sldId id="263" r:id="rId11"/>
+    <p:sldId id="264" r:id="rId12"/>
+    <p:sldId id="265" r:id="rId13"/>
+    <p:sldId id="267" r:id="rId14"/>
+    <p:sldId id="266" r:id="rId15"/>
   </p:sldIdLst>
   <p:sldSz cx="12192000" cy="6858000"/>
   <p:notesSz cx="6858000" cy="9144000"/>
@@ -115,6 +117,11 @@
       </a:defRPr>
     </a:lvl9pPr>
   </p:defaultTextStyle>
+  <p:extLst>
+    <p:ext uri="{EFAFB233-063F-42B5-8137-9DF3F51BA10A}">
+      <p15:sldGuideLst xmlns:p15="http://schemas.microsoft.com/office/powerpoint/2012/main"/>
+    </p:ext>
+  </p:extLst>
 </p:presentation>
 </file>
 
@@ -1704,6 +1711,13 @@
         </dgm:presLayoutVars>
       </dgm:prSet>
       <dgm:spPr/>
+      <dgm:t>
+        <a:bodyPr/>
+        <a:lstStyle/>
+        <a:p>
+          <a:endParaRPr lang="es-ES"/>
+        </a:p>
+      </dgm:t>
     </dgm:pt>
     <dgm:pt modelId="{7FBC73CD-6899-48F0-97D2-0FAF099D00D7}" type="pres">
       <dgm:prSet presAssocID="{1C5F8750-0E8D-4A4F-A5C4-6A02757B2CEE}" presName="hierFlow" presStyleCnt="0"/>
@@ -1730,6 +1744,13 @@
         </dgm:presLayoutVars>
       </dgm:prSet>
       <dgm:spPr/>
+      <dgm:t>
+        <a:bodyPr/>
+        <a:lstStyle/>
+        <a:p>
+          <a:endParaRPr lang="es-ES"/>
+        </a:p>
+      </dgm:t>
     </dgm:pt>
     <dgm:pt modelId="{DCCD5EFE-7876-4BE0-8B52-0B8CAA5B5D98}" type="pres">
       <dgm:prSet presAssocID="{9A3D543D-1E9A-4BE5-BFBC-B65722739982}" presName="hierChild2" presStyleCnt="0"/>
@@ -1738,6 +1759,13 @@
     <dgm:pt modelId="{41AB122B-081A-4865-AD38-E3670CB221C3}" type="pres">
       <dgm:prSet presAssocID="{675114A4-4D40-4091-9275-9C8175883DB4}" presName="Name19" presStyleLbl="parChTrans1D2" presStyleIdx="0" presStyleCnt="4"/>
       <dgm:spPr/>
+      <dgm:t>
+        <a:bodyPr/>
+        <a:lstStyle/>
+        <a:p>
+          <a:endParaRPr lang="es-ES"/>
+        </a:p>
+      </dgm:t>
     </dgm:pt>
     <dgm:pt modelId="{CF8D64B8-D61F-466F-8ABA-43D7D9B04C06}" type="pres">
       <dgm:prSet presAssocID="{35DCDA67-F2A2-441C-AE5D-C1B198AC0662}" presName="Name21" presStyleCnt="0"/>
@@ -1746,6 +1774,13 @@
     <dgm:pt modelId="{0ECD015A-E51F-4E92-93F8-42CA82FE8288}" type="pres">
       <dgm:prSet presAssocID="{35DCDA67-F2A2-441C-AE5D-C1B198AC0662}" presName="level2Shape" presStyleLbl="node2" presStyleIdx="0" presStyleCnt="4"/>
       <dgm:spPr/>
+      <dgm:t>
+        <a:bodyPr/>
+        <a:lstStyle/>
+        <a:p>
+          <a:endParaRPr lang="es-ES"/>
+        </a:p>
+      </dgm:t>
     </dgm:pt>
     <dgm:pt modelId="{26362DDC-DD1A-4BB8-AE23-6E6A6745B19C}" type="pres">
       <dgm:prSet presAssocID="{35DCDA67-F2A2-441C-AE5D-C1B198AC0662}" presName="hierChild3" presStyleCnt="0"/>
@@ -1754,6 +1789,13 @@
     <dgm:pt modelId="{53593E82-FE48-4799-B3D5-9BF8476C7795}" type="pres">
       <dgm:prSet presAssocID="{FC0286EA-4B69-4B09-B5C5-A002ECF296A6}" presName="Name19" presStyleLbl="parChTrans1D3" presStyleIdx="0" presStyleCnt="8"/>
       <dgm:spPr/>
+      <dgm:t>
+        <a:bodyPr/>
+        <a:lstStyle/>
+        <a:p>
+          <a:endParaRPr lang="es-ES"/>
+        </a:p>
+      </dgm:t>
     </dgm:pt>
     <dgm:pt modelId="{C941A05A-5682-4F10-9964-D12E822952DE}" type="pres">
       <dgm:prSet presAssocID="{63E0C32F-5CB1-4C0B-BFC5-95C3688A5952}" presName="Name21" presStyleCnt="0"/>
@@ -1762,6 +1804,13 @@
     <dgm:pt modelId="{9ADE6EBB-D0A9-4302-BC75-1FB70BC17255}" type="pres">
       <dgm:prSet presAssocID="{63E0C32F-5CB1-4C0B-BFC5-95C3688A5952}" presName="level2Shape" presStyleLbl="node3" presStyleIdx="0" presStyleCnt="8"/>
       <dgm:spPr/>
+      <dgm:t>
+        <a:bodyPr/>
+        <a:lstStyle/>
+        <a:p>
+          <a:endParaRPr lang="es-ES"/>
+        </a:p>
+      </dgm:t>
     </dgm:pt>
     <dgm:pt modelId="{65679440-020D-4210-B943-BEE04BE83EB1}" type="pres">
       <dgm:prSet presAssocID="{63E0C32F-5CB1-4C0B-BFC5-95C3688A5952}" presName="hierChild3" presStyleCnt="0"/>
@@ -1770,6 +1819,13 @@
     <dgm:pt modelId="{2B44D44D-9C15-4BE4-8857-6902DD216E02}" type="pres">
       <dgm:prSet presAssocID="{AEF768B3-89BD-4493-B753-D5C7E3F86037}" presName="Name19" presStyleLbl="parChTrans1D4" presStyleIdx="0" presStyleCnt="5"/>
       <dgm:spPr/>
+      <dgm:t>
+        <a:bodyPr/>
+        <a:lstStyle/>
+        <a:p>
+          <a:endParaRPr lang="es-ES"/>
+        </a:p>
+      </dgm:t>
     </dgm:pt>
     <dgm:pt modelId="{52E0AE4D-5240-4116-8871-F00A2F071C25}" type="pres">
       <dgm:prSet presAssocID="{E116835A-3D10-450B-9413-E1B97894FFA3}" presName="Name21" presStyleCnt="0"/>
@@ -1778,6 +1834,13 @@
     <dgm:pt modelId="{03CEC701-59F7-4F6F-A2FB-6D1193C6C0E9}" type="pres">
       <dgm:prSet presAssocID="{E116835A-3D10-450B-9413-E1B97894FFA3}" presName="level2Shape" presStyleLbl="node4" presStyleIdx="0" presStyleCnt="5"/>
       <dgm:spPr/>
+      <dgm:t>
+        <a:bodyPr/>
+        <a:lstStyle/>
+        <a:p>
+          <a:endParaRPr lang="es-ES"/>
+        </a:p>
+      </dgm:t>
     </dgm:pt>
     <dgm:pt modelId="{70C641D7-008F-491D-A8A1-389516750A5F}" type="pres">
       <dgm:prSet presAssocID="{E116835A-3D10-450B-9413-E1B97894FFA3}" presName="hierChild3" presStyleCnt="0"/>
@@ -1786,6 +1849,13 @@
     <dgm:pt modelId="{6D500FE4-6E88-4115-B204-2A401C1E43A0}" type="pres">
       <dgm:prSet presAssocID="{5A2D30D4-EEF4-4274-A404-AB129065637F}" presName="Name19" presStyleLbl="parChTrans1D2" presStyleIdx="1" presStyleCnt="4"/>
       <dgm:spPr/>
+      <dgm:t>
+        <a:bodyPr/>
+        <a:lstStyle/>
+        <a:p>
+          <a:endParaRPr lang="es-ES"/>
+        </a:p>
+      </dgm:t>
     </dgm:pt>
     <dgm:pt modelId="{68735FE1-5986-4989-BCFA-E7980B972273}" type="pres">
       <dgm:prSet presAssocID="{5A9D0339-AA51-434F-8B6C-60F99E3633CF}" presName="Name21" presStyleCnt="0"/>
@@ -1794,6 +1864,13 @@
     <dgm:pt modelId="{1EE97BA3-462E-4247-9C64-D91A323268AC}" type="pres">
       <dgm:prSet presAssocID="{5A9D0339-AA51-434F-8B6C-60F99E3633CF}" presName="level2Shape" presStyleLbl="node2" presStyleIdx="1" presStyleCnt="4"/>
       <dgm:spPr/>
+      <dgm:t>
+        <a:bodyPr/>
+        <a:lstStyle/>
+        <a:p>
+          <a:endParaRPr lang="es-ES"/>
+        </a:p>
+      </dgm:t>
     </dgm:pt>
     <dgm:pt modelId="{F5F29C6D-26F6-440B-88FF-DE5D242CB299}" type="pres">
       <dgm:prSet presAssocID="{5A9D0339-AA51-434F-8B6C-60F99E3633CF}" presName="hierChild3" presStyleCnt="0"/>
@@ -1802,6 +1879,13 @@
     <dgm:pt modelId="{6DFBC8DC-FB04-4552-ACB4-2C723637561B}" type="pres">
       <dgm:prSet presAssocID="{14CBFDCC-3ECF-4077-AAFC-9035D3532054}" presName="Name19" presStyleLbl="parChTrans1D3" presStyleIdx="1" presStyleCnt="8"/>
       <dgm:spPr/>
+      <dgm:t>
+        <a:bodyPr/>
+        <a:lstStyle/>
+        <a:p>
+          <a:endParaRPr lang="es-ES"/>
+        </a:p>
+      </dgm:t>
     </dgm:pt>
     <dgm:pt modelId="{01B1FE0B-F591-4A2D-B9D9-4DFCE938EC84}" type="pres">
       <dgm:prSet presAssocID="{5CA15CE3-8396-42E1-8E7E-BD11A58851E2}" presName="Name21" presStyleCnt="0"/>
@@ -1810,6 +1894,13 @@
     <dgm:pt modelId="{7C0EA656-1D18-4980-86E2-83309EF67A1B}" type="pres">
       <dgm:prSet presAssocID="{5CA15CE3-8396-42E1-8E7E-BD11A58851E2}" presName="level2Shape" presStyleLbl="node3" presStyleIdx="1" presStyleCnt="8"/>
       <dgm:spPr/>
+      <dgm:t>
+        <a:bodyPr/>
+        <a:lstStyle/>
+        <a:p>
+          <a:endParaRPr lang="es-ES"/>
+        </a:p>
+      </dgm:t>
     </dgm:pt>
     <dgm:pt modelId="{7EF65181-3316-4D40-8098-EFE2CDDA0653}" type="pres">
       <dgm:prSet presAssocID="{5CA15CE3-8396-42E1-8E7E-BD11A58851E2}" presName="hierChild3" presStyleCnt="0"/>
@@ -1818,6 +1909,13 @@
     <dgm:pt modelId="{190E5C43-FF52-41EF-BC65-4C3846DF4B2F}" type="pres">
       <dgm:prSet presAssocID="{27B0B7D4-9290-4FFB-8E4F-E55C7EC9F8B5}" presName="Name19" presStyleLbl="parChTrans1D4" presStyleIdx="1" presStyleCnt="5"/>
       <dgm:spPr/>
+      <dgm:t>
+        <a:bodyPr/>
+        <a:lstStyle/>
+        <a:p>
+          <a:endParaRPr lang="es-ES"/>
+        </a:p>
+      </dgm:t>
     </dgm:pt>
     <dgm:pt modelId="{37FB32C3-A5F1-4812-A1A1-DE1AA871D2FD}" type="pres">
       <dgm:prSet presAssocID="{F66CC7BD-674A-437D-8C62-29898B13049D}" presName="Name21" presStyleCnt="0"/>
@@ -1826,6 +1924,13 @@
     <dgm:pt modelId="{403A2617-6E68-42B4-BEB9-915729DD91B2}" type="pres">
       <dgm:prSet presAssocID="{F66CC7BD-674A-437D-8C62-29898B13049D}" presName="level2Shape" presStyleLbl="node4" presStyleIdx="1" presStyleCnt="5"/>
       <dgm:spPr/>
+      <dgm:t>
+        <a:bodyPr/>
+        <a:lstStyle/>
+        <a:p>
+          <a:endParaRPr lang="es-ES"/>
+        </a:p>
+      </dgm:t>
     </dgm:pt>
     <dgm:pt modelId="{E6CA9CB2-9465-4706-AB82-6534488FC1B5}" type="pres">
       <dgm:prSet presAssocID="{F66CC7BD-674A-437D-8C62-29898B13049D}" presName="hierChild3" presStyleCnt="0"/>
@@ -1834,6 +1939,13 @@
     <dgm:pt modelId="{86087C67-4375-477E-84D1-836C1F14C793}" type="pres">
       <dgm:prSet presAssocID="{441A3D14-7823-4933-A226-6CEE16869DD4}" presName="Name19" presStyleLbl="parChTrans1D3" presStyleIdx="2" presStyleCnt="8"/>
       <dgm:spPr/>
+      <dgm:t>
+        <a:bodyPr/>
+        <a:lstStyle/>
+        <a:p>
+          <a:endParaRPr lang="es-ES"/>
+        </a:p>
+      </dgm:t>
     </dgm:pt>
     <dgm:pt modelId="{85B79B7E-F00E-48C7-AF60-37DCF3CD811A}" type="pres">
       <dgm:prSet presAssocID="{540823D0-D4AA-438F-B805-D3CA6D4539F8}" presName="Name21" presStyleCnt="0"/>
@@ -1842,6 +1954,13 @@
     <dgm:pt modelId="{A445E83A-B1D7-4754-AB40-1BD356E2B23A}" type="pres">
       <dgm:prSet presAssocID="{540823D0-D4AA-438F-B805-D3CA6D4539F8}" presName="level2Shape" presStyleLbl="node3" presStyleIdx="2" presStyleCnt="8" custLinFactNeighborY="10785"/>
       <dgm:spPr/>
+      <dgm:t>
+        <a:bodyPr/>
+        <a:lstStyle/>
+        <a:p>
+          <a:endParaRPr lang="es-ES"/>
+        </a:p>
+      </dgm:t>
     </dgm:pt>
     <dgm:pt modelId="{B24DE3F9-9CB7-4F27-BB97-71205C9A2479}" type="pres">
       <dgm:prSet presAssocID="{540823D0-D4AA-438F-B805-D3CA6D4539F8}" presName="hierChild3" presStyleCnt="0"/>
@@ -1850,6 +1969,13 @@
     <dgm:pt modelId="{F7EDE524-7426-42F9-9EA5-E64F8887CFAA}" type="pres">
       <dgm:prSet presAssocID="{C7818523-DD8A-4226-93BE-3030326F44BF}" presName="Name19" presStyleLbl="parChTrans1D2" presStyleIdx="2" presStyleCnt="4"/>
       <dgm:spPr/>
+      <dgm:t>
+        <a:bodyPr/>
+        <a:lstStyle/>
+        <a:p>
+          <a:endParaRPr lang="es-ES"/>
+        </a:p>
+      </dgm:t>
     </dgm:pt>
     <dgm:pt modelId="{5DA55476-FD85-4BDC-BCF0-DB2BB19B160F}" type="pres">
       <dgm:prSet presAssocID="{66EE189E-5075-46F1-AF74-59651897F29C}" presName="Name21" presStyleCnt="0"/>
@@ -1858,6 +1984,13 @@
     <dgm:pt modelId="{532A0C2D-ACD5-4BE7-B893-91B3018C35E8}" type="pres">
       <dgm:prSet presAssocID="{66EE189E-5075-46F1-AF74-59651897F29C}" presName="level2Shape" presStyleLbl="node2" presStyleIdx="2" presStyleCnt="4"/>
       <dgm:spPr/>
+      <dgm:t>
+        <a:bodyPr/>
+        <a:lstStyle/>
+        <a:p>
+          <a:endParaRPr lang="es-ES"/>
+        </a:p>
+      </dgm:t>
     </dgm:pt>
     <dgm:pt modelId="{C2545C84-F611-4AA0-BF48-AF255CC892C6}" type="pres">
       <dgm:prSet presAssocID="{66EE189E-5075-46F1-AF74-59651897F29C}" presName="hierChild3" presStyleCnt="0"/>
@@ -1866,6 +1999,13 @@
     <dgm:pt modelId="{7D9DF814-EB3C-4A52-B166-0E4DD46DE296}" type="pres">
       <dgm:prSet presAssocID="{A1E0D595-9930-49C1-A7D6-ABF215D5DF74}" presName="Name19" presStyleLbl="parChTrans1D3" presStyleIdx="3" presStyleCnt="8"/>
       <dgm:spPr/>
+      <dgm:t>
+        <a:bodyPr/>
+        <a:lstStyle/>
+        <a:p>
+          <a:endParaRPr lang="es-ES"/>
+        </a:p>
+      </dgm:t>
     </dgm:pt>
     <dgm:pt modelId="{2CEE8531-70A8-468C-BBF2-59E50CD56C67}" type="pres">
       <dgm:prSet presAssocID="{C194289A-C687-45FE-8049-89294C7C2B30}" presName="Name21" presStyleCnt="0"/>
@@ -1874,6 +2014,13 @@
     <dgm:pt modelId="{7ECB5281-3BE3-458D-9668-FC45289E3411}" type="pres">
       <dgm:prSet presAssocID="{C194289A-C687-45FE-8049-89294C7C2B30}" presName="level2Shape" presStyleLbl="node3" presStyleIdx="3" presStyleCnt="8" custScaleX="4325"/>
       <dgm:spPr/>
+      <dgm:t>
+        <a:bodyPr/>
+        <a:lstStyle/>
+        <a:p>
+          <a:endParaRPr lang="es-ES"/>
+        </a:p>
+      </dgm:t>
     </dgm:pt>
     <dgm:pt modelId="{41C358C0-DB22-445C-99B0-377F9DD83D02}" type="pres">
       <dgm:prSet presAssocID="{C194289A-C687-45FE-8049-89294C7C2B30}" presName="hierChild3" presStyleCnt="0"/>
@@ -1882,6 +2029,13 @@
     <dgm:pt modelId="{6693D620-D3B4-43A1-8165-358A23FCEFAD}" type="pres">
       <dgm:prSet presAssocID="{3B12340C-4A3C-4DC8-BCCA-8F5CFA7F81A0}" presName="Name19" presStyleLbl="parChTrans1D4" presStyleIdx="2" presStyleCnt="5"/>
       <dgm:spPr/>
+      <dgm:t>
+        <a:bodyPr/>
+        <a:lstStyle/>
+        <a:p>
+          <a:endParaRPr lang="es-ES"/>
+        </a:p>
+      </dgm:t>
     </dgm:pt>
     <dgm:pt modelId="{08142567-EB1E-46C4-9246-CEF821B3E862}" type="pres">
       <dgm:prSet presAssocID="{20A85F18-8AB9-4E57-B52A-9BF4B306A9C3}" presName="Name21" presStyleCnt="0"/>
@@ -1890,6 +2044,13 @@
     <dgm:pt modelId="{21465F75-534B-4A28-8D74-771BE4C5037B}" type="pres">
       <dgm:prSet presAssocID="{20A85F18-8AB9-4E57-B52A-9BF4B306A9C3}" presName="level2Shape" presStyleLbl="node4" presStyleIdx="2" presStyleCnt="5"/>
       <dgm:spPr/>
+      <dgm:t>
+        <a:bodyPr/>
+        <a:lstStyle/>
+        <a:p>
+          <a:endParaRPr lang="es-ES"/>
+        </a:p>
+      </dgm:t>
     </dgm:pt>
     <dgm:pt modelId="{C3BA241D-0E4D-4333-A147-0E28C11C25A8}" type="pres">
       <dgm:prSet presAssocID="{20A85F18-8AB9-4E57-B52A-9BF4B306A9C3}" presName="hierChild3" presStyleCnt="0"/>
@@ -1898,6 +2059,13 @@
     <dgm:pt modelId="{E6E5601B-39F7-4D6D-B067-78B9A4C88F76}" type="pres">
       <dgm:prSet presAssocID="{77CADEB3-FE54-482D-8679-4F469A4B4A67}" presName="Name19" presStyleLbl="parChTrans1D3" presStyleIdx="4" presStyleCnt="8"/>
       <dgm:spPr/>
+      <dgm:t>
+        <a:bodyPr/>
+        <a:lstStyle/>
+        <a:p>
+          <a:endParaRPr lang="es-ES"/>
+        </a:p>
+      </dgm:t>
     </dgm:pt>
     <dgm:pt modelId="{B04A295C-90DF-4BF7-B61D-05ED6E05E355}" type="pres">
       <dgm:prSet presAssocID="{FA12C214-3A8B-4C17-8251-A885B4B6E072}" presName="Name21" presStyleCnt="0"/>
@@ -1906,6 +2074,13 @@
     <dgm:pt modelId="{E9154DCD-71BE-4D6B-9077-16D4BC71B579}" type="pres">
       <dgm:prSet presAssocID="{FA12C214-3A8B-4C17-8251-A885B4B6E072}" presName="level2Shape" presStyleLbl="node3" presStyleIdx="4" presStyleCnt="8"/>
       <dgm:spPr/>
+      <dgm:t>
+        <a:bodyPr/>
+        <a:lstStyle/>
+        <a:p>
+          <a:endParaRPr lang="es-ES"/>
+        </a:p>
+      </dgm:t>
     </dgm:pt>
     <dgm:pt modelId="{4A5187CE-49B5-4E30-A7E4-92E6662A3F4C}" type="pres">
       <dgm:prSet presAssocID="{FA12C214-3A8B-4C17-8251-A885B4B6E072}" presName="hierChild3" presStyleCnt="0"/>
@@ -1914,6 +2089,13 @@
     <dgm:pt modelId="{7F15DC38-3E35-4ED9-83CB-208CB23EA7A4}" type="pres">
       <dgm:prSet presAssocID="{A72855AD-81B2-4E1F-8F76-C9BFC49D9668}" presName="Name19" presStyleLbl="parChTrans1D3" presStyleIdx="5" presStyleCnt="8"/>
       <dgm:spPr/>
+      <dgm:t>
+        <a:bodyPr/>
+        <a:lstStyle/>
+        <a:p>
+          <a:endParaRPr lang="es-ES"/>
+        </a:p>
+      </dgm:t>
     </dgm:pt>
     <dgm:pt modelId="{C65D37BC-8B02-49EF-9F13-487314C878DF}" type="pres">
       <dgm:prSet presAssocID="{0BFEC22B-8AB5-4E37-B44F-16371DB8A2C2}" presName="Name21" presStyleCnt="0"/>
@@ -1922,6 +2104,13 @@
     <dgm:pt modelId="{F7AD1C98-5033-4CC0-A62F-4F6538B25AE3}" type="pres">
       <dgm:prSet presAssocID="{0BFEC22B-8AB5-4E37-B44F-16371DB8A2C2}" presName="level2Shape" presStyleLbl="node3" presStyleIdx="5" presStyleCnt="8"/>
       <dgm:spPr/>
+      <dgm:t>
+        <a:bodyPr/>
+        <a:lstStyle/>
+        <a:p>
+          <a:endParaRPr lang="es-ES"/>
+        </a:p>
+      </dgm:t>
     </dgm:pt>
     <dgm:pt modelId="{BB0EFE43-F219-4D1A-861D-FBDCD7B654F0}" type="pres">
       <dgm:prSet presAssocID="{0BFEC22B-8AB5-4E37-B44F-16371DB8A2C2}" presName="hierChild3" presStyleCnt="0"/>
@@ -1930,6 +2119,13 @@
     <dgm:pt modelId="{5B1BDFAD-02C6-44F1-B889-E8B7F6D74DD3}" type="pres">
       <dgm:prSet presAssocID="{17037C34-3FCA-415A-87E6-9101440E5570}" presName="Name19" presStyleLbl="parChTrans1D2" presStyleIdx="3" presStyleCnt="4"/>
       <dgm:spPr/>
+      <dgm:t>
+        <a:bodyPr/>
+        <a:lstStyle/>
+        <a:p>
+          <a:endParaRPr lang="es-ES"/>
+        </a:p>
+      </dgm:t>
     </dgm:pt>
     <dgm:pt modelId="{01B6D1A8-8C94-444F-9E80-984192C4CBB3}" type="pres">
       <dgm:prSet presAssocID="{6F1D5CA6-5F34-4F88-BF44-BEF250924727}" presName="Name21" presStyleCnt="0"/>
@@ -1938,6 +2134,13 @@
     <dgm:pt modelId="{71C29F20-975B-4341-B41B-50CEA49FE606}" type="pres">
       <dgm:prSet presAssocID="{6F1D5CA6-5F34-4F88-BF44-BEF250924727}" presName="level2Shape" presStyleLbl="node2" presStyleIdx="3" presStyleCnt="4"/>
       <dgm:spPr/>
+      <dgm:t>
+        <a:bodyPr/>
+        <a:lstStyle/>
+        <a:p>
+          <a:endParaRPr lang="es-ES"/>
+        </a:p>
+      </dgm:t>
     </dgm:pt>
     <dgm:pt modelId="{50576EB6-16F3-4FB3-8DA8-5510D9A6E531}" type="pres">
       <dgm:prSet presAssocID="{6F1D5CA6-5F34-4F88-BF44-BEF250924727}" presName="hierChild3" presStyleCnt="0"/>
@@ -1946,6 +2149,13 @@
     <dgm:pt modelId="{15A86F3B-D9E7-41FD-8AB1-37718931BB58}" type="pres">
       <dgm:prSet presAssocID="{BC758844-95DE-4CB7-BF5C-1913FC8DACE3}" presName="Name19" presStyleLbl="parChTrans1D3" presStyleIdx="6" presStyleCnt="8"/>
       <dgm:spPr/>
+      <dgm:t>
+        <a:bodyPr/>
+        <a:lstStyle/>
+        <a:p>
+          <a:endParaRPr lang="es-ES"/>
+        </a:p>
+      </dgm:t>
     </dgm:pt>
     <dgm:pt modelId="{4DCF8025-6022-453E-91DD-DB1107FB7A3D}" type="pres">
       <dgm:prSet presAssocID="{9E518E89-E95C-4ACB-844A-03740305B219}" presName="Name21" presStyleCnt="0"/>
@@ -1954,6 +2164,13 @@
     <dgm:pt modelId="{88895C10-858B-4A7B-A18D-1D602190A6DC}" type="pres">
       <dgm:prSet presAssocID="{9E518E89-E95C-4ACB-844A-03740305B219}" presName="level2Shape" presStyleLbl="node3" presStyleIdx="6" presStyleCnt="8"/>
       <dgm:spPr/>
+      <dgm:t>
+        <a:bodyPr/>
+        <a:lstStyle/>
+        <a:p>
+          <a:endParaRPr lang="es-ES"/>
+        </a:p>
+      </dgm:t>
     </dgm:pt>
     <dgm:pt modelId="{D74F9E80-937B-4BB2-947D-1B67CE841119}" type="pres">
       <dgm:prSet presAssocID="{9E518E89-E95C-4ACB-844A-03740305B219}" presName="hierChild3" presStyleCnt="0"/>
@@ -1962,6 +2179,13 @@
     <dgm:pt modelId="{531E14F9-BE8E-487D-9FBC-BD239BDE74DC}" type="pres">
       <dgm:prSet presAssocID="{062FEC7E-C2B6-4825-AEF5-A95DE82F0985}" presName="Name19" presStyleLbl="parChTrans1D4" presStyleIdx="3" presStyleCnt="5"/>
       <dgm:spPr/>
+      <dgm:t>
+        <a:bodyPr/>
+        <a:lstStyle/>
+        <a:p>
+          <a:endParaRPr lang="es-ES"/>
+        </a:p>
+      </dgm:t>
     </dgm:pt>
     <dgm:pt modelId="{ED6E231F-CD0C-42F9-A7DE-726CDDB3436F}" type="pres">
       <dgm:prSet presAssocID="{F0DF681D-458E-4B75-B5AD-7BFFC8188D2E}" presName="Name21" presStyleCnt="0"/>
@@ -1970,6 +2194,13 @@
     <dgm:pt modelId="{D452570C-AFCD-4136-A3A6-087661427F8A}" type="pres">
       <dgm:prSet presAssocID="{F0DF681D-458E-4B75-B5AD-7BFFC8188D2E}" presName="level2Shape" presStyleLbl="node4" presStyleIdx="3" presStyleCnt="5"/>
       <dgm:spPr/>
+      <dgm:t>
+        <a:bodyPr/>
+        <a:lstStyle/>
+        <a:p>
+          <a:endParaRPr lang="es-ES"/>
+        </a:p>
+      </dgm:t>
     </dgm:pt>
     <dgm:pt modelId="{D59E6A46-F6D1-4AE5-B446-983B1A0850E0}" type="pres">
       <dgm:prSet presAssocID="{F0DF681D-458E-4B75-B5AD-7BFFC8188D2E}" presName="hierChild3" presStyleCnt="0"/>
@@ -1978,6 +2209,13 @@
     <dgm:pt modelId="{85E03D00-B215-4479-AFBA-5CEB429504C9}" type="pres">
       <dgm:prSet presAssocID="{C19AA72F-C2D7-4EE9-B1BA-7ECE7C3CEF01}" presName="Name19" presStyleLbl="parChTrans1D3" presStyleIdx="7" presStyleCnt="8"/>
       <dgm:spPr/>
+      <dgm:t>
+        <a:bodyPr/>
+        <a:lstStyle/>
+        <a:p>
+          <a:endParaRPr lang="es-ES"/>
+        </a:p>
+      </dgm:t>
     </dgm:pt>
     <dgm:pt modelId="{53BFC912-34ED-40CA-9C93-8A07FACBF70C}" type="pres">
       <dgm:prSet presAssocID="{958A8FAA-E7A3-48C0-98A6-4C3A773E5590}" presName="Name21" presStyleCnt="0"/>
@@ -1986,6 +2224,13 @@
     <dgm:pt modelId="{66064A56-0EC5-47D8-BA37-8F16F1EE2F1C}" type="pres">
       <dgm:prSet presAssocID="{958A8FAA-E7A3-48C0-98A6-4C3A773E5590}" presName="level2Shape" presStyleLbl="node3" presStyleIdx="7" presStyleCnt="8" custFlipHor="0" custScaleX="5240"/>
       <dgm:spPr/>
+      <dgm:t>
+        <a:bodyPr/>
+        <a:lstStyle/>
+        <a:p>
+          <a:endParaRPr lang="es-ES"/>
+        </a:p>
+      </dgm:t>
     </dgm:pt>
     <dgm:pt modelId="{480F4877-0FEB-44BE-B4B5-8DFC6EA57DF2}" type="pres">
       <dgm:prSet presAssocID="{958A8FAA-E7A3-48C0-98A6-4C3A773E5590}" presName="hierChild3" presStyleCnt="0"/>
@@ -1994,6 +2239,13 @@
     <dgm:pt modelId="{ECB6E3E8-C365-4657-9343-AE63156F3519}" type="pres">
       <dgm:prSet presAssocID="{DFF14EEF-DE88-442F-96F5-8520D939A002}" presName="Name19" presStyleLbl="parChTrans1D4" presStyleIdx="4" presStyleCnt="5"/>
       <dgm:spPr/>
+      <dgm:t>
+        <a:bodyPr/>
+        <a:lstStyle/>
+        <a:p>
+          <a:endParaRPr lang="es-ES"/>
+        </a:p>
+      </dgm:t>
     </dgm:pt>
     <dgm:pt modelId="{2FB899E1-F33D-4074-BE68-BB45CEB71DDF}" type="pres">
       <dgm:prSet presAssocID="{26B52B06-5624-4E82-B142-B70F4DEDA5A8}" presName="Name21" presStyleCnt="0"/>
@@ -2002,6 +2254,13 @@
     <dgm:pt modelId="{1073E1FD-017C-4D04-87E7-1344708FEFFE}" type="pres">
       <dgm:prSet presAssocID="{26B52B06-5624-4E82-B142-B70F4DEDA5A8}" presName="level2Shape" presStyleLbl="node4" presStyleIdx="4" presStyleCnt="5"/>
       <dgm:spPr/>
+      <dgm:t>
+        <a:bodyPr/>
+        <a:lstStyle/>
+        <a:p>
+          <a:endParaRPr lang="es-ES"/>
+        </a:p>
+      </dgm:t>
     </dgm:pt>
     <dgm:pt modelId="{B38A26E1-7D8C-4815-A93B-633FB9A0F19D}" type="pres">
       <dgm:prSet presAssocID="{26B52B06-5624-4E82-B142-B70F4DEDA5A8}" presName="hierChild3" presStyleCnt="0"/>
@@ -2013,59 +2272,59 @@
     </dgm:pt>
   </dgm:ptLst>
   <dgm:cxnLst>
+    <dgm:cxn modelId="{205C703F-1F2B-4BBE-91DB-4AA98703A6C6}" type="presOf" srcId="{14CBFDCC-3ECF-4077-AAFC-9035D3532054}" destId="{6DFBC8DC-FB04-4552-ACB4-2C723637561B}" srcOrd="0" destOrd="0" presId="urn:microsoft.com/office/officeart/2005/8/layout/hierarchy6"/>
+    <dgm:cxn modelId="{E81DF5F5-37A0-4888-9BA0-494538CF0BB6}" type="presOf" srcId="{77CADEB3-FE54-482D-8679-4F469A4B4A67}" destId="{E6E5601B-39F7-4D6D-B067-78B9A4C88F76}" srcOrd="0" destOrd="0" presId="urn:microsoft.com/office/officeart/2005/8/layout/hierarchy6"/>
     <dgm:cxn modelId="{77D8D004-A2EB-4E11-98EE-9DECE6854379}" srcId="{958A8FAA-E7A3-48C0-98A6-4C3A773E5590}" destId="{26B52B06-5624-4E82-B142-B70F4DEDA5A8}" srcOrd="0" destOrd="0" parTransId="{DFF14EEF-DE88-442F-96F5-8520D939A002}" sibTransId="{46956D88-D793-4A84-8153-D8C8237FB384}"/>
+    <dgm:cxn modelId="{662F0A59-CA57-4CE2-A8B8-E74730432C88}" type="presOf" srcId="{A1E0D595-9930-49C1-A7D6-ABF215D5DF74}" destId="{7D9DF814-EB3C-4A52-B166-0E4DD46DE296}" srcOrd="0" destOrd="0" presId="urn:microsoft.com/office/officeart/2005/8/layout/hierarchy6"/>
+    <dgm:cxn modelId="{07BE1776-EA48-4D7E-A814-895EC8871C5B}" srcId="{6F1D5CA6-5F34-4F88-BF44-BEF250924727}" destId="{958A8FAA-E7A3-48C0-98A6-4C3A773E5590}" srcOrd="1" destOrd="0" parTransId="{C19AA72F-C2D7-4EE9-B1BA-7ECE7C3CEF01}" sibTransId="{ED185C4A-EB92-4BBA-8205-4A313A30A566}"/>
+    <dgm:cxn modelId="{0B9DE4A7-538D-400C-9BBD-957230918BC8}" type="presOf" srcId="{6F1D5CA6-5F34-4F88-BF44-BEF250924727}" destId="{71C29F20-975B-4341-B41B-50CEA49FE606}" srcOrd="0" destOrd="0" presId="urn:microsoft.com/office/officeart/2005/8/layout/hierarchy6"/>
+    <dgm:cxn modelId="{9DB55486-A002-422C-B535-E66CF2B97C80}" type="presOf" srcId="{540823D0-D4AA-438F-B805-D3CA6D4539F8}" destId="{A445E83A-B1D7-4754-AB40-1BD356E2B23A}" srcOrd="0" destOrd="0" presId="urn:microsoft.com/office/officeart/2005/8/layout/hierarchy6"/>
+    <dgm:cxn modelId="{5811BAAA-C778-4938-B9A0-254EA33A3D9B}" srcId="{63E0C32F-5CB1-4C0B-BFC5-95C3688A5952}" destId="{E116835A-3D10-450B-9413-E1B97894FFA3}" srcOrd="0" destOrd="0" parTransId="{AEF768B3-89BD-4493-B753-D5C7E3F86037}" sibTransId="{52D43CBC-A4A2-45B3-BE26-8C6C6134A79F}"/>
+    <dgm:cxn modelId="{8754D5A6-FA6C-4190-A145-9C83C339C99D}" srcId="{5CA15CE3-8396-42E1-8E7E-BD11A58851E2}" destId="{F66CC7BD-674A-437D-8C62-29898B13049D}" srcOrd="0" destOrd="0" parTransId="{27B0B7D4-9290-4FFB-8E4F-E55C7EC9F8B5}" sibTransId="{0AE695F0-1447-4B3E-9061-2D7EB833CB67}"/>
+    <dgm:cxn modelId="{4EE51E6B-647F-4094-8AC7-17EA1989F979}" type="presOf" srcId="{9E518E89-E95C-4ACB-844A-03740305B219}" destId="{88895C10-858B-4A7B-A18D-1D602190A6DC}" srcOrd="0" destOrd="0" presId="urn:microsoft.com/office/officeart/2005/8/layout/hierarchy6"/>
+    <dgm:cxn modelId="{27234CF3-F13C-46A4-A309-CAF2C76771B6}" type="presOf" srcId="{958A8FAA-E7A3-48C0-98A6-4C3A773E5590}" destId="{66064A56-0EC5-47D8-BA37-8F16F1EE2F1C}" srcOrd="0" destOrd="0" presId="urn:microsoft.com/office/officeart/2005/8/layout/hierarchy6"/>
+    <dgm:cxn modelId="{0F581FEE-607D-4847-B816-C0141EF64EED}" srcId="{5A9D0339-AA51-434F-8B6C-60F99E3633CF}" destId="{540823D0-D4AA-438F-B805-D3CA6D4539F8}" srcOrd="1" destOrd="0" parTransId="{441A3D14-7823-4933-A226-6CEE16869DD4}" sibTransId="{2DF52586-D00E-4C55-8704-4E1840133706}"/>
+    <dgm:cxn modelId="{5D7BED3C-308F-46E7-9F02-67CDF1491CA1}" type="presOf" srcId="{F0DF681D-458E-4B75-B5AD-7BFFC8188D2E}" destId="{D452570C-AFCD-4136-A3A6-087661427F8A}" srcOrd="0" destOrd="0" presId="urn:microsoft.com/office/officeart/2005/8/layout/hierarchy6"/>
+    <dgm:cxn modelId="{6E77064D-F778-4D34-BE87-8943DB3A0BEC}" srcId="{9A3D543D-1E9A-4BE5-BFBC-B65722739982}" destId="{5A9D0339-AA51-434F-8B6C-60F99E3633CF}" srcOrd="1" destOrd="0" parTransId="{5A2D30D4-EEF4-4274-A404-AB129065637F}" sibTransId="{CEC8408D-1C1F-4517-8C11-F42FD84E8BAB}"/>
+    <dgm:cxn modelId="{8DBD8D5C-080E-42D5-AE53-F26EF0C4B25D}" type="presOf" srcId="{F66CC7BD-674A-437D-8C62-29898B13049D}" destId="{403A2617-6E68-42B4-BEB9-915729DD91B2}" srcOrd="0" destOrd="0" presId="urn:microsoft.com/office/officeart/2005/8/layout/hierarchy6"/>
+    <dgm:cxn modelId="{569C8930-F8BB-4BC7-BEC6-8A4C6AF26313}" type="presOf" srcId="{5A9D0339-AA51-434F-8B6C-60F99E3633CF}" destId="{1EE97BA3-462E-4247-9C64-D91A323268AC}" srcOrd="0" destOrd="0" presId="urn:microsoft.com/office/officeart/2005/8/layout/hierarchy6"/>
+    <dgm:cxn modelId="{9B6F5641-5EC1-4662-AA22-4A30AE34EFAB}" srcId="{9A3D543D-1E9A-4BE5-BFBC-B65722739982}" destId="{6F1D5CA6-5F34-4F88-BF44-BEF250924727}" srcOrd="3" destOrd="0" parTransId="{17037C34-3FCA-415A-87E6-9101440E5570}" sibTransId="{F1A32AF2-6499-482D-92E7-26CA18A1E783}"/>
     <dgm:cxn modelId="{FC77AA06-4551-4525-9261-28001F8F0395}" type="presOf" srcId="{9A3D543D-1E9A-4BE5-BFBC-B65722739982}" destId="{9903AFBA-5A13-4349-A39D-854233A67AAB}" srcOrd="0" destOrd="0" presId="urn:microsoft.com/office/officeart/2005/8/layout/hierarchy6"/>
+    <dgm:cxn modelId="{189DD1E4-2B81-4BF3-89BB-FDFA88959959}" srcId="{C194289A-C687-45FE-8049-89294C7C2B30}" destId="{20A85F18-8AB9-4E57-B52A-9BF4B306A9C3}" srcOrd="0" destOrd="0" parTransId="{3B12340C-4A3C-4DC8-BCCA-8F5CFA7F81A0}" sibTransId="{B7E51429-AA15-40A6-AE25-DC8252353AA9}"/>
+    <dgm:cxn modelId="{F25B2F81-A6CF-43B6-949B-D8DE03316882}" type="presOf" srcId="{C19AA72F-C2D7-4EE9-B1BA-7ECE7C3CEF01}" destId="{85E03D00-B215-4479-AFBA-5CEB429504C9}" srcOrd="0" destOrd="0" presId="urn:microsoft.com/office/officeart/2005/8/layout/hierarchy6"/>
+    <dgm:cxn modelId="{1775ACB4-D98E-4C6B-BA64-A6156C422A9C}" type="presOf" srcId="{63E0C32F-5CB1-4C0B-BFC5-95C3688A5952}" destId="{9ADE6EBB-D0A9-4302-BC75-1FB70BC17255}" srcOrd="0" destOrd="0" presId="urn:microsoft.com/office/officeart/2005/8/layout/hierarchy6"/>
+    <dgm:cxn modelId="{F60FDD36-6A54-47BF-8EED-07E5DD1F04E9}" srcId="{66EE189E-5075-46F1-AF74-59651897F29C}" destId="{C194289A-C687-45FE-8049-89294C7C2B30}" srcOrd="0" destOrd="0" parTransId="{A1E0D595-9930-49C1-A7D6-ABF215D5DF74}" sibTransId="{C80CDFA2-386C-46C7-B2F7-98BAECE1CEE5}"/>
+    <dgm:cxn modelId="{5250D644-4541-49BB-AE6D-7633048CD1EF}" srcId="{6F1D5CA6-5F34-4F88-BF44-BEF250924727}" destId="{9E518E89-E95C-4ACB-844A-03740305B219}" srcOrd="0" destOrd="0" parTransId="{BC758844-95DE-4CB7-BF5C-1913FC8DACE3}" sibTransId="{4828EE8C-8752-46CA-AF7A-DF4A39243D65}"/>
+    <dgm:cxn modelId="{7E28F19B-13A0-47DD-A9ED-6FBF60F8C37C}" type="presOf" srcId="{E116835A-3D10-450B-9413-E1B97894FFA3}" destId="{03CEC701-59F7-4F6F-A2FB-6D1193C6C0E9}" srcOrd="0" destOrd="0" presId="urn:microsoft.com/office/officeart/2005/8/layout/hierarchy6"/>
+    <dgm:cxn modelId="{925CFD1C-CD56-4DC6-813F-70B1E5243183}" type="presOf" srcId="{66EE189E-5075-46F1-AF74-59651897F29C}" destId="{532A0C2D-ACD5-4BE7-B893-91B3018C35E8}" srcOrd="0" destOrd="0" presId="urn:microsoft.com/office/officeart/2005/8/layout/hierarchy6"/>
+    <dgm:cxn modelId="{8F84316C-D7CF-4E70-A84F-FC3AEF7A98DD}" srcId="{1C5F8750-0E8D-4A4F-A5C4-6A02757B2CEE}" destId="{9A3D543D-1E9A-4BE5-BFBC-B65722739982}" srcOrd="0" destOrd="0" parTransId="{9B09A68A-FA35-4BB2-B59F-0D5048C372BC}" sibTransId="{4E033150-6172-41B8-A447-633A4A116347}"/>
+    <dgm:cxn modelId="{74BEEBB6-8087-40DD-823A-CE567002062C}" type="presOf" srcId="{FC0286EA-4B69-4B09-B5C5-A002ECF296A6}" destId="{53593E82-FE48-4799-B3D5-9BF8476C7795}" srcOrd="0" destOrd="0" presId="urn:microsoft.com/office/officeart/2005/8/layout/hierarchy6"/>
+    <dgm:cxn modelId="{E2F81E9C-FEF2-41D8-879F-2194C54923C3}" type="presOf" srcId="{062FEC7E-C2B6-4825-AEF5-A95DE82F0985}" destId="{531E14F9-BE8E-487D-9FBC-BD239BDE74DC}" srcOrd="0" destOrd="0" presId="urn:microsoft.com/office/officeart/2005/8/layout/hierarchy6"/>
+    <dgm:cxn modelId="{B5F53BE2-8ED6-4519-894D-D35C5AACE93A}" type="presOf" srcId="{26B52B06-5624-4E82-B142-B70F4DEDA5A8}" destId="{1073E1FD-017C-4D04-87E7-1344708FEFFE}" srcOrd="0" destOrd="0" presId="urn:microsoft.com/office/officeart/2005/8/layout/hierarchy6"/>
+    <dgm:cxn modelId="{48045230-B8B4-462B-BF0A-EF8B7544C145}" type="presOf" srcId="{A72855AD-81B2-4E1F-8F76-C9BFC49D9668}" destId="{7F15DC38-3E35-4ED9-83CB-208CB23EA7A4}" srcOrd="0" destOrd="0" presId="urn:microsoft.com/office/officeart/2005/8/layout/hierarchy6"/>
+    <dgm:cxn modelId="{ACD92EDD-5B80-43F8-8AE7-8438CE86337A}" type="presOf" srcId="{BC758844-95DE-4CB7-BF5C-1913FC8DACE3}" destId="{15A86F3B-D9E7-41FD-8AB1-37718931BB58}" srcOrd="0" destOrd="0" presId="urn:microsoft.com/office/officeart/2005/8/layout/hierarchy6"/>
+    <dgm:cxn modelId="{5E4A92C4-FC82-499F-8060-EE9E3CB03401}" srcId="{9A3D543D-1E9A-4BE5-BFBC-B65722739982}" destId="{35DCDA67-F2A2-441C-AE5D-C1B198AC0662}" srcOrd="0" destOrd="0" parTransId="{675114A4-4D40-4091-9275-9C8175883DB4}" sibTransId="{D315B3E9-E343-4B13-8EAD-6B260F20DDCE}"/>
+    <dgm:cxn modelId="{1F547D3E-B87B-4960-AF5C-8D15A786ACAF}" type="presOf" srcId="{27B0B7D4-9290-4FFB-8E4F-E55C7EC9F8B5}" destId="{190E5C43-FF52-41EF-BC65-4C3846DF4B2F}" srcOrd="0" destOrd="0" presId="urn:microsoft.com/office/officeart/2005/8/layout/hierarchy6"/>
+    <dgm:cxn modelId="{2EDCA332-FA0E-49FA-8C8E-EB6D90DD39C4}" srcId="{35DCDA67-F2A2-441C-AE5D-C1B198AC0662}" destId="{63E0C32F-5CB1-4C0B-BFC5-95C3688A5952}" srcOrd="0" destOrd="0" parTransId="{FC0286EA-4B69-4B09-B5C5-A002ECF296A6}" sibTransId="{DDDB3BA4-5927-4112-81E0-912E28DBF488}"/>
+    <dgm:cxn modelId="{71CEC4D2-DE78-479D-BD43-05EDE136BCCD}" type="presOf" srcId="{3B12340C-4A3C-4DC8-BCCA-8F5CFA7F81A0}" destId="{6693D620-D3B4-43A1-8165-358A23FCEFAD}" srcOrd="0" destOrd="0" presId="urn:microsoft.com/office/officeart/2005/8/layout/hierarchy6"/>
+    <dgm:cxn modelId="{5330A575-C6B1-42EB-8FC0-CBFDF772777D}" type="presOf" srcId="{C194289A-C687-45FE-8049-89294C7C2B30}" destId="{7ECB5281-3BE3-458D-9668-FC45289E3411}" srcOrd="0" destOrd="0" presId="urn:microsoft.com/office/officeart/2005/8/layout/hierarchy6"/>
+    <dgm:cxn modelId="{915B9641-7D8A-4799-900D-2B8537C02E58}" srcId="{66EE189E-5075-46F1-AF74-59651897F29C}" destId="{0BFEC22B-8AB5-4E37-B44F-16371DB8A2C2}" srcOrd="2" destOrd="0" parTransId="{A72855AD-81B2-4E1F-8F76-C9BFC49D9668}" sibTransId="{5D381B9F-D38A-4BC9-AA35-A6DD8D7A0E88}"/>
+    <dgm:cxn modelId="{84E6488C-253B-438D-AAFD-33CB151FD11C}" srcId="{9A3D543D-1E9A-4BE5-BFBC-B65722739982}" destId="{66EE189E-5075-46F1-AF74-59651897F29C}" srcOrd="2" destOrd="0" parTransId="{C7818523-DD8A-4226-93BE-3030326F44BF}" sibTransId="{347A939D-BFB7-46AB-8A82-4221C36A4DC6}"/>
+    <dgm:cxn modelId="{725699EB-3058-4FB9-8B2A-41B4F916C9EB}" srcId="{66EE189E-5075-46F1-AF74-59651897F29C}" destId="{FA12C214-3A8B-4C17-8251-A885B4B6E072}" srcOrd="1" destOrd="0" parTransId="{77CADEB3-FE54-482D-8679-4F469A4B4A67}" sibTransId="{34D708C3-EA3A-45EC-B3D6-6EEEBFABC684}"/>
+    <dgm:cxn modelId="{F20877BF-0CB4-4FAF-A20F-52021D1AC4CF}" type="presOf" srcId="{DFF14EEF-DE88-442F-96F5-8520D939A002}" destId="{ECB6E3E8-C365-4657-9343-AE63156F3519}" srcOrd="0" destOrd="0" presId="urn:microsoft.com/office/officeart/2005/8/layout/hierarchy6"/>
+    <dgm:cxn modelId="{42C2BCF5-DC4D-4803-8CDB-1724D7266FF2}" type="presOf" srcId="{20A85F18-8AB9-4E57-B52A-9BF4B306A9C3}" destId="{21465F75-534B-4A28-8D74-771BE4C5037B}" srcOrd="0" destOrd="0" presId="urn:microsoft.com/office/officeart/2005/8/layout/hierarchy6"/>
+    <dgm:cxn modelId="{5358C9CD-4C9F-4E16-B72C-FFBB6D6C75B6}" type="presOf" srcId="{1C5F8750-0E8D-4A4F-A5C4-6A02757B2CEE}" destId="{C647C14C-60E2-48E5-85A4-92CF88C6F009}" srcOrd="0" destOrd="0" presId="urn:microsoft.com/office/officeart/2005/8/layout/hierarchy6"/>
+    <dgm:cxn modelId="{06A9FBF4-0355-4854-ADF0-FCEBBB8DD16E}" srcId="{9E518E89-E95C-4ACB-844A-03740305B219}" destId="{F0DF681D-458E-4B75-B5AD-7BFFC8188D2E}" srcOrd="0" destOrd="0" parTransId="{062FEC7E-C2B6-4825-AEF5-A95DE82F0985}" sibTransId="{3A0BA01E-3A25-4697-867F-F5E62715EE19}"/>
+    <dgm:cxn modelId="{33C7AFE6-8C27-4185-8CD1-C5B810CD6A6E}" type="presOf" srcId="{5CA15CE3-8396-42E1-8E7E-BD11A58851E2}" destId="{7C0EA656-1D18-4980-86E2-83309EF67A1B}" srcOrd="0" destOrd="0" presId="urn:microsoft.com/office/officeart/2005/8/layout/hierarchy6"/>
+    <dgm:cxn modelId="{4F63A585-9D94-44A3-8134-AB9FEAC94CB3}" type="presOf" srcId="{AEF768B3-89BD-4493-B753-D5C7E3F86037}" destId="{2B44D44D-9C15-4BE4-8857-6902DD216E02}" srcOrd="0" destOrd="0" presId="urn:microsoft.com/office/officeart/2005/8/layout/hierarchy6"/>
+    <dgm:cxn modelId="{F1FC97C5-4AFC-483B-8A1A-C27B2BE745B7}" type="presOf" srcId="{5A2D30D4-EEF4-4274-A404-AB129065637F}" destId="{6D500FE4-6E88-4115-B204-2A401C1E43A0}" srcOrd="0" destOrd="0" presId="urn:microsoft.com/office/officeart/2005/8/layout/hierarchy6"/>
+    <dgm:cxn modelId="{50644D6C-CE5C-45B2-A94A-446055AA3E94}" type="presOf" srcId="{17037C34-3FCA-415A-87E6-9101440E5570}" destId="{5B1BDFAD-02C6-44F1-B889-E8B7F6D74DD3}" srcOrd="0" destOrd="0" presId="urn:microsoft.com/office/officeart/2005/8/layout/hierarchy6"/>
+    <dgm:cxn modelId="{36080CC3-E829-43B7-B964-5AD80EB222C8}" type="presOf" srcId="{441A3D14-7823-4933-A226-6CEE16869DD4}" destId="{86087C67-4375-477E-84D1-836C1F14C793}" srcOrd="0" destOrd="0" presId="urn:microsoft.com/office/officeart/2005/8/layout/hierarchy6"/>
+    <dgm:cxn modelId="{79B249DC-4833-49D8-9857-9CE7EF5DF86E}" type="presOf" srcId="{675114A4-4D40-4091-9275-9C8175883DB4}" destId="{41AB122B-081A-4865-AD38-E3670CB221C3}" srcOrd="0" destOrd="0" presId="urn:microsoft.com/office/officeart/2005/8/layout/hierarchy6"/>
+    <dgm:cxn modelId="{DF7AABBE-8237-4DDD-BBFF-90A7B8F794E1}" type="presOf" srcId="{FA12C214-3A8B-4C17-8251-A885B4B6E072}" destId="{E9154DCD-71BE-4D6B-9077-16D4BC71B579}" srcOrd="0" destOrd="0" presId="urn:microsoft.com/office/officeart/2005/8/layout/hierarchy6"/>
+    <dgm:cxn modelId="{7FB98C4F-DCCA-4C59-A3BF-C3B8534B4C0E}" srcId="{5A9D0339-AA51-434F-8B6C-60F99E3633CF}" destId="{5CA15CE3-8396-42E1-8E7E-BD11A58851E2}" srcOrd="0" destOrd="0" parTransId="{14CBFDCC-3ECF-4077-AAFC-9035D3532054}" sibTransId="{4EF2F922-12E7-4FD4-81DA-E3CD0818CD32}"/>
     <dgm:cxn modelId="{0F49240D-DCAE-4441-AF35-7AEAEFD9A362}" type="presOf" srcId="{C7818523-DD8A-4226-93BE-3030326F44BF}" destId="{F7EDE524-7426-42F9-9EA5-E64F8887CFAA}" srcOrd="0" destOrd="0" presId="urn:microsoft.com/office/officeart/2005/8/layout/hierarchy6"/>
-    <dgm:cxn modelId="{925CFD1C-CD56-4DC6-813F-70B1E5243183}" type="presOf" srcId="{66EE189E-5075-46F1-AF74-59651897F29C}" destId="{532A0C2D-ACD5-4BE7-B893-91B3018C35E8}" srcOrd="0" destOrd="0" presId="urn:microsoft.com/office/officeart/2005/8/layout/hierarchy6"/>
-    <dgm:cxn modelId="{48045230-B8B4-462B-BF0A-EF8B7544C145}" type="presOf" srcId="{A72855AD-81B2-4E1F-8F76-C9BFC49D9668}" destId="{7F15DC38-3E35-4ED9-83CB-208CB23EA7A4}" srcOrd="0" destOrd="0" presId="urn:microsoft.com/office/officeart/2005/8/layout/hierarchy6"/>
-    <dgm:cxn modelId="{569C8930-F8BB-4BC7-BEC6-8A4C6AF26313}" type="presOf" srcId="{5A9D0339-AA51-434F-8B6C-60F99E3633CF}" destId="{1EE97BA3-462E-4247-9C64-D91A323268AC}" srcOrd="0" destOrd="0" presId="urn:microsoft.com/office/officeart/2005/8/layout/hierarchy6"/>
-    <dgm:cxn modelId="{2EDCA332-FA0E-49FA-8C8E-EB6D90DD39C4}" srcId="{35DCDA67-F2A2-441C-AE5D-C1B198AC0662}" destId="{63E0C32F-5CB1-4C0B-BFC5-95C3688A5952}" srcOrd="0" destOrd="0" parTransId="{FC0286EA-4B69-4B09-B5C5-A002ECF296A6}" sibTransId="{DDDB3BA4-5927-4112-81E0-912E28DBF488}"/>
-    <dgm:cxn modelId="{F60FDD36-6A54-47BF-8EED-07E5DD1F04E9}" srcId="{66EE189E-5075-46F1-AF74-59651897F29C}" destId="{C194289A-C687-45FE-8049-89294C7C2B30}" srcOrd="0" destOrd="0" parTransId="{A1E0D595-9930-49C1-A7D6-ABF215D5DF74}" sibTransId="{C80CDFA2-386C-46C7-B2F7-98BAECE1CEE5}"/>
-    <dgm:cxn modelId="{5D7BED3C-308F-46E7-9F02-67CDF1491CA1}" type="presOf" srcId="{F0DF681D-458E-4B75-B5AD-7BFFC8188D2E}" destId="{D452570C-AFCD-4136-A3A6-087661427F8A}" srcOrd="0" destOrd="0" presId="urn:microsoft.com/office/officeart/2005/8/layout/hierarchy6"/>
-    <dgm:cxn modelId="{1F547D3E-B87B-4960-AF5C-8D15A786ACAF}" type="presOf" srcId="{27B0B7D4-9290-4FFB-8E4F-E55C7EC9F8B5}" destId="{190E5C43-FF52-41EF-BC65-4C3846DF4B2F}" srcOrd="0" destOrd="0" presId="urn:microsoft.com/office/officeart/2005/8/layout/hierarchy6"/>
-    <dgm:cxn modelId="{205C703F-1F2B-4BBE-91DB-4AA98703A6C6}" type="presOf" srcId="{14CBFDCC-3ECF-4077-AAFC-9035D3532054}" destId="{6DFBC8DC-FB04-4552-ACB4-2C723637561B}" srcOrd="0" destOrd="0" presId="urn:microsoft.com/office/officeart/2005/8/layout/hierarchy6"/>
-    <dgm:cxn modelId="{8DBD8D5C-080E-42D5-AE53-F26EF0C4B25D}" type="presOf" srcId="{F66CC7BD-674A-437D-8C62-29898B13049D}" destId="{403A2617-6E68-42B4-BEB9-915729DD91B2}" srcOrd="0" destOrd="0" presId="urn:microsoft.com/office/officeart/2005/8/layout/hierarchy6"/>
-    <dgm:cxn modelId="{9B6F5641-5EC1-4662-AA22-4A30AE34EFAB}" srcId="{9A3D543D-1E9A-4BE5-BFBC-B65722739982}" destId="{6F1D5CA6-5F34-4F88-BF44-BEF250924727}" srcOrd="3" destOrd="0" parTransId="{17037C34-3FCA-415A-87E6-9101440E5570}" sibTransId="{F1A32AF2-6499-482D-92E7-26CA18A1E783}"/>
-    <dgm:cxn modelId="{915B9641-7D8A-4799-900D-2B8537C02E58}" srcId="{66EE189E-5075-46F1-AF74-59651897F29C}" destId="{0BFEC22B-8AB5-4E37-B44F-16371DB8A2C2}" srcOrd="2" destOrd="0" parTransId="{A72855AD-81B2-4E1F-8F76-C9BFC49D9668}" sibTransId="{5D381B9F-D38A-4BC9-AA35-A6DD8D7A0E88}"/>
-    <dgm:cxn modelId="{5250D644-4541-49BB-AE6D-7633048CD1EF}" srcId="{6F1D5CA6-5F34-4F88-BF44-BEF250924727}" destId="{9E518E89-E95C-4ACB-844A-03740305B219}" srcOrd="0" destOrd="0" parTransId="{BC758844-95DE-4CB7-BF5C-1913FC8DACE3}" sibTransId="{4828EE8C-8752-46CA-AF7A-DF4A39243D65}"/>
-    <dgm:cxn modelId="{4EE51E6B-647F-4094-8AC7-17EA1989F979}" type="presOf" srcId="{9E518E89-E95C-4ACB-844A-03740305B219}" destId="{88895C10-858B-4A7B-A18D-1D602190A6DC}" srcOrd="0" destOrd="0" presId="urn:microsoft.com/office/officeart/2005/8/layout/hierarchy6"/>
-    <dgm:cxn modelId="{8F84316C-D7CF-4E70-A84F-FC3AEF7A98DD}" srcId="{1C5F8750-0E8D-4A4F-A5C4-6A02757B2CEE}" destId="{9A3D543D-1E9A-4BE5-BFBC-B65722739982}" srcOrd="0" destOrd="0" parTransId="{9B09A68A-FA35-4BB2-B59F-0D5048C372BC}" sibTransId="{4E033150-6172-41B8-A447-633A4A116347}"/>
-    <dgm:cxn modelId="{50644D6C-CE5C-45B2-A94A-446055AA3E94}" type="presOf" srcId="{17037C34-3FCA-415A-87E6-9101440E5570}" destId="{5B1BDFAD-02C6-44F1-B889-E8B7F6D74DD3}" srcOrd="0" destOrd="0" presId="urn:microsoft.com/office/officeart/2005/8/layout/hierarchy6"/>
-    <dgm:cxn modelId="{6E77064D-F778-4D34-BE87-8943DB3A0BEC}" srcId="{9A3D543D-1E9A-4BE5-BFBC-B65722739982}" destId="{5A9D0339-AA51-434F-8B6C-60F99E3633CF}" srcOrd="1" destOrd="0" parTransId="{5A2D30D4-EEF4-4274-A404-AB129065637F}" sibTransId="{CEC8408D-1C1F-4517-8C11-F42FD84E8BAB}"/>
-    <dgm:cxn modelId="{7FB98C4F-DCCA-4C59-A3BF-C3B8534B4C0E}" srcId="{5A9D0339-AA51-434F-8B6C-60F99E3633CF}" destId="{5CA15CE3-8396-42E1-8E7E-BD11A58851E2}" srcOrd="0" destOrd="0" parTransId="{14CBFDCC-3ECF-4077-AAFC-9035D3532054}" sibTransId="{4EF2F922-12E7-4FD4-81DA-E3CD0818CD32}"/>
-    <dgm:cxn modelId="{5330A575-C6B1-42EB-8FC0-CBFDF772777D}" type="presOf" srcId="{C194289A-C687-45FE-8049-89294C7C2B30}" destId="{7ECB5281-3BE3-458D-9668-FC45289E3411}" srcOrd="0" destOrd="0" presId="urn:microsoft.com/office/officeart/2005/8/layout/hierarchy6"/>
-    <dgm:cxn modelId="{07BE1776-EA48-4D7E-A814-895EC8871C5B}" srcId="{6F1D5CA6-5F34-4F88-BF44-BEF250924727}" destId="{958A8FAA-E7A3-48C0-98A6-4C3A773E5590}" srcOrd="1" destOrd="0" parTransId="{C19AA72F-C2D7-4EE9-B1BA-7ECE7C3CEF01}" sibTransId="{ED185C4A-EB92-4BBA-8205-4A313A30A566}"/>
-    <dgm:cxn modelId="{662F0A59-CA57-4CE2-A8B8-E74730432C88}" type="presOf" srcId="{A1E0D595-9930-49C1-A7D6-ABF215D5DF74}" destId="{7D9DF814-EB3C-4A52-B166-0E4DD46DE296}" srcOrd="0" destOrd="0" presId="urn:microsoft.com/office/officeart/2005/8/layout/hierarchy6"/>
     <dgm:cxn modelId="{82DACA7E-BA77-45DE-A508-21AA17F6B2C9}" type="presOf" srcId="{35DCDA67-F2A2-441C-AE5D-C1B198AC0662}" destId="{0ECD015A-E51F-4E92-93F8-42CA82FE8288}" srcOrd="0" destOrd="0" presId="urn:microsoft.com/office/officeart/2005/8/layout/hierarchy6"/>
-    <dgm:cxn modelId="{F25B2F81-A6CF-43B6-949B-D8DE03316882}" type="presOf" srcId="{C19AA72F-C2D7-4EE9-B1BA-7ECE7C3CEF01}" destId="{85E03D00-B215-4479-AFBA-5CEB429504C9}" srcOrd="0" destOrd="0" presId="urn:microsoft.com/office/officeart/2005/8/layout/hierarchy6"/>
-    <dgm:cxn modelId="{4F63A585-9D94-44A3-8134-AB9FEAC94CB3}" type="presOf" srcId="{AEF768B3-89BD-4493-B753-D5C7E3F86037}" destId="{2B44D44D-9C15-4BE4-8857-6902DD216E02}" srcOrd="0" destOrd="0" presId="urn:microsoft.com/office/officeart/2005/8/layout/hierarchy6"/>
-    <dgm:cxn modelId="{9DB55486-A002-422C-B535-E66CF2B97C80}" type="presOf" srcId="{540823D0-D4AA-438F-B805-D3CA6D4539F8}" destId="{A445E83A-B1D7-4754-AB40-1BD356E2B23A}" srcOrd="0" destOrd="0" presId="urn:microsoft.com/office/officeart/2005/8/layout/hierarchy6"/>
-    <dgm:cxn modelId="{84E6488C-253B-438D-AAFD-33CB151FD11C}" srcId="{9A3D543D-1E9A-4BE5-BFBC-B65722739982}" destId="{66EE189E-5075-46F1-AF74-59651897F29C}" srcOrd="2" destOrd="0" parTransId="{C7818523-DD8A-4226-93BE-3030326F44BF}" sibTransId="{347A939D-BFB7-46AB-8A82-4221C36A4DC6}"/>
-    <dgm:cxn modelId="{7E28F19B-13A0-47DD-A9ED-6FBF60F8C37C}" type="presOf" srcId="{E116835A-3D10-450B-9413-E1B97894FFA3}" destId="{03CEC701-59F7-4F6F-A2FB-6D1193C6C0E9}" srcOrd="0" destOrd="0" presId="urn:microsoft.com/office/officeart/2005/8/layout/hierarchy6"/>
-    <dgm:cxn modelId="{E2F81E9C-FEF2-41D8-879F-2194C54923C3}" type="presOf" srcId="{062FEC7E-C2B6-4825-AEF5-A95DE82F0985}" destId="{531E14F9-BE8E-487D-9FBC-BD239BDE74DC}" srcOrd="0" destOrd="0" presId="urn:microsoft.com/office/officeart/2005/8/layout/hierarchy6"/>
-    <dgm:cxn modelId="{8754D5A6-FA6C-4190-A145-9C83C339C99D}" srcId="{5CA15CE3-8396-42E1-8E7E-BD11A58851E2}" destId="{F66CC7BD-674A-437D-8C62-29898B13049D}" srcOrd="0" destOrd="0" parTransId="{27B0B7D4-9290-4FFB-8E4F-E55C7EC9F8B5}" sibTransId="{0AE695F0-1447-4B3E-9061-2D7EB833CB67}"/>
-    <dgm:cxn modelId="{0B9DE4A7-538D-400C-9BBD-957230918BC8}" type="presOf" srcId="{6F1D5CA6-5F34-4F88-BF44-BEF250924727}" destId="{71C29F20-975B-4341-B41B-50CEA49FE606}" srcOrd="0" destOrd="0" presId="urn:microsoft.com/office/officeart/2005/8/layout/hierarchy6"/>
-    <dgm:cxn modelId="{5811BAAA-C778-4938-B9A0-254EA33A3D9B}" srcId="{63E0C32F-5CB1-4C0B-BFC5-95C3688A5952}" destId="{E116835A-3D10-450B-9413-E1B97894FFA3}" srcOrd="0" destOrd="0" parTransId="{AEF768B3-89BD-4493-B753-D5C7E3F86037}" sibTransId="{52D43CBC-A4A2-45B3-BE26-8C6C6134A79F}"/>
-    <dgm:cxn modelId="{1775ACB4-D98E-4C6B-BA64-A6156C422A9C}" type="presOf" srcId="{63E0C32F-5CB1-4C0B-BFC5-95C3688A5952}" destId="{9ADE6EBB-D0A9-4302-BC75-1FB70BC17255}" srcOrd="0" destOrd="0" presId="urn:microsoft.com/office/officeart/2005/8/layout/hierarchy6"/>
-    <dgm:cxn modelId="{74BEEBB6-8087-40DD-823A-CE567002062C}" type="presOf" srcId="{FC0286EA-4B69-4B09-B5C5-A002ECF296A6}" destId="{53593E82-FE48-4799-B3D5-9BF8476C7795}" srcOrd="0" destOrd="0" presId="urn:microsoft.com/office/officeart/2005/8/layout/hierarchy6"/>
-    <dgm:cxn modelId="{DF7AABBE-8237-4DDD-BBFF-90A7B8F794E1}" type="presOf" srcId="{FA12C214-3A8B-4C17-8251-A885B4B6E072}" destId="{E9154DCD-71BE-4D6B-9077-16D4BC71B579}" srcOrd="0" destOrd="0" presId="urn:microsoft.com/office/officeart/2005/8/layout/hierarchy6"/>
-    <dgm:cxn modelId="{F20877BF-0CB4-4FAF-A20F-52021D1AC4CF}" type="presOf" srcId="{DFF14EEF-DE88-442F-96F5-8520D939A002}" destId="{ECB6E3E8-C365-4657-9343-AE63156F3519}" srcOrd="0" destOrd="0" presId="urn:microsoft.com/office/officeart/2005/8/layout/hierarchy6"/>
-    <dgm:cxn modelId="{36080CC3-E829-43B7-B964-5AD80EB222C8}" type="presOf" srcId="{441A3D14-7823-4933-A226-6CEE16869DD4}" destId="{86087C67-4375-477E-84D1-836C1F14C793}" srcOrd="0" destOrd="0" presId="urn:microsoft.com/office/officeart/2005/8/layout/hierarchy6"/>
-    <dgm:cxn modelId="{5E4A92C4-FC82-499F-8060-EE9E3CB03401}" srcId="{9A3D543D-1E9A-4BE5-BFBC-B65722739982}" destId="{35DCDA67-F2A2-441C-AE5D-C1B198AC0662}" srcOrd="0" destOrd="0" parTransId="{675114A4-4D40-4091-9275-9C8175883DB4}" sibTransId="{D315B3E9-E343-4B13-8EAD-6B260F20DDCE}"/>
-    <dgm:cxn modelId="{F1FC97C5-4AFC-483B-8A1A-C27B2BE745B7}" type="presOf" srcId="{5A2D30D4-EEF4-4274-A404-AB129065637F}" destId="{6D500FE4-6E88-4115-B204-2A401C1E43A0}" srcOrd="0" destOrd="0" presId="urn:microsoft.com/office/officeart/2005/8/layout/hierarchy6"/>
-    <dgm:cxn modelId="{5358C9CD-4C9F-4E16-B72C-FFBB6D6C75B6}" type="presOf" srcId="{1C5F8750-0E8D-4A4F-A5C4-6A02757B2CEE}" destId="{C647C14C-60E2-48E5-85A4-92CF88C6F009}" srcOrd="0" destOrd="0" presId="urn:microsoft.com/office/officeart/2005/8/layout/hierarchy6"/>
-    <dgm:cxn modelId="{71CEC4D2-DE78-479D-BD43-05EDE136BCCD}" type="presOf" srcId="{3B12340C-4A3C-4DC8-BCCA-8F5CFA7F81A0}" destId="{6693D620-D3B4-43A1-8165-358A23FCEFAD}" srcOrd="0" destOrd="0" presId="urn:microsoft.com/office/officeart/2005/8/layout/hierarchy6"/>
-    <dgm:cxn modelId="{79B249DC-4833-49D8-9857-9CE7EF5DF86E}" type="presOf" srcId="{675114A4-4D40-4091-9275-9C8175883DB4}" destId="{41AB122B-081A-4865-AD38-E3670CB221C3}" srcOrd="0" destOrd="0" presId="urn:microsoft.com/office/officeart/2005/8/layout/hierarchy6"/>
-    <dgm:cxn modelId="{ACD92EDD-5B80-43F8-8AE7-8438CE86337A}" type="presOf" srcId="{BC758844-95DE-4CB7-BF5C-1913FC8DACE3}" destId="{15A86F3B-D9E7-41FD-8AB1-37718931BB58}" srcOrd="0" destOrd="0" presId="urn:microsoft.com/office/officeart/2005/8/layout/hierarchy6"/>
-    <dgm:cxn modelId="{B5F53BE2-8ED6-4519-894D-D35C5AACE93A}" type="presOf" srcId="{26B52B06-5624-4E82-B142-B70F4DEDA5A8}" destId="{1073E1FD-017C-4D04-87E7-1344708FEFFE}" srcOrd="0" destOrd="0" presId="urn:microsoft.com/office/officeart/2005/8/layout/hierarchy6"/>
-    <dgm:cxn modelId="{189DD1E4-2B81-4BF3-89BB-FDFA88959959}" srcId="{C194289A-C687-45FE-8049-89294C7C2B30}" destId="{20A85F18-8AB9-4E57-B52A-9BF4B306A9C3}" srcOrd="0" destOrd="0" parTransId="{3B12340C-4A3C-4DC8-BCCA-8F5CFA7F81A0}" sibTransId="{B7E51429-AA15-40A6-AE25-DC8252353AA9}"/>
-    <dgm:cxn modelId="{33C7AFE6-8C27-4185-8CD1-C5B810CD6A6E}" type="presOf" srcId="{5CA15CE3-8396-42E1-8E7E-BD11A58851E2}" destId="{7C0EA656-1D18-4980-86E2-83309EF67A1B}" srcOrd="0" destOrd="0" presId="urn:microsoft.com/office/officeart/2005/8/layout/hierarchy6"/>
-    <dgm:cxn modelId="{725699EB-3058-4FB9-8B2A-41B4F916C9EB}" srcId="{66EE189E-5075-46F1-AF74-59651897F29C}" destId="{FA12C214-3A8B-4C17-8251-A885B4B6E072}" srcOrd="1" destOrd="0" parTransId="{77CADEB3-FE54-482D-8679-4F469A4B4A67}" sibTransId="{34D708C3-EA3A-45EC-B3D6-6EEEBFABC684}"/>
-    <dgm:cxn modelId="{0F581FEE-607D-4847-B816-C0141EF64EED}" srcId="{5A9D0339-AA51-434F-8B6C-60F99E3633CF}" destId="{540823D0-D4AA-438F-B805-D3CA6D4539F8}" srcOrd="1" destOrd="0" parTransId="{441A3D14-7823-4933-A226-6CEE16869DD4}" sibTransId="{2DF52586-D00E-4C55-8704-4E1840133706}"/>
-    <dgm:cxn modelId="{27234CF3-F13C-46A4-A309-CAF2C76771B6}" type="presOf" srcId="{958A8FAA-E7A3-48C0-98A6-4C3A773E5590}" destId="{66064A56-0EC5-47D8-BA37-8F16F1EE2F1C}" srcOrd="0" destOrd="0" presId="urn:microsoft.com/office/officeart/2005/8/layout/hierarchy6"/>
-    <dgm:cxn modelId="{06A9FBF4-0355-4854-ADF0-FCEBBB8DD16E}" srcId="{9E518E89-E95C-4ACB-844A-03740305B219}" destId="{F0DF681D-458E-4B75-B5AD-7BFFC8188D2E}" srcOrd="0" destOrd="0" parTransId="{062FEC7E-C2B6-4825-AEF5-A95DE82F0985}" sibTransId="{3A0BA01E-3A25-4697-867F-F5E62715EE19}"/>
-    <dgm:cxn modelId="{42C2BCF5-DC4D-4803-8CDB-1724D7266FF2}" type="presOf" srcId="{20A85F18-8AB9-4E57-B52A-9BF4B306A9C3}" destId="{21465F75-534B-4A28-8D74-771BE4C5037B}" srcOrd="0" destOrd="0" presId="urn:microsoft.com/office/officeart/2005/8/layout/hierarchy6"/>
-    <dgm:cxn modelId="{E81DF5F5-37A0-4888-9BA0-494538CF0BB6}" type="presOf" srcId="{77CADEB3-FE54-482D-8679-4F469A4B4A67}" destId="{E6E5601B-39F7-4D6D-B067-78B9A4C88F76}" srcOrd="0" destOrd="0" presId="urn:microsoft.com/office/officeart/2005/8/layout/hierarchy6"/>
     <dgm:cxn modelId="{77B07BF6-1D5D-4DD8-84DE-CD1CF985B596}" type="presOf" srcId="{0BFEC22B-8AB5-4E37-B44F-16371DB8A2C2}" destId="{F7AD1C98-5033-4CC0-A62F-4F6538B25AE3}" srcOrd="0" destOrd="0" presId="urn:microsoft.com/office/officeart/2005/8/layout/hierarchy6"/>
     <dgm:cxn modelId="{2D64ED38-1EE4-4F7E-B3C2-A897AC7AB7FF}" type="presParOf" srcId="{C647C14C-60E2-48E5-85A4-92CF88C6F009}" destId="{7FBC73CD-6899-48F0-97D2-0FAF099D00D7}" srcOrd="0" destOrd="0" presId="urn:microsoft.com/office/officeart/2005/8/layout/hierarchy6"/>
     <dgm:cxn modelId="{740D6EF3-2D28-4ABA-B191-DA09BDBD1B77}" type="presParOf" srcId="{7FBC73CD-6899-48F0-97D2-0FAF099D00D7}" destId="{345ABD8D-1ABA-4A43-A568-C10F9BC71744}" srcOrd="0" destOrd="0" presId="urn:microsoft.com/office/officeart/2005/8/layout/hierarchy6"/>
@@ -2220,7 +2479,7 @@
         </a:bodyPr>
         <a:lstStyle/>
         <a:p>
-          <a:pPr marL="0" lvl="0" indent="0" algn="ctr" defTabSz="711200">
+          <a:pPr lvl="0" algn="ctr" defTabSz="711200">
             <a:lnSpc>
               <a:spcPct val="90000"/>
             </a:lnSpc>
@@ -2230,7 +2489,6 @@
             <a:spcAft>
               <a:spcPct val="35000"/>
             </a:spcAft>
-            <a:buNone/>
           </a:pPr>
           <a:r>
             <a:rPr lang="es-AR" sz="1600" kern="1200" dirty="0"/>
@@ -2372,7 +2630,7 @@
         </a:bodyPr>
         <a:lstStyle/>
         <a:p>
-          <a:pPr marL="0" lvl="0" indent="0" algn="ctr" defTabSz="711200">
+          <a:pPr lvl="0" algn="ctr" defTabSz="711200">
             <a:lnSpc>
               <a:spcPct val="90000"/>
             </a:lnSpc>
@@ -2382,7 +2640,6 @@
             <a:spcAft>
               <a:spcPct val="35000"/>
             </a:spcAft>
-            <a:buNone/>
           </a:pPr>
           <a:r>
             <a:rPr lang="es-AR" sz="1600" kern="1200" dirty="0"/>
@@ -2518,7 +2775,7 @@
         </a:bodyPr>
         <a:lstStyle/>
         <a:p>
-          <a:pPr marL="0" lvl="0" indent="0" algn="ctr" defTabSz="711200">
+          <a:pPr lvl="0" algn="ctr" defTabSz="711200">
             <a:lnSpc>
               <a:spcPct val="90000"/>
             </a:lnSpc>
@@ -2528,7 +2785,6 @@
             <a:spcAft>
               <a:spcPct val="35000"/>
             </a:spcAft>
-            <a:buNone/>
           </a:pPr>
           <a:r>
             <a:rPr lang="es-AR" sz="1600" kern="1200" dirty="0"/>
@@ -2664,7 +2920,7 @@
         </a:bodyPr>
         <a:lstStyle/>
         <a:p>
-          <a:pPr marL="0" lvl="0" indent="0" algn="ctr" defTabSz="711200">
+          <a:pPr lvl="0" algn="ctr" defTabSz="711200">
             <a:lnSpc>
               <a:spcPct val="90000"/>
             </a:lnSpc>
@@ -2674,7 +2930,6 @@
             <a:spcAft>
               <a:spcPct val="35000"/>
             </a:spcAft>
-            <a:buNone/>
           </a:pPr>
           <a:r>
             <a:rPr lang="es-AR" sz="1600" kern="1200" dirty="0"/>
@@ -2816,7 +3071,7 @@
         </a:bodyPr>
         <a:lstStyle/>
         <a:p>
-          <a:pPr marL="0" lvl="0" indent="0" algn="ctr" defTabSz="711200">
+          <a:pPr lvl="0" algn="ctr" defTabSz="711200">
             <a:lnSpc>
               <a:spcPct val="90000"/>
             </a:lnSpc>
@@ -2826,7 +3081,6 @@
             <a:spcAft>
               <a:spcPct val="35000"/>
             </a:spcAft>
-            <a:buNone/>
           </a:pPr>
           <a:r>
             <a:rPr lang="es-AR" sz="1600" kern="1200" dirty="0"/>
@@ -2968,7 +3222,7 @@
         </a:bodyPr>
         <a:lstStyle/>
         <a:p>
-          <a:pPr marL="0" lvl="0" indent="0" algn="ctr" defTabSz="711200">
+          <a:pPr lvl="0" algn="ctr" defTabSz="711200">
             <a:lnSpc>
               <a:spcPct val="90000"/>
             </a:lnSpc>
@@ -2978,7 +3232,6 @@
             <a:spcAft>
               <a:spcPct val="35000"/>
             </a:spcAft>
-            <a:buNone/>
           </a:pPr>
           <a:r>
             <a:rPr lang="es-AR" sz="1600" kern="1200" dirty="0"/>
@@ -3114,7 +3367,7 @@
         </a:bodyPr>
         <a:lstStyle/>
         <a:p>
-          <a:pPr marL="0" lvl="0" indent="0" algn="ctr" defTabSz="711200">
+          <a:pPr lvl="0" algn="ctr" defTabSz="711200">
             <a:lnSpc>
               <a:spcPct val="90000"/>
             </a:lnSpc>
@@ -3124,7 +3377,6 @@
             <a:spcAft>
               <a:spcPct val="35000"/>
             </a:spcAft>
-            <a:buNone/>
           </a:pPr>
           <a:r>
             <a:rPr lang="es-AR" sz="1600" kern="1200" dirty="0"/>
@@ -3266,7 +3518,7 @@
         </a:bodyPr>
         <a:lstStyle/>
         <a:p>
-          <a:pPr marL="0" lvl="0" indent="0" algn="ctr" defTabSz="711200">
+          <a:pPr lvl="0" algn="ctr" defTabSz="711200">
             <a:lnSpc>
               <a:spcPct val="90000"/>
             </a:lnSpc>
@@ -3276,7 +3528,6 @@
             <a:spcAft>
               <a:spcPct val="35000"/>
             </a:spcAft>
-            <a:buNone/>
           </a:pPr>
           <a:r>
             <a:rPr lang="es-AR" sz="1600" kern="1200" dirty="0"/>
@@ -3418,7 +3669,7 @@
         </a:bodyPr>
         <a:lstStyle/>
         <a:p>
-          <a:pPr marL="0" lvl="0" indent="0" algn="ctr" defTabSz="711200">
+          <a:pPr lvl="0" algn="ctr" defTabSz="711200">
             <a:lnSpc>
               <a:spcPct val="90000"/>
             </a:lnSpc>
@@ -3428,7 +3679,6 @@
             <a:spcAft>
               <a:spcPct val="35000"/>
             </a:spcAft>
-            <a:buNone/>
           </a:pPr>
           <a:r>
             <a:rPr lang="es-AR" sz="1600" kern="1200" dirty="0"/>
@@ -3570,7 +3820,7 @@
         </a:bodyPr>
         <a:lstStyle/>
         <a:p>
-          <a:pPr marL="0" lvl="0" indent="0" algn="ctr" defTabSz="711200">
+          <a:pPr lvl="0" algn="ctr" defTabSz="711200">
             <a:lnSpc>
               <a:spcPct val="90000"/>
             </a:lnSpc>
@@ -3580,7 +3830,6 @@
             <a:spcAft>
               <a:spcPct val="35000"/>
             </a:spcAft>
-            <a:buNone/>
           </a:pPr>
           <a:endParaRPr lang="es-AR" sz="1600" kern="1200" dirty="0"/>
         </a:p>
@@ -3713,7 +3962,7 @@
         </a:bodyPr>
         <a:lstStyle/>
         <a:p>
-          <a:pPr marL="0" lvl="0" indent="0" algn="ctr" defTabSz="711200">
+          <a:pPr lvl="0" algn="ctr" defTabSz="711200">
             <a:lnSpc>
               <a:spcPct val="90000"/>
             </a:lnSpc>
@@ -3723,7 +3972,6 @@
             <a:spcAft>
               <a:spcPct val="35000"/>
             </a:spcAft>
-            <a:buNone/>
           </a:pPr>
           <a:r>
             <a:rPr lang="es-AR" sz="1600" kern="1200" dirty="0"/>
@@ -3865,7 +4113,7 @@
         </a:bodyPr>
         <a:lstStyle/>
         <a:p>
-          <a:pPr marL="0" lvl="0" indent="0" algn="ctr" defTabSz="711200">
+          <a:pPr lvl="0" algn="ctr" defTabSz="711200">
             <a:lnSpc>
               <a:spcPct val="90000"/>
             </a:lnSpc>
@@ -3875,7 +4123,6 @@
             <a:spcAft>
               <a:spcPct val="35000"/>
             </a:spcAft>
-            <a:buNone/>
           </a:pPr>
           <a:r>
             <a:rPr lang="es-AR" sz="1600" kern="1200" dirty="0"/>
@@ -4017,7 +4264,7 @@
         </a:bodyPr>
         <a:lstStyle/>
         <a:p>
-          <a:pPr marL="0" lvl="0" indent="0" algn="ctr" defTabSz="711200">
+          <a:pPr lvl="0" algn="ctr" defTabSz="711200">
             <a:lnSpc>
               <a:spcPct val="90000"/>
             </a:lnSpc>
@@ -4027,7 +4274,6 @@
             <a:spcAft>
               <a:spcPct val="35000"/>
             </a:spcAft>
-            <a:buNone/>
           </a:pPr>
           <a:r>
             <a:rPr lang="es-AR" sz="1600" kern="1200" dirty="0"/>
@@ -4169,7 +4415,7 @@
         </a:bodyPr>
         <a:lstStyle/>
         <a:p>
-          <a:pPr marL="0" lvl="0" indent="0" algn="ctr" defTabSz="711200">
+          <a:pPr lvl="0" algn="ctr" defTabSz="711200">
             <a:lnSpc>
               <a:spcPct val="90000"/>
             </a:lnSpc>
@@ -4179,7 +4425,6 @@
             <a:spcAft>
               <a:spcPct val="35000"/>
             </a:spcAft>
-            <a:buNone/>
           </a:pPr>
           <a:r>
             <a:rPr lang="es-AR" sz="1600" kern="1200" dirty="0"/>
@@ -4321,7 +4566,7 @@
         </a:bodyPr>
         <a:lstStyle/>
         <a:p>
-          <a:pPr marL="0" lvl="0" indent="0" algn="ctr" defTabSz="711200">
+          <a:pPr lvl="0" algn="ctr" defTabSz="711200">
             <a:lnSpc>
               <a:spcPct val="90000"/>
             </a:lnSpc>
@@ -4331,7 +4576,6 @@
             <a:spcAft>
               <a:spcPct val="35000"/>
             </a:spcAft>
-            <a:buNone/>
           </a:pPr>
           <a:r>
             <a:rPr lang="es-AR" sz="1600" kern="1200" dirty="0"/>
@@ -4467,7 +4711,7 @@
         </a:bodyPr>
         <a:lstStyle/>
         <a:p>
-          <a:pPr marL="0" lvl="0" indent="0" algn="ctr" defTabSz="711200">
+          <a:pPr lvl="0" algn="ctr" defTabSz="711200">
             <a:lnSpc>
               <a:spcPct val="90000"/>
             </a:lnSpc>
@@ -4477,7 +4721,6 @@
             <a:spcAft>
               <a:spcPct val="35000"/>
             </a:spcAft>
-            <a:buNone/>
           </a:pPr>
           <a:r>
             <a:rPr lang="es-AR" sz="1600" kern="1200" dirty="0"/>
@@ -4619,7 +4862,7 @@
         </a:bodyPr>
         <a:lstStyle/>
         <a:p>
-          <a:pPr marL="0" lvl="0" indent="0" algn="ctr" defTabSz="711200">
+          <a:pPr lvl="0" algn="ctr" defTabSz="711200">
             <a:lnSpc>
               <a:spcPct val="90000"/>
             </a:lnSpc>
@@ -4629,7 +4872,6 @@
             <a:spcAft>
               <a:spcPct val="35000"/>
             </a:spcAft>
-            <a:buNone/>
           </a:pPr>
           <a:endParaRPr lang="es-AR" sz="1600" kern="1200" dirty="0"/>
         </a:p>
@@ -4762,7 +5004,7 @@
         </a:bodyPr>
         <a:lstStyle/>
         <a:p>
-          <a:pPr marL="0" lvl="0" indent="0" algn="ctr" defTabSz="711200">
+          <a:pPr lvl="0" algn="ctr" defTabSz="711200">
             <a:lnSpc>
               <a:spcPct val="90000"/>
             </a:lnSpc>
@@ -4772,7 +5014,6 @@
             <a:spcAft>
               <a:spcPct val="35000"/>
             </a:spcAft>
-            <a:buNone/>
           </a:pPr>
           <a:r>
             <a:rPr lang="es-AR" sz="1600" kern="1200" dirty="0"/>
@@ -14251,8 +14492,13 @@
             <a:pPr algn="l"/>
             <a:r>
               <a:rPr lang="es-AR" dirty="0"/>
-              <a:t> Fernández Lucero - </a:t>
-            </a:r>
+              <a:t> Fernández Lucero </a:t>
+            </a:r>
+            <a:r>
+              <a:rPr lang="es-AR" dirty="0" smtClean="0"/>
+              <a:t>- 57485 </a:t>
+            </a:r>
+            <a:endParaRPr lang="es-AR" dirty="0"/>
           </a:p>
           <a:p>
             <a:pPr algn="l"/>
@@ -14267,6 +14513,11 @@
               <a:rPr lang="es-AR" dirty="0"/>
               <a:t>Vijande Ezequiel - </a:t>
             </a:r>
+            <a:r>
+              <a:rPr lang="es-AR" dirty="0" smtClean="0"/>
+              <a:t>58057</a:t>
+            </a:r>
+            <a:endParaRPr lang="es-AR" dirty="0"/>
           </a:p>
           <a:p>
             <a:pPr algn="l"/>
@@ -14312,6 +14563,270 @@
           <p:cNvPr id="2" name="Título 1">
             <a:extLst>
               <a:ext uri="{FF2B5EF4-FFF2-40B4-BE49-F238E27FC236}">
+                <a16:creationId xmlns:a16="http://schemas.microsoft.com/office/drawing/2014/main" id="{3F20709D-0300-4B42-A52F-125BFA015466}"/>
+              </a:ext>
+            </a:extLst>
+          </p:cNvPr>
+          <p:cNvSpPr>
+            <a:spLocks noGrp="1"/>
+          </p:cNvSpPr>
+          <p:nvPr>
+            <p:ph type="title"/>
+          </p:nvPr>
+        </p:nvSpPr>
+        <p:spPr/>
+        <p:txBody>
+          <a:bodyPr/>
+          <a:lstStyle/>
+          <a:p>
+            <a:r>
+              <a:rPr lang="es-AR" dirty="0"/>
+              <a:t>Lector de banda magnética</a:t>
+            </a:r>
+          </a:p>
+        </p:txBody>
+      </p:sp>
+      <p:sp>
+        <p:nvSpPr>
+          <p:cNvPr id="3" name="CuadroTexto 2">
+            <a:extLst>
+              <a:ext uri="{FF2B5EF4-FFF2-40B4-BE49-F238E27FC236}">
+                <a16:creationId xmlns:a16="http://schemas.microsoft.com/office/drawing/2014/main" id="{06122CE4-8D87-4F1D-B88E-98C5F2F84CA3}"/>
+              </a:ext>
+            </a:extLst>
+          </p:cNvPr>
+          <p:cNvSpPr txBox="1"/>
+          <p:nvPr/>
+        </p:nvSpPr>
+        <p:spPr>
+          <a:xfrm>
+            <a:off x="521294" y="2199860"/>
+            <a:ext cx="11149412" cy="4185761"/>
+          </a:xfrm>
+          <a:prstGeom prst="rect">
+            <a:avLst/>
+          </a:prstGeom>
+          <a:noFill/>
+        </p:spPr>
+        <p:txBody>
+          <a:bodyPr wrap="square" rtlCol="0">
+            <a:spAutoFit/>
+          </a:bodyPr>
+          <a:lstStyle/>
+          <a:p>
+            <a:r>
+              <a:rPr lang="es-AR" sz="3200" dirty="0"/>
+              <a:t>Interrupciones del MCU:</a:t>
+            </a:r>
+          </a:p>
+          <a:p>
+            <a:r>
+              <a:rPr lang="es-AR" sz="2400" dirty="0"/>
+              <a:t>Enable – flanco ascendente: Se habilita clock, se comienza lectura.</a:t>
+            </a:r>
+          </a:p>
+          <a:p>
+            <a:r>
+              <a:rPr lang="es-AR" sz="2400" dirty="0"/>
+              <a:t>(x useg de duración)</a:t>
+            </a:r>
+          </a:p>
+          <a:p>
+            <a:endParaRPr lang="es-AR" sz="2400" dirty="0"/>
+          </a:p>
+          <a:p>
+            <a:r>
+              <a:rPr lang="es-AR" sz="2400" dirty="0"/>
+              <a:t>Clock – flanco descendente: Se lee pin de datos y se guardan en un buffer.</a:t>
+            </a:r>
+          </a:p>
+          <a:p>
+            <a:r>
+              <a:rPr lang="es-AR" sz="2400" dirty="0"/>
+              <a:t>(x useg de duración)</a:t>
+            </a:r>
+          </a:p>
+          <a:p>
+            <a:endParaRPr lang="es-AR" sz="2400" dirty="0"/>
+          </a:p>
+          <a:p>
+            <a:r>
+              <a:rPr lang="es-AR" sz="2400" dirty="0"/>
+              <a:t>Enable – flanco descendente: Se deshabilita clock, finaliza lectura, se genera un evento (lectureEvent).</a:t>
+            </a:r>
+          </a:p>
+          <a:p>
+            <a:r>
+              <a:rPr lang="es-AR" sz="2400" dirty="0"/>
+              <a:t>(x useg de duración)</a:t>
+            </a:r>
+          </a:p>
+          <a:p>
+            <a:endParaRPr lang="es-AR" dirty="0"/>
+          </a:p>
+        </p:txBody>
+      </p:sp>
+    </p:spTree>
+    <p:extLst>
+      <p:ext uri="{BB962C8B-B14F-4D97-AF65-F5344CB8AC3E}">
+        <p14:creationId xmlns:p14="http://schemas.microsoft.com/office/powerpoint/2010/main" val="492572831"/>
+      </p:ext>
+    </p:extLst>
+  </p:cSld>
+  <p:clrMapOvr>
+    <a:masterClrMapping/>
+  </p:clrMapOvr>
+</p:sld>
+</file>
+
+<file path=ppt/slides/slide11.xml><?xml version="1.0" encoding="utf-8"?>
+<p:sld xmlns:a="http://schemas.openxmlformats.org/drawingml/2006/main" xmlns:r="http://schemas.openxmlformats.org/officeDocument/2006/relationships" xmlns:p="http://schemas.openxmlformats.org/presentationml/2006/main">
+  <p:cSld>
+    <p:spTree>
+      <p:nvGrpSpPr>
+        <p:cNvPr id="1" name=""/>
+        <p:cNvGrpSpPr/>
+        <p:nvPr/>
+      </p:nvGrpSpPr>
+      <p:grpSpPr>
+        <a:xfrm>
+          <a:off x="0" y="0"/>
+          <a:ext cx="0" cy="0"/>
+          <a:chOff x="0" y="0"/>
+          <a:chExt cx="0" cy="0"/>
+        </a:xfrm>
+      </p:grpSpPr>
+      <p:sp>
+        <p:nvSpPr>
+          <p:cNvPr id="2" name="Título 1">
+            <a:extLst>
+              <a:ext uri="{FF2B5EF4-FFF2-40B4-BE49-F238E27FC236}">
+                <a16:creationId xmlns:a16="http://schemas.microsoft.com/office/drawing/2014/main" id="{FA540032-3C3F-44CF-B0F2-6BA666FE84E9}"/>
+              </a:ext>
+            </a:extLst>
+          </p:cNvPr>
+          <p:cNvSpPr>
+            <a:spLocks noGrp="1"/>
+          </p:cNvSpPr>
+          <p:nvPr>
+            <p:ph type="title"/>
+          </p:nvPr>
+        </p:nvSpPr>
+        <p:spPr/>
+        <p:txBody>
+          <a:bodyPr/>
+          <a:lstStyle/>
+          <a:p>
+            <a:r>
+              <a:rPr lang="es-AR" dirty="0"/>
+              <a:t>Lectura de banda magnética</a:t>
+            </a:r>
+          </a:p>
+        </p:txBody>
+      </p:sp>
+      <p:sp>
+        <p:nvSpPr>
+          <p:cNvPr id="3" name="CuadroTexto 2">
+            <a:extLst>
+              <a:ext uri="{FF2B5EF4-FFF2-40B4-BE49-F238E27FC236}">
+                <a16:creationId xmlns:a16="http://schemas.microsoft.com/office/drawing/2014/main" id="{633E9794-5113-453A-AFC1-6806F2A76A5A}"/>
+              </a:ext>
+            </a:extLst>
+          </p:cNvPr>
+          <p:cNvSpPr txBox="1"/>
+          <p:nvPr/>
+        </p:nvSpPr>
+        <p:spPr>
+          <a:xfrm>
+            <a:off x="530087" y="2319130"/>
+            <a:ext cx="10866783" cy="3908762"/>
+          </a:xfrm>
+          <a:prstGeom prst="rect">
+            <a:avLst/>
+          </a:prstGeom>
+          <a:noFill/>
+        </p:spPr>
+        <p:txBody>
+          <a:bodyPr wrap="square" rtlCol="0">
+            <a:spAutoFit/>
+          </a:bodyPr>
+          <a:lstStyle/>
+          <a:p>
+            <a:r>
+              <a:rPr lang="es-AR" sz="3200" dirty="0"/>
+              <a:t>Manejo de evento de lectura:</a:t>
+            </a:r>
+          </a:p>
+          <a:p>
+            <a:r>
+              <a:rPr lang="es-AR" sz="2400" dirty="0"/>
+              <a:t>Ante la generación de este tipo de evento, se guarda el mismo en una cola.</a:t>
+            </a:r>
+          </a:p>
+          <a:p>
+            <a:endParaRPr lang="es-AR" sz="2400" dirty="0"/>
+          </a:p>
+          <a:p>
+            <a:r>
+              <a:rPr lang="es-AR" sz="2400" dirty="0"/>
+              <a:t>Una “APP” puede indicar que se extraiga un evento de la cola</a:t>
+            </a:r>
+          </a:p>
+          <a:p>
+            <a:endParaRPr lang="es-AR" sz="2400" dirty="0"/>
+          </a:p>
+          <a:p>
+            <a:r>
+              <a:rPr lang="es-AR" sz="2400" dirty="0"/>
+              <a:t>Al extraer el evento de la cola (cuyo contenido es una serie de 1s o 0s), este es decodificado según los estándares especificados de tarjetas magnéticas</a:t>
+            </a:r>
+          </a:p>
+          <a:p>
+            <a:endParaRPr lang="es-AR" sz="2400" dirty="0"/>
+          </a:p>
+          <a:p>
+            <a:r>
+              <a:rPr lang="es-AR" sz="2400" dirty="0"/>
+              <a:t>Finalmente, la APP tiene a su disposición una PALABRA decodificada (y separada en campos según el standard) , y la validez de esta palabra.</a:t>
+            </a:r>
+          </a:p>
+        </p:txBody>
+      </p:sp>
+    </p:spTree>
+    <p:extLst>
+      <p:ext uri="{BB962C8B-B14F-4D97-AF65-F5344CB8AC3E}">
+        <p14:creationId xmlns:p14="http://schemas.microsoft.com/office/powerpoint/2010/main" val="1530338545"/>
+      </p:ext>
+    </p:extLst>
+  </p:cSld>
+  <p:clrMapOvr>
+    <a:masterClrMapping/>
+  </p:clrMapOvr>
+</p:sld>
+</file>
+
+<file path=ppt/slides/slide12.xml><?xml version="1.0" encoding="utf-8"?>
+<p:sld xmlns:a="http://schemas.openxmlformats.org/drawingml/2006/main" xmlns:r="http://schemas.openxmlformats.org/officeDocument/2006/relationships" xmlns:p="http://schemas.openxmlformats.org/presentationml/2006/main">
+  <p:cSld>
+    <p:spTree>
+      <p:nvGrpSpPr>
+        <p:cNvPr id="1" name=""/>
+        <p:cNvGrpSpPr/>
+        <p:nvPr/>
+      </p:nvGrpSpPr>
+      <p:grpSpPr>
+        <a:xfrm>
+          <a:off x="0" y="0"/>
+          <a:ext cx="0" cy="0"/>
+          <a:chOff x="0" y="0"/>
+          <a:chExt cx="0" cy="0"/>
+        </a:xfrm>
+      </p:grpSpPr>
+      <p:sp>
+        <p:nvSpPr>
+          <p:cNvPr id="2" name="Título 1">
+            <a:extLst>
+              <a:ext uri="{FF2B5EF4-FFF2-40B4-BE49-F238E27FC236}">
                 <a16:creationId xmlns:a16="http://schemas.microsoft.com/office/drawing/2014/main" id="{31B5D5F5-0C93-4318-9806-DB700321A128}"/>
               </a:ext>
             </a:extLst>
@@ -14413,7 +14928,7 @@
 </p:sld>
 </file>
 
-<file path=ppt/slides/slide11.xml><?xml version="1.0" encoding="utf-8"?>
+<file path=ppt/slides/slide13.xml><?xml version="1.0" encoding="utf-8"?>
 <p:sld xmlns:a="http://schemas.openxmlformats.org/drawingml/2006/main" xmlns:r="http://schemas.openxmlformats.org/officeDocument/2006/relationships" xmlns:p="http://schemas.openxmlformats.org/presentationml/2006/main">
   <p:cSld>
     <p:spTree>
@@ -14530,7 +15045,7 @@
 </p:sld>
 </file>
 
-<file path=ppt/slides/slide12.xml><?xml version="1.0" encoding="utf-8"?>
+<file path=ppt/slides/slide14.xml><?xml version="1.0" encoding="utf-8"?>
 <p:sld xmlns:a="http://schemas.openxmlformats.org/drawingml/2006/main" xmlns:r="http://schemas.openxmlformats.org/officeDocument/2006/relationships" xmlns:p="http://schemas.openxmlformats.org/presentationml/2006/main">
   <p:cSld>
     <p:spTree>
@@ -14807,6 +15322,290 @@
           </a:p>
         </p:txBody>
       </p:sp>
+      <p:sp>
+        <p:nvSpPr>
+          <p:cNvPr id="3" name="CuadroTexto 2"/>
+          <p:cNvSpPr txBox="1"/>
+          <p:nvPr/>
+        </p:nvSpPr>
+        <p:spPr>
+          <a:xfrm>
+            <a:off x="117567" y="2364773"/>
+            <a:ext cx="5943976" cy="3970318"/>
+          </a:xfrm>
+          <a:prstGeom prst="rect">
+            <a:avLst/>
+          </a:prstGeom>
+          <a:noFill/>
+        </p:spPr>
+        <p:txBody>
+          <a:bodyPr wrap="square" rtlCol="0">
+            <a:spAutoFit/>
+          </a:bodyPr>
+          <a:lstStyle/>
+          <a:p>
+            <a:r>
+              <a:rPr lang="en-CA" dirty="0" smtClean="0"/>
+              <a:t>Para la </a:t>
+            </a:r>
+            <a:r>
+              <a:rPr lang="en-CA" dirty="0" err="1" smtClean="0"/>
+              <a:t>realizacion</a:t>
+            </a:r>
+            <a:r>
+              <a:rPr lang="en-CA" dirty="0" smtClean="0"/>
+              <a:t> del display se </a:t>
+            </a:r>
+            <a:r>
+              <a:rPr lang="en-CA" dirty="0" err="1" smtClean="0"/>
+              <a:t>utilizaron</a:t>
+            </a:r>
+            <a:r>
+              <a:rPr lang="en-CA" dirty="0" smtClean="0"/>
+              <a:t> 3 </a:t>
+            </a:r>
+            <a:r>
+              <a:rPr lang="en-CA" dirty="0" err="1" smtClean="0"/>
+              <a:t>modulos</a:t>
+            </a:r>
+            <a:r>
+              <a:rPr lang="en-CA" dirty="0" smtClean="0"/>
+              <a:t>.</a:t>
+            </a:r>
+          </a:p>
+          <a:p>
+            <a:endParaRPr lang="en-CA" dirty="0"/>
+          </a:p>
+          <a:p>
+            <a:endParaRPr lang="en-CA" dirty="0" smtClean="0"/>
+          </a:p>
+          <a:p>
+            <a:pPr marL="285750" indent="-285750">
+              <a:buFont typeface="Arial" panose="020B0604020202020204" pitchFamily="34" charset="0"/>
+              <a:buChar char="•"/>
+            </a:pPr>
+            <a:r>
+              <a:rPr lang="en-CA" dirty="0" smtClean="0"/>
+              <a:t>El modulo display se </a:t>
+            </a:r>
+            <a:r>
+              <a:rPr lang="en-CA" dirty="0" err="1" smtClean="0"/>
+              <a:t>ocupa</a:t>
+            </a:r>
+            <a:r>
+              <a:rPr lang="en-CA" dirty="0" smtClean="0"/>
+              <a:t> de </a:t>
+            </a:r>
+            <a:r>
+              <a:rPr lang="en-CA" dirty="0" err="1" smtClean="0"/>
+              <a:t>imprimir</a:t>
+            </a:r>
+            <a:r>
+              <a:rPr lang="en-CA" dirty="0" smtClean="0"/>
+              <a:t> </a:t>
+            </a:r>
+            <a:r>
+              <a:rPr lang="en-CA" dirty="0" err="1" smtClean="0"/>
+              <a:t>mensajes</a:t>
+            </a:r>
+            <a:endParaRPr lang="en-CA" dirty="0" smtClean="0"/>
+          </a:p>
+          <a:p>
+            <a:r>
+              <a:rPr lang="en-CA" dirty="0" smtClean="0"/>
+              <a:t>Sin importer el hardware </a:t>
+            </a:r>
+            <a:r>
+              <a:rPr lang="en-CA" dirty="0" err="1" smtClean="0"/>
+              <a:t>utilzado</a:t>
+            </a:r>
+            <a:r>
+              <a:rPr lang="en-CA" dirty="0" smtClean="0"/>
+              <a:t>.</a:t>
+            </a:r>
+          </a:p>
+          <a:p>
+            <a:endParaRPr lang="en-CA" dirty="0"/>
+          </a:p>
+          <a:p>
+            <a:endParaRPr lang="en-CA" dirty="0" smtClean="0"/>
+          </a:p>
+          <a:p>
+            <a:pPr marL="285750" indent="-285750">
+              <a:buFont typeface="Arial" panose="020B0604020202020204" pitchFamily="34" charset="0"/>
+              <a:buChar char="•"/>
+            </a:pPr>
+            <a:r>
+              <a:rPr lang="en-CA" dirty="0" smtClean="0"/>
+              <a:t>El modulo </a:t>
+            </a:r>
+            <a:r>
+              <a:rPr lang="en-CA" dirty="0" err="1" smtClean="0"/>
+              <a:t>SegmentDisplay</a:t>
+            </a:r>
+            <a:r>
+              <a:rPr lang="en-CA" dirty="0" smtClean="0"/>
+              <a:t> </a:t>
+            </a:r>
+            <a:r>
+              <a:rPr lang="en-CA" dirty="0" err="1" smtClean="0"/>
+              <a:t>funciona</a:t>
+            </a:r>
+            <a:r>
+              <a:rPr lang="en-CA" dirty="0" smtClean="0"/>
+              <a:t> </a:t>
+            </a:r>
+            <a:r>
+              <a:rPr lang="en-CA" dirty="0" err="1" smtClean="0"/>
+              <a:t>como</a:t>
+            </a:r>
+            <a:r>
+              <a:rPr lang="en-CA" dirty="0" smtClean="0"/>
+              <a:t> driver que </a:t>
+            </a:r>
+            <a:r>
+              <a:rPr lang="en-CA" dirty="0" err="1" smtClean="0"/>
+              <a:t>maneja</a:t>
+            </a:r>
+            <a:r>
+              <a:rPr lang="en-CA" dirty="0" smtClean="0"/>
+              <a:t> el display de 7 </a:t>
+            </a:r>
+            <a:r>
+              <a:rPr lang="en-CA" dirty="0" err="1" smtClean="0"/>
+              <a:t>segmentos</a:t>
+            </a:r>
+            <a:r>
+              <a:rPr lang="en-CA" dirty="0" smtClean="0"/>
+              <a:t>  de la </a:t>
+            </a:r>
+            <a:r>
+              <a:rPr lang="en-CA" dirty="0" err="1" smtClean="0"/>
+              <a:t>placa</a:t>
+            </a:r>
+            <a:r>
+              <a:rPr lang="en-CA" dirty="0" smtClean="0"/>
+              <a:t> </a:t>
+            </a:r>
+            <a:r>
+              <a:rPr lang="en-CA" dirty="0" err="1" smtClean="0"/>
+              <a:t>utilizada</a:t>
+            </a:r>
+            <a:r>
+              <a:rPr lang="en-CA" dirty="0" smtClean="0"/>
+              <a:t>.</a:t>
+            </a:r>
+          </a:p>
+          <a:p>
+            <a:endParaRPr lang="en-CA" dirty="0"/>
+          </a:p>
+          <a:p>
+            <a:pPr marL="285750" indent="-285750">
+              <a:buFont typeface="Arial" panose="020B0604020202020204" pitchFamily="34" charset="0"/>
+              <a:buChar char="•"/>
+            </a:pPr>
+            <a:r>
+              <a:rPr lang="en-CA" dirty="0" smtClean="0"/>
+              <a:t>El modulo de Timer se </a:t>
+            </a:r>
+            <a:r>
+              <a:rPr lang="en-CA" dirty="0" err="1" smtClean="0"/>
+              <a:t>utiliza</a:t>
+            </a:r>
+            <a:r>
+              <a:rPr lang="en-CA" dirty="0" smtClean="0"/>
+              <a:t> para </a:t>
+            </a:r>
+            <a:r>
+              <a:rPr lang="en-CA" dirty="0" err="1" smtClean="0"/>
+              <a:t>settear</a:t>
+            </a:r>
+            <a:r>
+              <a:rPr lang="en-CA" dirty="0" smtClean="0"/>
+              <a:t> timers que </a:t>
+            </a:r>
+            <a:r>
+              <a:rPr lang="en-CA" dirty="0" err="1" smtClean="0"/>
+              <a:t>indican</a:t>
+            </a:r>
+            <a:r>
+              <a:rPr lang="en-CA" dirty="0" smtClean="0"/>
+              <a:t> el </a:t>
+            </a:r>
+            <a:r>
+              <a:rPr lang="en-CA" dirty="0" err="1" smtClean="0"/>
+              <a:t>refresco</a:t>
+            </a:r>
+            <a:r>
+              <a:rPr lang="en-CA" dirty="0" smtClean="0"/>
+              <a:t> de la </a:t>
+            </a:r>
+            <a:r>
+              <a:rPr lang="en-CA" dirty="0" err="1" smtClean="0"/>
+              <a:t>imagen</a:t>
+            </a:r>
+            <a:r>
+              <a:rPr lang="en-CA" dirty="0" smtClean="0"/>
+              <a:t> del display, el </a:t>
+            </a:r>
+            <a:r>
+              <a:rPr lang="en-CA" dirty="0" err="1" smtClean="0"/>
+              <a:t>brillo</a:t>
+            </a:r>
+            <a:r>
+              <a:rPr lang="en-CA" dirty="0" smtClean="0"/>
+              <a:t> y el </a:t>
+            </a:r>
+            <a:r>
+              <a:rPr lang="en-CA" dirty="0" err="1" smtClean="0"/>
+              <a:t>movimiento</a:t>
+            </a:r>
+            <a:r>
+              <a:rPr lang="en-CA" dirty="0" smtClean="0"/>
+              <a:t> del </a:t>
+            </a:r>
+            <a:r>
+              <a:rPr lang="en-CA" dirty="0" err="1" smtClean="0"/>
+              <a:t>mensaje</a:t>
+            </a:r>
+            <a:r>
+              <a:rPr lang="en-CA" dirty="0" smtClean="0"/>
+              <a:t>.</a:t>
+            </a:r>
+            <a:endParaRPr lang="en-US" dirty="0"/>
+          </a:p>
+        </p:txBody>
+      </p:sp>
+      <p:pic>
+        <p:nvPicPr>
+          <p:cNvPr id="5" name="Imagen 4"/>
+          <p:cNvPicPr>
+            <a:picLocks noChangeAspect="1"/>
+          </p:cNvPicPr>
+          <p:nvPr/>
+        </p:nvPicPr>
+        <p:blipFill>
+          <a:blip r:embed="rId2">
+            <a:extLst>
+              <a:ext uri="{28A0092B-C50C-407E-A947-70E740481C1C}">
+                <a14:useLocalDpi xmlns:a14="http://schemas.microsoft.com/office/drawing/2010/main" val="0"/>
+              </a:ext>
+            </a:extLst>
+          </a:blip>
+          <a:stretch>
+            <a:fillRect/>
+          </a:stretch>
+        </p:blipFill>
+        <p:spPr>
+          <a:xfrm>
+            <a:off x="6061543" y="2364773"/>
+            <a:ext cx="5839389" cy="4114405"/>
+          </a:xfrm>
+          <a:prstGeom prst="rect">
+            <a:avLst/>
+          </a:prstGeom>
+        </p:spPr>
+      </p:pic>
     </p:spTree>
     <p:extLst>
       <p:ext uri="{BB962C8B-B14F-4D97-AF65-F5344CB8AC3E}">
@@ -14821,6 +15620,369 @@
 </file>
 
 <file path=ppt/slides/slide6.xml><?xml version="1.0" encoding="utf-8"?>
+<p:sld xmlns:a="http://schemas.openxmlformats.org/drawingml/2006/main" xmlns:r="http://schemas.openxmlformats.org/officeDocument/2006/relationships" xmlns:p="http://schemas.openxmlformats.org/presentationml/2006/main">
+  <p:cSld>
+    <p:spTree>
+      <p:nvGrpSpPr>
+        <p:cNvPr id="1" name=""/>
+        <p:cNvGrpSpPr/>
+        <p:nvPr/>
+      </p:nvGrpSpPr>
+      <p:grpSpPr>
+        <a:xfrm>
+          <a:off x="0" y="0"/>
+          <a:ext cx="0" cy="0"/>
+          <a:chOff x="0" y="0"/>
+          <a:chExt cx="0" cy="0"/>
+        </a:xfrm>
+      </p:grpSpPr>
+      <p:sp>
+        <p:nvSpPr>
+          <p:cNvPr id="2" name="Título 1"/>
+          <p:cNvSpPr>
+            <a:spLocks noGrp="1"/>
+          </p:cNvSpPr>
+          <p:nvPr>
+            <p:ph type="title"/>
+          </p:nvPr>
+        </p:nvSpPr>
+        <p:spPr/>
+        <p:txBody>
+          <a:bodyPr/>
+          <a:lstStyle/>
+          <a:p>
+            <a:r>
+              <a:rPr lang="en-CA" dirty="0" smtClean="0"/>
+              <a:t>Display</a:t>
+            </a:r>
+            <a:endParaRPr lang="en-US" dirty="0"/>
+          </a:p>
+        </p:txBody>
+      </p:sp>
+      <p:pic>
+        <p:nvPicPr>
+          <p:cNvPr id="3" name="Imagen 2"/>
+          <p:cNvPicPr>
+            <a:picLocks noChangeAspect="1"/>
+          </p:cNvPicPr>
+          <p:nvPr/>
+        </p:nvPicPr>
+        <p:blipFill>
+          <a:blip r:embed="rId2">
+            <a:extLst>
+              <a:ext uri="{28A0092B-C50C-407E-A947-70E740481C1C}">
+                <a14:useLocalDpi xmlns:a14="http://schemas.microsoft.com/office/drawing/2010/main" val="0"/>
+              </a:ext>
+            </a:extLst>
+          </a:blip>
+          <a:stretch>
+            <a:fillRect/>
+          </a:stretch>
+        </p:blipFill>
+        <p:spPr>
+          <a:xfrm>
+            <a:off x="331932" y="2246811"/>
+            <a:ext cx="11234249" cy="4075611"/>
+          </a:xfrm>
+          <a:prstGeom prst="rect">
+            <a:avLst/>
+          </a:prstGeom>
+        </p:spPr>
+      </p:pic>
+    </p:spTree>
+    <p:extLst>
+      <p:ext uri="{BB962C8B-B14F-4D97-AF65-F5344CB8AC3E}">
+        <p14:creationId xmlns:p14="http://schemas.microsoft.com/office/powerpoint/2010/main" val="1149102232"/>
+      </p:ext>
+    </p:extLst>
+  </p:cSld>
+  <p:clrMapOvr>
+    <a:masterClrMapping/>
+  </p:clrMapOvr>
+</p:sld>
+</file>
+
+<file path=ppt/slides/slide7.xml><?xml version="1.0" encoding="utf-8"?>
+<p:sld xmlns:a="http://schemas.openxmlformats.org/drawingml/2006/main" xmlns:r="http://schemas.openxmlformats.org/officeDocument/2006/relationships" xmlns:p="http://schemas.openxmlformats.org/presentationml/2006/main">
+  <p:cSld>
+    <p:spTree>
+      <p:nvGrpSpPr>
+        <p:cNvPr id="1" name=""/>
+        <p:cNvGrpSpPr/>
+        <p:nvPr/>
+      </p:nvGrpSpPr>
+      <p:grpSpPr>
+        <a:xfrm>
+          <a:off x="0" y="0"/>
+          <a:ext cx="0" cy="0"/>
+          <a:chOff x="0" y="0"/>
+          <a:chExt cx="0" cy="0"/>
+        </a:xfrm>
+      </p:grpSpPr>
+      <p:sp>
+        <p:nvSpPr>
+          <p:cNvPr id="2" name="Título 1"/>
+          <p:cNvSpPr>
+            <a:spLocks noGrp="1"/>
+          </p:cNvSpPr>
+          <p:nvPr>
+            <p:ph type="title"/>
+          </p:nvPr>
+        </p:nvSpPr>
+        <p:spPr/>
+        <p:txBody>
+          <a:bodyPr/>
+          <a:lstStyle/>
+          <a:p>
+            <a:r>
+              <a:rPr lang="en-CA" dirty="0" err="1" smtClean="0"/>
+              <a:t>SegmentDisplay</a:t>
+            </a:r>
+            <a:endParaRPr lang="en-US" dirty="0"/>
+          </a:p>
+        </p:txBody>
+      </p:sp>
+      <p:sp>
+        <p:nvSpPr>
+          <p:cNvPr id="4" name="CuadroTexto 3"/>
+          <p:cNvSpPr txBox="1"/>
+          <p:nvPr/>
+        </p:nvSpPr>
+        <p:spPr>
+          <a:xfrm>
+            <a:off x="1254033" y="3756349"/>
+            <a:ext cx="8908870" cy="2585323"/>
+          </a:xfrm>
+          <a:prstGeom prst="rect">
+            <a:avLst/>
+          </a:prstGeom>
+          <a:noFill/>
+        </p:spPr>
+        <p:txBody>
+          <a:bodyPr wrap="square" rtlCol="0">
+            <a:spAutoFit/>
+          </a:bodyPr>
+          <a:lstStyle/>
+          <a:p>
+            <a:pPr marL="285750" indent="-285750" algn="ctr">
+              <a:buFont typeface="Arial" panose="020B0604020202020204" pitchFamily="34" charset="0"/>
+              <a:buChar char="•"/>
+            </a:pPr>
+            <a:r>
+              <a:rPr lang="en-CA" dirty="0" err="1" smtClean="0"/>
+              <a:t>Es</a:t>
+            </a:r>
+            <a:r>
+              <a:rPr lang="en-CA" dirty="0" smtClean="0"/>
+              <a:t> particular del hardware.</a:t>
+            </a:r>
+          </a:p>
+          <a:p>
+            <a:endParaRPr lang="en-CA" dirty="0" smtClean="0"/>
+          </a:p>
+          <a:p>
+            <a:pPr marL="285750" indent="-285750" algn="ctr">
+              <a:buFont typeface="Arial" panose="020B0604020202020204" pitchFamily="34" charset="0"/>
+              <a:buChar char="•"/>
+            </a:pPr>
+            <a:r>
+              <a:rPr lang="en-CA" dirty="0" err="1" smtClean="0"/>
+              <a:t>Maneja</a:t>
+            </a:r>
+            <a:r>
+              <a:rPr lang="en-CA" dirty="0" smtClean="0"/>
+              <a:t> pins GPIO del </a:t>
+            </a:r>
+            <a:r>
+              <a:rPr lang="en-CA" dirty="0" err="1" smtClean="0"/>
+              <a:t>MicroControlador</a:t>
+            </a:r>
+            <a:r>
+              <a:rPr lang="en-CA" dirty="0" smtClean="0"/>
+              <a:t> para </a:t>
+            </a:r>
+            <a:r>
+              <a:rPr lang="en-CA" dirty="0" err="1" smtClean="0"/>
+              <a:t>actualizar</a:t>
+            </a:r>
+            <a:r>
+              <a:rPr lang="en-CA" dirty="0" smtClean="0"/>
+              <a:t> la </a:t>
+            </a:r>
+            <a:r>
+              <a:rPr lang="en-CA" dirty="0" err="1" smtClean="0"/>
+              <a:t>linea</a:t>
+            </a:r>
+            <a:r>
+              <a:rPr lang="en-CA" dirty="0" smtClean="0"/>
+              <a:t> de </a:t>
+            </a:r>
+            <a:r>
+              <a:rPr lang="en-CA" dirty="0" err="1" smtClean="0"/>
+              <a:t>seleccion</a:t>
+            </a:r>
+            <a:r>
+              <a:rPr lang="en-CA" dirty="0" smtClean="0"/>
+              <a:t> del decoder y el valor de </a:t>
+            </a:r>
+            <a:r>
+              <a:rPr lang="en-CA" dirty="0" err="1" smtClean="0"/>
+              <a:t>cada</a:t>
+            </a:r>
+            <a:r>
+              <a:rPr lang="en-CA" dirty="0" smtClean="0"/>
+              <a:t> </a:t>
+            </a:r>
+            <a:r>
+              <a:rPr lang="en-CA" dirty="0" err="1" smtClean="0"/>
+              <a:t>segmento</a:t>
+            </a:r>
+            <a:r>
+              <a:rPr lang="en-CA" dirty="0" smtClean="0"/>
+              <a:t>.</a:t>
+            </a:r>
+          </a:p>
+          <a:p>
+            <a:endParaRPr lang="en-CA" dirty="0"/>
+          </a:p>
+          <a:p>
+            <a:pPr marL="285750" indent="-285750" algn="ctr">
+              <a:buFont typeface="Arial" panose="020B0604020202020204" pitchFamily="34" charset="0"/>
+              <a:buChar char="•"/>
+            </a:pPr>
+            <a:r>
+              <a:rPr lang="en-CA" dirty="0" err="1" smtClean="0"/>
+              <a:t>Guarda</a:t>
+            </a:r>
+            <a:r>
+              <a:rPr lang="en-CA" dirty="0" smtClean="0"/>
+              <a:t> dos </a:t>
+            </a:r>
+            <a:r>
+              <a:rPr lang="en-CA" dirty="0" err="1" smtClean="0"/>
+              <a:t>arreglos</a:t>
+            </a:r>
+            <a:r>
+              <a:rPr lang="en-CA" dirty="0" smtClean="0"/>
+              <a:t> </a:t>
+            </a:r>
+            <a:r>
+              <a:rPr lang="en-CA" dirty="0" err="1" smtClean="0"/>
+              <a:t>en</a:t>
+            </a:r>
+            <a:r>
+              <a:rPr lang="en-CA" dirty="0" smtClean="0"/>
+              <a:t> </a:t>
+            </a:r>
+            <a:r>
+              <a:rPr lang="en-CA" dirty="0" err="1" smtClean="0"/>
+              <a:t>memoria</a:t>
+            </a:r>
+            <a:r>
+              <a:rPr lang="en-CA" dirty="0" smtClean="0"/>
+              <a:t> con </a:t>
+            </a:r>
+            <a:r>
+              <a:rPr lang="en-CA" dirty="0" err="1" smtClean="0"/>
+              <a:t>los</a:t>
+            </a:r>
+            <a:r>
+              <a:rPr lang="en-CA" dirty="0" smtClean="0"/>
+              <a:t> </a:t>
+            </a:r>
+            <a:r>
+              <a:rPr lang="en-CA" dirty="0" err="1" smtClean="0"/>
+              <a:t>valores</a:t>
+            </a:r>
+            <a:r>
+              <a:rPr lang="en-CA" dirty="0" smtClean="0"/>
+              <a:t> </a:t>
+            </a:r>
+            <a:r>
+              <a:rPr lang="en-CA" dirty="0" err="1" smtClean="0"/>
+              <a:t>hexadecimales</a:t>
+            </a:r>
+            <a:r>
+              <a:rPr lang="en-CA" dirty="0" smtClean="0"/>
+              <a:t> </a:t>
+            </a:r>
+            <a:r>
+              <a:rPr lang="en-CA" dirty="0" err="1" smtClean="0"/>
+              <a:t>correspondientes</a:t>
+            </a:r>
+            <a:r>
+              <a:rPr lang="en-CA" dirty="0" smtClean="0"/>
+              <a:t> a </a:t>
+            </a:r>
+            <a:r>
+              <a:rPr lang="en-CA" dirty="0" err="1" smtClean="0"/>
+              <a:t>cada</a:t>
+            </a:r>
+            <a:r>
+              <a:rPr lang="en-CA" dirty="0" smtClean="0"/>
+              <a:t> </a:t>
+            </a:r>
+            <a:r>
+              <a:rPr lang="en-CA" dirty="0" err="1" smtClean="0"/>
+              <a:t>digito</a:t>
+            </a:r>
+            <a:r>
+              <a:rPr lang="en-CA" dirty="0" smtClean="0"/>
+              <a:t>.</a:t>
+            </a:r>
+          </a:p>
+          <a:p>
+            <a:endParaRPr lang="en-CA" dirty="0"/>
+          </a:p>
+          <a:p>
+            <a:endParaRPr lang="en-US" dirty="0"/>
+          </a:p>
+        </p:txBody>
+      </p:sp>
+      <p:pic>
+        <p:nvPicPr>
+          <p:cNvPr id="5" name="Imagen 4"/>
+          <p:cNvPicPr>
+            <a:picLocks noChangeAspect="1"/>
+          </p:cNvPicPr>
+          <p:nvPr/>
+        </p:nvPicPr>
+        <p:blipFill>
+          <a:blip r:embed="rId2">
+            <a:extLst>
+              <a:ext uri="{28A0092B-C50C-407E-A947-70E740481C1C}">
+                <a14:useLocalDpi xmlns:a14="http://schemas.microsoft.com/office/drawing/2010/main" val="0"/>
+              </a:ext>
+            </a:extLst>
+          </a:blip>
+          <a:stretch>
+            <a:fillRect/>
+          </a:stretch>
+        </p:blipFill>
+        <p:spPr>
+          <a:xfrm>
+            <a:off x="1537774" y="2161244"/>
+            <a:ext cx="8341387" cy="1491651"/>
+          </a:xfrm>
+          <a:prstGeom prst="rect">
+            <a:avLst/>
+          </a:prstGeom>
+        </p:spPr>
+      </p:pic>
+    </p:spTree>
+    <p:extLst>
+      <p:ext uri="{BB962C8B-B14F-4D97-AF65-F5344CB8AC3E}">
+        <p14:creationId xmlns:p14="http://schemas.microsoft.com/office/powerpoint/2010/main" val="2204560017"/>
+      </p:ext>
+    </p:extLst>
+  </p:cSld>
+  <p:clrMapOvr>
+    <a:masterClrMapping/>
+  </p:clrMapOvr>
+</p:sld>
+</file>
+
+<file path=ppt/slides/slide8.xml><?xml version="1.0" encoding="utf-8"?>
 <p:sld xmlns:a="http://schemas.openxmlformats.org/drawingml/2006/main" xmlns:r="http://schemas.openxmlformats.org/officeDocument/2006/relationships" xmlns:p="http://schemas.openxmlformats.org/presentationml/2006/main">
   <p:cSld>
     <p:spTree>
@@ -14878,7 +16040,7 @@
 </p:sld>
 </file>
 
-<file path=ppt/slides/slide7.xml><?xml version="1.0" encoding="utf-8"?>
+<file path=ppt/slides/slide9.xml><?xml version="1.0" encoding="utf-8"?>
 <p:sld xmlns:a="http://schemas.openxmlformats.org/drawingml/2006/main" xmlns:r="http://schemas.openxmlformats.org/officeDocument/2006/relationships" xmlns:p="http://schemas.openxmlformats.org/presentationml/2006/main">
   <p:cSld>
     <p:spTree>
@@ -14986,270 +16148,6 @@
     <p:extLst>
       <p:ext uri="{BB962C8B-B14F-4D97-AF65-F5344CB8AC3E}">
         <p14:creationId xmlns:p14="http://schemas.microsoft.com/office/powerpoint/2010/main" val="704384881"/>
-      </p:ext>
-    </p:extLst>
-  </p:cSld>
-  <p:clrMapOvr>
-    <a:masterClrMapping/>
-  </p:clrMapOvr>
-</p:sld>
-</file>
-
-<file path=ppt/slides/slide8.xml><?xml version="1.0" encoding="utf-8"?>
-<p:sld xmlns:a="http://schemas.openxmlformats.org/drawingml/2006/main" xmlns:r="http://schemas.openxmlformats.org/officeDocument/2006/relationships" xmlns:p="http://schemas.openxmlformats.org/presentationml/2006/main">
-  <p:cSld>
-    <p:spTree>
-      <p:nvGrpSpPr>
-        <p:cNvPr id="1" name=""/>
-        <p:cNvGrpSpPr/>
-        <p:nvPr/>
-      </p:nvGrpSpPr>
-      <p:grpSpPr>
-        <a:xfrm>
-          <a:off x="0" y="0"/>
-          <a:ext cx="0" cy="0"/>
-          <a:chOff x="0" y="0"/>
-          <a:chExt cx="0" cy="0"/>
-        </a:xfrm>
-      </p:grpSpPr>
-      <p:sp>
-        <p:nvSpPr>
-          <p:cNvPr id="2" name="Título 1">
-            <a:extLst>
-              <a:ext uri="{FF2B5EF4-FFF2-40B4-BE49-F238E27FC236}">
-                <a16:creationId xmlns:a16="http://schemas.microsoft.com/office/drawing/2014/main" id="{3F20709D-0300-4B42-A52F-125BFA015466}"/>
-              </a:ext>
-            </a:extLst>
-          </p:cNvPr>
-          <p:cNvSpPr>
-            <a:spLocks noGrp="1"/>
-          </p:cNvSpPr>
-          <p:nvPr>
-            <p:ph type="title"/>
-          </p:nvPr>
-        </p:nvSpPr>
-        <p:spPr/>
-        <p:txBody>
-          <a:bodyPr/>
-          <a:lstStyle/>
-          <a:p>
-            <a:r>
-              <a:rPr lang="es-AR" dirty="0"/>
-              <a:t>Lector de banda magnética</a:t>
-            </a:r>
-          </a:p>
-        </p:txBody>
-      </p:sp>
-      <p:sp>
-        <p:nvSpPr>
-          <p:cNvPr id="3" name="CuadroTexto 2">
-            <a:extLst>
-              <a:ext uri="{FF2B5EF4-FFF2-40B4-BE49-F238E27FC236}">
-                <a16:creationId xmlns:a16="http://schemas.microsoft.com/office/drawing/2014/main" id="{06122CE4-8D87-4F1D-B88E-98C5F2F84CA3}"/>
-              </a:ext>
-            </a:extLst>
-          </p:cNvPr>
-          <p:cNvSpPr txBox="1"/>
-          <p:nvPr/>
-        </p:nvSpPr>
-        <p:spPr>
-          <a:xfrm>
-            <a:off x="521294" y="2199860"/>
-            <a:ext cx="11149412" cy="4185761"/>
-          </a:xfrm>
-          <a:prstGeom prst="rect">
-            <a:avLst/>
-          </a:prstGeom>
-          <a:noFill/>
-        </p:spPr>
-        <p:txBody>
-          <a:bodyPr wrap="square" rtlCol="0">
-            <a:spAutoFit/>
-          </a:bodyPr>
-          <a:lstStyle/>
-          <a:p>
-            <a:r>
-              <a:rPr lang="es-AR" sz="3200" dirty="0"/>
-              <a:t>Interrupciones del MCU:</a:t>
-            </a:r>
-          </a:p>
-          <a:p>
-            <a:r>
-              <a:rPr lang="es-AR" sz="2400" dirty="0"/>
-              <a:t>Enable – flanco ascendente: Se habilita clock, se comienza lectura.</a:t>
-            </a:r>
-          </a:p>
-          <a:p>
-            <a:r>
-              <a:rPr lang="es-AR" sz="2400" dirty="0"/>
-              <a:t>(x useg de duración)</a:t>
-            </a:r>
-          </a:p>
-          <a:p>
-            <a:endParaRPr lang="es-AR" sz="2400" dirty="0"/>
-          </a:p>
-          <a:p>
-            <a:r>
-              <a:rPr lang="es-AR" sz="2400" dirty="0"/>
-              <a:t>Clock – flanco descendente: Se lee pin de datos y se guardan en un buffer.</a:t>
-            </a:r>
-          </a:p>
-          <a:p>
-            <a:r>
-              <a:rPr lang="es-AR" sz="2400" dirty="0"/>
-              <a:t>(x useg de duración)</a:t>
-            </a:r>
-          </a:p>
-          <a:p>
-            <a:endParaRPr lang="es-AR" sz="2400" dirty="0"/>
-          </a:p>
-          <a:p>
-            <a:r>
-              <a:rPr lang="es-AR" sz="2400" dirty="0"/>
-              <a:t>Enable – flanco descendente: Se deshabilita clock, finaliza lectura, se genera un evento (lectureEvent).</a:t>
-            </a:r>
-          </a:p>
-          <a:p>
-            <a:r>
-              <a:rPr lang="es-AR" sz="2400" dirty="0"/>
-              <a:t>(x useg de duración)</a:t>
-            </a:r>
-          </a:p>
-          <a:p>
-            <a:endParaRPr lang="es-AR" dirty="0"/>
-          </a:p>
-        </p:txBody>
-      </p:sp>
-    </p:spTree>
-    <p:extLst>
-      <p:ext uri="{BB962C8B-B14F-4D97-AF65-F5344CB8AC3E}">
-        <p14:creationId xmlns:p14="http://schemas.microsoft.com/office/powerpoint/2010/main" val="492572831"/>
-      </p:ext>
-    </p:extLst>
-  </p:cSld>
-  <p:clrMapOvr>
-    <a:masterClrMapping/>
-  </p:clrMapOvr>
-</p:sld>
-</file>
-
-<file path=ppt/slides/slide9.xml><?xml version="1.0" encoding="utf-8"?>
-<p:sld xmlns:a="http://schemas.openxmlformats.org/drawingml/2006/main" xmlns:r="http://schemas.openxmlformats.org/officeDocument/2006/relationships" xmlns:p="http://schemas.openxmlformats.org/presentationml/2006/main">
-  <p:cSld>
-    <p:spTree>
-      <p:nvGrpSpPr>
-        <p:cNvPr id="1" name=""/>
-        <p:cNvGrpSpPr/>
-        <p:nvPr/>
-      </p:nvGrpSpPr>
-      <p:grpSpPr>
-        <a:xfrm>
-          <a:off x="0" y="0"/>
-          <a:ext cx="0" cy="0"/>
-          <a:chOff x="0" y="0"/>
-          <a:chExt cx="0" cy="0"/>
-        </a:xfrm>
-      </p:grpSpPr>
-      <p:sp>
-        <p:nvSpPr>
-          <p:cNvPr id="2" name="Título 1">
-            <a:extLst>
-              <a:ext uri="{FF2B5EF4-FFF2-40B4-BE49-F238E27FC236}">
-                <a16:creationId xmlns:a16="http://schemas.microsoft.com/office/drawing/2014/main" id="{FA540032-3C3F-44CF-B0F2-6BA666FE84E9}"/>
-              </a:ext>
-            </a:extLst>
-          </p:cNvPr>
-          <p:cNvSpPr>
-            <a:spLocks noGrp="1"/>
-          </p:cNvSpPr>
-          <p:nvPr>
-            <p:ph type="title"/>
-          </p:nvPr>
-        </p:nvSpPr>
-        <p:spPr/>
-        <p:txBody>
-          <a:bodyPr/>
-          <a:lstStyle/>
-          <a:p>
-            <a:r>
-              <a:rPr lang="es-AR" dirty="0"/>
-              <a:t>Lectura de banda magnética</a:t>
-            </a:r>
-          </a:p>
-        </p:txBody>
-      </p:sp>
-      <p:sp>
-        <p:nvSpPr>
-          <p:cNvPr id="3" name="CuadroTexto 2">
-            <a:extLst>
-              <a:ext uri="{FF2B5EF4-FFF2-40B4-BE49-F238E27FC236}">
-                <a16:creationId xmlns:a16="http://schemas.microsoft.com/office/drawing/2014/main" id="{633E9794-5113-453A-AFC1-6806F2A76A5A}"/>
-              </a:ext>
-            </a:extLst>
-          </p:cNvPr>
-          <p:cNvSpPr txBox="1"/>
-          <p:nvPr/>
-        </p:nvSpPr>
-        <p:spPr>
-          <a:xfrm>
-            <a:off x="530087" y="2319130"/>
-            <a:ext cx="10866783" cy="3908762"/>
-          </a:xfrm>
-          <a:prstGeom prst="rect">
-            <a:avLst/>
-          </a:prstGeom>
-          <a:noFill/>
-        </p:spPr>
-        <p:txBody>
-          <a:bodyPr wrap="square" rtlCol="0">
-            <a:spAutoFit/>
-          </a:bodyPr>
-          <a:lstStyle/>
-          <a:p>
-            <a:r>
-              <a:rPr lang="es-AR" sz="3200" dirty="0"/>
-              <a:t>Manejo de evento de lectura:</a:t>
-            </a:r>
-          </a:p>
-          <a:p>
-            <a:r>
-              <a:rPr lang="es-AR" sz="2400" dirty="0"/>
-              <a:t>Ante la generación de este tipo de evento, se guarda el mismo en una cola.</a:t>
-            </a:r>
-          </a:p>
-          <a:p>
-            <a:endParaRPr lang="es-AR" sz="2400" dirty="0"/>
-          </a:p>
-          <a:p>
-            <a:r>
-              <a:rPr lang="es-AR" sz="2400" dirty="0"/>
-              <a:t>Una “APP” puede indicar que se extraiga un evento de la cola</a:t>
-            </a:r>
-          </a:p>
-          <a:p>
-            <a:endParaRPr lang="es-AR" sz="2400" dirty="0"/>
-          </a:p>
-          <a:p>
-            <a:r>
-              <a:rPr lang="es-AR" sz="2400" dirty="0"/>
-              <a:t>Al extraer el evento de la cola (cuyo contenido es una serie de 1s o 0s), este es decodificado según los estándares especificados de tarjetas magnéticas</a:t>
-            </a:r>
-          </a:p>
-          <a:p>
-            <a:endParaRPr lang="es-AR" sz="2400" dirty="0"/>
-          </a:p>
-          <a:p>
-            <a:r>
-              <a:rPr lang="es-AR" sz="2400" dirty="0"/>
-              <a:t>Finalmente, la APP tiene a su disposición una PALABRA decodificada (y separada en campos según el standard) , y la validez de esta palabra.</a:t>
-            </a:r>
-          </a:p>
-        </p:txBody>
-      </p:sp>
-    </p:spTree>
-    <p:extLst>
-      <p:ext uri="{BB962C8B-B14F-4D97-AF65-F5344CB8AC3E}">
-        <p14:creationId xmlns:p14="http://schemas.microsoft.com/office/powerpoint/2010/main" val="1530338545"/>
       </p:ext>
     </p:extLst>
   </p:cSld>

</xml_diff>

<commit_message>
se sube ppt version final
</commit_message>
<xml_diff>
--- a/Control de Acceso.pptx
+++ b/Control de Acceso.pptx
@@ -3028,7 +3028,10 @@
         <a:bodyPr/>
         <a:lstStyle/>
         <a:p>
-          <a:endParaRPr lang="es-AR" dirty="0"/>
+          <a:r>
+            <a:rPr lang="es-AR" dirty="0"/>
+            <a:t>LOW HAL</a:t>
+          </a:r>
         </a:p>
       </dgm:t>
     </dgm:pt>
@@ -3310,7 +3313,10 @@
         <a:bodyPr/>
         <a:lstStyle/>
         <a:p>
-          <a:endParaRPr lang="es-AR" dirty="0"/>
+          <a:r>
+            <a:rPr lang="es-AR" dirty="0"/>
+            <a:t>LOW HAL</a:t>
+          </a:r>
         </a:p>
       </dgm:t>
     </dgm:pt>
@@ -3509,7 +3515,7 @@
       <dgm:spPr/>
     </dgm:pt>
     <dgm:pt modelId="{C506A8BA-439E-4716-BD26-721A6F281A37}" type="pres">
-      <dgm:prSet presAssocID="{DEBFFABF-82B9-4D25-8AD5-D3D639130002}" presName="level2Shape" presStyleLbl="node3" presStyleIdx="1" presStyleCnt="10" custScaleX="5667"/>
+      <dgm:prSet presAssocID="{DEBFFABF-82B9-4D25-8AD5-D3D639130002}" presName="level2Shape" presStyleLbl="node3" presStyleIdx="1" presStyleCnt="10" custScaleX="76873"/>
       <dgm:spPr/>
     </dgm:pt>
     <dgm:pt modelId="{0D14266D-155E-47D2-BD04-D1ADB411484B}" type="pres">
@@ -3637,7 +3643,7 @@
       <dgm:spPr/>
     </dgm:pt>
     <dgm:pt modelId="{7ECB5281-3BE3-458D-9668-FC45289E3411}" type="pres">
-      <dgm:prSet presAssocID="{C194289A-C687-45FE-8049-89294C7C2B30}" presName="level2Shape" presStyleLbl="node3" presStyleIdx="5" presStyleCnt="10" custScaleX="4325"/>
+      <dgm:prSet presAssocID="{C194289A-C687-45FE-8049-89294C7C2B30}" presName="level2Shape" presStyleLbl="node3" presStyleIdx="5" presStyleCnt="10" custScaleX="77643"/>
       <dgm:spPr/>
     </dgm:pt>
     <dgm:pt modelId="{41C358C0-DB22-445C-99B0-377F9DD83D02}" type="pres">
@@ -3996,8 +4002,12 @@
         <a:lstStyle/>
         <a:p>
           <a:r>
+            <a:rPr lang="es-AR"/>
+            <a:t>LOW </a:t>
+          </a:r>
+          <a:r>
             <a:rPr lang="es-AR" dirty="0"/>
-            <a:t>ENCODER HAL</a:t>
+            <a:t>HAL</a:t>
           </a:r>
         </a:p>
       </dgm:t>
@@ -4868,8 +4878,8 @@
       </dsp:nvSpPr>
       <dsp:spPr>
         <a:xfrm>
-          <a:off x="5498408" y="1634102"/>
-          <a:ext cx="1006067" cy="670711"/>
+          <a:off x="5607033" y="1736681"/>
+          <a:ext cx="946887" cy="631258"/>
         </a:xfrm>
         <a:prstGeom prst="roundRect">
           <a:avLst>
@@ -4916,12 +4926,12 @@
         </a:fontRef>
       </dsp:style>
       <dsp:txBody>
-        <a:bodyPr spcFirstLastPara="0" vert="horz" wrap="square" lIns="53340" tIns="53340" rIns="53340" bIns="53340" numCol="1" spcCol="1270" anchor="ctr" anchorCtr="0">
+        <a:bodyPr spcFirstLastPara="0" vert="horz" wrap="square" lIns="49530" tIns="49530" rIns="49530" bIns="49530" numCol="1" spcCol="1270" anchor="ctr" anchorCtr="0">
           <a:noAutofit/>
         </a:bodyPr>
         <a:lstStyle/>
         <a:p>
-          <a:pPr marL="0" lvl="0" indent="0" algn="ctr" defTabSz="622300">
+          <a:pPr marL="0" lvl="0" indent="0" algn="ctr" defTabSz="577850">
             <a:lnSpc>
               <a:spcPct val="90000"/>
             </a:lnSpc>
@@ -4934,14 +4944,14 @@
             <a:buNone/>
           </a:pPr>
           <a:r>
-            <a:rPr lang="es-AR" sz="1400" kern="1200" dirty="0"/>
+            <a:rPr lang="es-AR" sz="1300" kern="1200" dirty="0"/>
             <a:t>APP</a:t>
           </a:r>
         </a:p>
       </dsp:txBody>
       <dsp:txXfrm>
-        <a:off x="5518052" y="1653746"/>
-        <a:ext cx="966779" cy="631423"/>
+        <a:off x="5625522" y="1755170"/>
+        <a:ext cx="909909" cy="594280"/>
       </dsp:txXfrm>
     </dsp:sp>
     <dsp:sp modelId="{41AB122B-081A-4865-AD38-E3670CB221C3}">
@@ -4951,8 +4961,8 @@
       </dsp:nvSpPr>
       <dsp:spPr>
         <a:xfrm>
-          <a:off x="1575302" y="2304814"/>
-          <a:ext cx="4426140" cy="268284"/>
+          <a:off x="1656858" y="2367940"/>
+          <a:ext cx="4423618" cy="252503"/>
         </a:xfrm>
         <a:custGeom>
           <a:avLst/>
@@ -4963,16 +4973,16 @@
           <a:pathLst>
             <a:path>
               <a:moveTo>
-                <a:pt x="4426140" y="0"/>
+                <a:pt x="4423618" y="0"/>
               </a:moveTo>
               <a:lnTo>
-                <a:pt x="4426140" y="134142"/>
+                <a:pt x="4423618" y="126251"/>
               </a:lnTo>
               <a:lnTo>
-                <a:pt x="0" y="134142"/>
+                <a:pt x="0" y="126251"/>
               </a:lnTo>
               <a:lnTo>
-                <a:pt x="0" y="268284"/>
+                <a:pt x="0" y="252503"/>
               </a:lnTo>
             </a:path>
           </a:pathLst>
@@ -5020,8 +5030,8 @@
       </dsp:nvSpPr>
       <dsp:spPr>
         <a:xfrm>
-          <a:off x="1072268" y="2573098"/>
-          <a:ext cx="1006067" cy="670711"/>
+          <a:off x="1183414" y="2620443"/>
+          <a:ext cx="946887" cy="631258"/>
         </a:xfrm>
         <a:prstGeom prst="roundRect">
           <a:avLst>
@@ -5068,12 +5078,12 @@
         </a:fontRef>
       </dsp:style>
       <dsp:txBody>
-        <a:bodyPr spcFirstLastPara="0" vert="horz" wrap="square" lIns="53340" tIns="53340" rIns="53340" bIns="53340" numCol="1" spcCol="1270" anchor="ctr" anchorCtr="0">
+        <a:bodyPr spcFirstLastPara="0" vert="horz" wrap="square" lIns="49530" tIns="49530" rIns="49530" bIns="49530" numCol="1" spcCol="1270" anchor="ctr" anchorCtr="0">
           <a:noAutofit/>
         </a:bodyPr>
         <a:lstStyle/>
         <a:p>
-          <a:pPr marL="0" lvl="0" indent="0" algn="ctr" defTabSz="622300">
+          <a:pPr marL="0" lvl="0" indent="0" algn="ctr" defTabSz="577850">
             <a:lnSpc>
               <a:spcPct val="90000"/>
             </a:lnSpc>
@@ -5086,14 +5096,14 @@
             <a:buNone/>
           </a:pPr>
           <a:r>
-            <a:rPr lang="es-AR" sz="1400" kern="1200" dirty="0"/>
+            <a:rPr lang="es-AR" sz="1300" kern="1200" dirty="0"/>
             <a:t>ENCODER</a:t>
           </a:r>
         </a:p>
       </dsp:txBody>
       <dsp:txXfrm>
-        <a:off x="1091912" y="2592742"/>
-        <a:ext cx="966779" cy="631423"/>
+        <a:off x="1201903" y="2638932"/>
+        <a:ext cx="909909" cy="594280"/>
       </dsp:txXfrm>
     </dsp:sp>
     <dsp:sp modelId="{53BE28EF-99A8-45D2-A439-B1144FBC3954}">
@@ -5103,8 +5113,8 @@
       </dsp:nvSpPr>
       <dsp:spPr>
         <a:xfrm>
-          <a:off x="504677" y="3243810"/>
-          <a:ext cx="1070624" cy="268284"/>
+          <a:off x="480651" y="3251701"/>
+          <a:ext cx="1176206" cy="252503"/>
         </a:xfrm>
         <a:custGeom>
           <a:avLst/>
@@ -5115,16 +5125,16 @@
           <a:pathLst>
             <a:path>
               <a:moveTo>
-                <a:pt x="1070624" y="0"/>
+                <a:pt x="1176206" y="0"/>
               </a:moveTo>
               <a:lnTo>
-                <a:pt x="1070624" y="134142"/>
+                <a:pt x="1176206" y="126251"/>
               </a:lnTo>
               <a:lnTo>
-                <a:pt x="0" y="134142"/>
+                <a:pt x="0" y="126251"/>
               </a:lnTo>
               <a:lnTo>
-                <a:pt x="0" y="268284"/>
+                <a:pt x="0" y="252503"/>
               </a:lnTo>
             </a:path>
           </a:pathLst>
@@ -5172,8 +5182,8 @@
       </dsp:nvSpPr>
       <dsp:spPr>
         <a:xfrm>
-          <a:off x="1643" y="3512095"/>
-          <a:ext cx="1006067" cy="670711"/>
+          <a:off x="7208" y="3504204"/>
+          <a:ext cx="946887" cy="631258"/>
         </a:xfrm>
         <a:prstGeom prst="roundRect">
           <a:avLst>
@@ -5220,12 +5230,12 @@
         </a:fontRef>
       </dsp:style>
       <dsp:txBody>
-        <a:bodyPr spcFirstLastPara="0" vert="horz" wrap="square" lIns="53340" tIns="53340" rIns="53340" bIns="53340" numCol="1" spcCol="1270" anchor="ctr" anchorCtr="0">
+        <a:bodyPr spcFirstLastPara="0" vert="horz" wrap="square" lIns="49530" tIns="49530" rIns="49530" bIns="49530" numCol="1" spcCol="1270" anchor="ctr" anchorCtr="0">
           <a:noAutofit/>
         </a:bodyPr>
         <a:lstStyle/>
         <a:p>
-          <a:pPr marL="0" lvl="0" indent="0" algn="ctr" defTabSz="622300">
+          <a:pPr marL="0" lvl="0" indent="0" algn="ctr" defTabSz="577850">
             <a:lnSpc>
               <a:spcPct val="90000"/>
             </a:lnSpc>
@@ -5238,15 +5248,15 @@
             <a:buNone/>
           </a:pPr>
           <a:r>
-            <a:rPr lang="es-AR" sz="1400" kern="1200" dirty="0"/>
+            <a:rPr lang="es-AR" sz="1300" kern="1200" dirty="0"/>
             <a:t>TIMER</a:t>
           </a:r>
-          <a:endParaRPr lang="en-US" sz="1400" kern="1200" dirty="0"/>
+          <a:endParaRPr lang="en-US" sz="1300" kern="1200" dirty="0"/>
         </a:p>
       </dsp:txBody>
       <dsp:txXfrm>
-        <a:off x="21287" y="3531739"/>
-        <a:ext cx="966779" cy="631423"/>
+        <a:off x="25697" y="3522693"/>
+        <a:ext cx="909909" cy="594280"/>
       </dsp:txXfrm>
     </dsp:sp>
     <dsp:sp modelId="{D2FA8DCC-89A3-4CB1-9FF9-7F8B664B0AF9}">
@@ -5256,8 +5266,8 @@
       </dsp:nvSpPr>
       <dsp:spPr>
         <a:xfrm>
-          <a:off x="458957" y="4182807"/>
-          <a:ext cx="91440" cy="268284"/>
+          <a:off x="434931" y="4135462"/>
+          <a:ext cx="91440" cy="252503"/>
         </a:xfrm>
         <a:custGeom>
           <a:avLst/>
@@ -5271,7 +5281,7 @@
                 <a:pt x="45720" y="0"/>
               </a:moveTo>
               <a:lnTo>
-                <a:pt x="45720" y="268284"/>
+                <a:pt x="45720" y="252503"/>
               </a:lnTo>
             </a:path>
           </a:pathLst>
@@ -5319,8 +5329,8 @@
       </dsp:nvSpPr>
       <dsp:spPr>
         <a:xfrm>
-          <a:off x="1643" y="4451091"/>
-          <a:ext cx="1006067" cy="670711"/>
+          <a:off x="7208" y="4387965"/>
+          <a:ext cx="946887" cy="631258"/>
         </a:xfrm>
         <a:prstGeom prst="roundRect">
           <a:avLst>
@@ -5367,12 +5377,12 @@
         </a:fontRef>
       </dsp:style>
       <dsp:txBody>
-        <a:bodyPr spcFirstLastPara="0" vert="horz" wrap="square" lIns="53340" tIns="53340" rIns="53340" bIns="53340" numCol="1" spcCol="1270" anchor="ctr" anchorCtr="0">
+        <a:bodyPr spcFirstLastPara="0" vert="horz" wrap="square" lIns="49530" tIns="49530" rIns="49530" bIns="49530" numCol="1" spcCol="1270" anchor="ctr" anchorCtr="0">
           <a:noAutofit/>
         </a:bodyPr>
         <a:lstStyle/>
         <a:p>
-          <a:pPr marL="0" lvl="0" indent="0" algn="ctr" defTabSz="622300">
+          <a:pPr marL="0" lvl="0" indent="0" algn="ctr" defTabSz="577850">
             <a:lnSpc>
               <a:spcPct val="90000"/>
             </a:lnSpc>
@@ -5385,15 +5395,15 @@
             <a:buNone/>
           </a:pPr>
           <a:r>
-            <a:rPr lang="es-AR" sz="1400" kern="1200" dirty="0"/>
+            <a:rPr lang="es-AR" sz="1300" kern="1200" dirty="0"/>
             <a:t>SYSTICK</a:t>
           </a:r>
-          <a:endParaRPr lang="en-US" sz="1400" kern="1200" dirty="0"/>
+          <a:endParaRPr lang="en-US" sz="1300" kern="1200" dirty="0"/>
         </a:p>
       </dsp:txBody>
       <dsp:txXfrm>
-        <a:off x="21287" y="4470735"/>
-        <a:ext cx="966779" cy="631423"/>
+        <a:off x="25697" y="4406454"/>
+        <a:ext cx="909909" cy="594280"/>
       </dsp:txXfrm>
     </dsp:sp>
     <dsp:sp modelId="{DDEF067D-8035-4EE8-B26D-F9EF3FCB2EBB}">
@@ -5403,8 +5413,8 @@
       </dsp:nvSpPr>
       <dsp:spPr>
         <a:xfrm>
-          <a:off x="1575302" y="3243810"/>
-          <a:ext cx="237263" cy="268284"/>
+          <a:off x="1611138" y="3251701"/>
+          <a:ext cx="91440" cy="252503"/>
         </a:xfrm>
         <a:custGeom>
           <a:avLst/>
@@ -5415,16 +5425,16 @@
           <a:pathLst>
             <a:path>
               <a:moveTo>
-                <a:pt x="0" y="0"/>
+                <a:pt x="45720" y="0"/>
               </a:moveTo>
               <a:lnTo>
-                <a:pt x="0" y="134142"/>
+                <a:pt x="45720" y="126251"/>
               </a:lnTo>
               <a:lnTo>
-                <a:pt x="237263" y="134142"/>
+                <a:pt x="100466" y="126251"/>
               </a:lnTo>
               <a:lnTo>
-                <a:pt x="237263" y="268284"/>
+                <a:pt x="100466" y="252503"/>
               </a:lnTo>
             </a:path>
           </a:pathLst>
@@ -5472,8 +5482,8 @@
       </dsp:nvSpPr>
       <dsp:spPr>
         <a:xfrm>
-          <a:off x="1784058" y="3512095"/>
-          <a:ext cx="57013" cy="670711"/>
+          <a:off x="1347654" y="3504204"/>
+          <a:ext cx="727900" cy="631258"/>
         </a:xfrm>
         <a:prstGeom prst="roundRect">
           <a:avLst>
@@ -5520,12 +5530,12 @@
         </a:fontRef>
       </dsp:style>
       <dsp:txBody>
-        <a:bodyPr spcFirstLastPara="0" vert="horz" wrap="square" lIns="53340" tIns="53340" rIns="53340" bIns="53340" numCol="1" spcCol="1270" anchor="ctr" anchorCtr="0">
+        <a:bodyPr spcFirstLastPara="0" vert="horz" wrap="square" lIns="49530" tIns="49530" rIns="49530" bIns="49530" numCol="1" spcCol="1270" anchor="ctr" anchorCtr="0">
           <a:noAutofit/>
         </a:bodyPr>
         <a:lstStyle/>
         <a:p>
-          <a:pPr marL="0" lvl="0" indent="0" algn="ctr" defTabSz="622300">
+          <a:pPr marL="0" lvl="0" indent="0" algn="ctr" defTabSz="577850">
             <a:lnSpc>
               <a:spcPct val="90000"/>
             </a:lnSpc>
@@ -5537,12 +5547,15 @@
             </a:spcAft>
             <a:buNone/>
           </a:pPr>
-          <a:endParaRPr lang="es-AR" sz="1400" kern="1200" dirty="0"/>
+          <a:r>
+            <a:rPr lang="es-AR" sz="1300" kern="1200" dirty="0"/>
+            <a:t>LOW HAL</a:t>
+          </a:r>
         </a:p>
       </dsp:txBody>
       <dsp:txXfrm>
-        <a:off x="1785728" y="3513765"/>
-        <a:ext cx="53673" cy="667371"/>
+        <a:off x="1366143" y="3522693"/>
+        <a:ext cx="690922" cy="594280"/>
       </dsp:txXfrm>
     </dsp:sp>
     <dsp:sp modelId="{2B44D44D-9C15-4BE4-8857-6902DD216E02}">
@@ -5552,8 +5565,8 @@
       </dsp:nvSpPr>
       <dsp:spPr>
         <a:xfrm>
-          <a:off x="1766845" y="4182807"/>
-          <a:ext cx="91440" cy="268284"/>
+          <a:off x="1665884" y="4135462"/>
+          <a:ext cx="91440" cy="252503"/>
         </a:xfrm>
         <a:custGeom>
           <a:avLst/>
@@ -5567,7 +5580,7 @@
                 <a:pt x="45720" y="0"/>
               </a:moveTo>
               <a:lnTo>
-                <a:pt x="45720" y="268284"/>
+                <a:pt x="45720" y="252503"/>
               </a:lnTo>
             </a:path>
           </a:pathLst>
@@ -5615,8 +5628,8 @@
       </dsp:nvSpPr>
       <dsp:spPr>
         <a:xfrm>
-          <a:off x="1309531" y="4451091"/>
-          <a:ext cx="1006067" cy="670711"/>
+          <a:off x="1238161" y="4387965"/>
+          <a:ext cx="946887" cy="631258"/>
         </a:xfrm>
         <a:prstGeom prst="roundRect">
           <a:avLst>
@@ -5663,12 +5676,12 @@
         </a:fontRef>
       </dsp:style>
       <dsp:txBody>
-        <a:bodyPr spcFirstLastPara="0" vert="horz" wrap="square" lIns="53340" tIns="53340" rIns="53340" bIns="53340" numCol="1" spcCol="1270" anchor="ctr" anchorCtr="0">
+        <a:bodyPr spcFirstLastPara="0" vert="horz" wrap="square" lIns="49530" tIns="49530" rIns="49530" bIns="49530" numCol="1" spcCol="1270" anchor="ctr" anchorCtr="0">
           <a:noAutofit/>
         </a:bodyPr>
         <a:lstStyle/>
         <a:p>
-          <a:pPr marL="0" lvl="0" indent="0" algn="ctr" defTabSz="622300">
+          <a:pPr marL="0" lvl="0" indent="0" algn="ctr" defTabSz="577850">
             <a:lnSpc>
               <a:spcPct val="90000"/>
             </a:lnSpc>
@@ -5681,14 +5694,14 @@
             <a:buNone/>
           </a:pPr>
           <a:r>
-            <a:rPr lang="es-AR" sz="1400" kern="1200" dirty="0"/>
+            <a:rPr lang="es-AR" sz="1300" kern="1200" dirty="0"/>
             <a:t>GPIO</a:t>
           </a:r>
         </a:p>
       </dsp:txBody>
       <dsp:txXfrm>
-        <a:off x="1329175" y="4470735"/>
-        <a:ext cx="966779" cy="631423"/>
+        <a:off x="1256650" y="4406454"/>
+        <a:ext cx="909909" cy="594280"/>
       </dsp:txXfrm>
     </dsp:sp>
     <dsp:sp modelId="{12D6D663-4501-42C1-84F8-FE7ACFB08125}">
@@ -5698,8 +5711,8 @@
       </dsp:nvSpPr>
       <dsp:spPr>
         <a:xfrm>
-          <a:off x="1575302" y="3243810"/>
-          <a:ext cx="1070624" cy="268284"/>
+          <a:off x="1656858" y="3251701"/>
+          <a:ext cx="1176206" cy="252503"/>
         </a:xfrm>
         <a:custGeom>
           <a:avLst/>
@@ -5713,13 +5726,13 @@
                 <a:pt x="0" y="0"/>
               </a:moveTo>
               <a:lnTo>
-                <a:pt x="0" y="134142"/>
+                <a:pt x="0" y="126251"/>
               </a:lnTo>
               <a:lnTo>
-                <a:pt x="1070624" y="134142"/>
+                <a:pt x="1176206" y="126251"/>
               </a:lnTo>
               <a:lnTo>
-                <a:pt x="1070624" y="268284"/>
+                <a:pt x="1176206" y="252503"/>
               </a:lnTo>
             </a:path>
           </a:pathLst>
@@ -5767,8 +5780,8 @@
       </dsp:nvSpPr>
       <dsp:spPr>
         <a:xfrm>
-          <a:off x="2142892" y="3512095"/>
-          <a:ext cx="1006067" cy="670711"/>
+          <a:off x="2359621" y="3504204"/>
+          <a:ext cx="946887" cy="631258"/>
         </a:xfrm>
         <a:prstGeom prst="roundRect">
           <a:avLst>
@@ -5815,12 +5828,12 @@
         </a:fontRef>
       </dsp:style>
       <dsp:txBody>
-        <a:bodyPr spcFirstLastPara="0" vert="horz" wrap="square" lIns="53340" tIns="53340" rIns="53340" bIns="53340" numCol="1" spcCol="1270" anchor="ctr" anchorCtr="0">
+        <a:bodyPr spcFirstLastPara="0" vert="horz" wrap="square" lIns="49530" tIns="49530" rIns="49530" bIns="49530" numCol="1" spcCol="1270" anchor="ctr" anchorCtr="0">
           <a:noAutofit/>
         </a:bodyPr>
         <a:lstStyle/>
         <a:p>
-          <a:pPr marL="0" lvl="0" indent="0" algn="ctr" defTabSz="622300">
+          <a:pPr marL="0" lvl="0" indent="0" algn="ctr" defTabSz="577850">
             <a:lnSpc>
               <a:spcPct val="90000"/>
             </a:lnSpc>
@@ -5833,14 +5846,14 @@
             <a:buNone/>
           </a:pPr>
           <a:r>
-            <a:rPr lang="es-AR" sz="1400" kern="1200" dirty="0"/>
+            <a:rPr lang="es-AR" sz="1300" kern="1200" dirty="0"/>
             <a:t>DECODER</a:t>
           </a:r>
         </a:p>
       </dsp:txBody>
       <dsp:txXfrm>
-        <a:off x="2162536" y="3531739"/>
-        <a:ext cx="966779" cy="631423"/>
+        <a:off x="2378110" y="3522693"/>
+        <a:ext cx="909909" cy="594280"/>
       </dsp:txXfrm>
     </dsp:sp>
     <dsp:sp modelId="{6D500FE4-6E88-4115-B204-2A401C1E43A0}">
@@ -5850,8 +5863,8 @@
       </dsp:nvSpPr>
       <dsp:spPr>
         <a:xfrm>
-          <a:off x="4607758" y="2304814"/>
-          <a:ext cx="1393684" cy="268284"/>
+          <a:off x="4679494" y="2367940"/>
+          <a:ext cx="1400982" cy="252503"/>
         </a:xfrm>
         <a:custGeom>
           <a:avLst/>
@@ -5862,16 +5875,16 @@
           <a:pathLst>
             <a:path>
               <a:moveTo>
-                <a:pt x="1393684" y="0"/>
+                <a:pt x="1400982" y="0"/>
               </a:moveTo>
               <a:lnTo>
-                <a:pt x="1393684" y="134142"/>
+                <a:pt x="1400982" y="126251"/>
               </a:lnTo>
               <a:lnTo>
-                <a:pt x="0" y="134142"/>
+                <a:pt x="0" y="126251"/>
               </a:lnTo>
               <a:lnTo>
-                <a:pt x="0" y="268284"/>
+                <a:pt x="0" y="252503"/>
               </a:lnTo>
             </a:path>
           </a:pathLst>
@@ -5919,8 +5932,8 @@
       </dsp:nvSpPr>
       <dsp:spPr>
         <a:xfrm>
-          <a:off x="4104724" y="2573098"/>
-          <a:ext cx="1006067" cy="670711"/>
+          <a:off x="4206051" y="2620443"/>
+          <a:ext cx="946887" cy="631258"/>
         </a:xfrm>
         <a:prstGeom prst="roundRect">
           <a:avLst>
@@ -5967,12 +5980,12 @@
         </a:fontRef>
       </dsp:style>
       <dsp:txBody>
-        <a:bodyPr spcFirstLastPara="0" vert="horz" wrap="square" lIns="53340" tIns="53340" rIns="53340" bIns="53340" numCol="1" spcCol="1270" anchor="ctr" anchorCtr="0">
+        <a:bodyPr spcFirstLastPara="0" vert="horz" wrap="square" lIns="49530" tIns="49530" rIns="49530" bIns="49530" numCol="1" spcCol="1270" anchor="ctr" anchorCtr="0">
           <a:noAutofit/>
         </a:bodyPr>
         <a:lstStyle/>
         <a:p>
-          <a:pPr marL="0" lvl="0" indent="0" algn="ctr" defTabSz="622300">
+          <a:pPr marL="0" lvl="0" indent="0" algn="ctr" defTabSz="577850">
             <a:lnSpc>
               <a:spcPct val="90000"/>
             </a:lnSpc>
@@ -5985,14 +5998,14 @@
             <a:buNone/>
           </a:pPr>
           <a:r>
-            <a:rPr lang="es-AR" sz="1400" kern="1200" dirty="0"/>
+            <a:rPr lang="es-AR" sz="1300" kern="1200" dirty="0"/>
             <a:t>DISPLAY</a:t>
           </a:r>
         </a:p>
       </dsp:txBody>
       <dsp:txXfrm>
-        <a:off x="4124368" y="2592742"/>
-        <a:ext cx="966779" cy="631423"/>
+        <a:off x="4224540" y="2638932"/>
+        <a:ext cx="909909" cy="594280"/>
       </dsp:txXfrm>
     </dsp:sp>
     <dsp:sp modelId="{6DFBC8DC-FB04-4552-ACB4-2C723637561B}">
@@ -6002,8 +6015,8 @@
       </dsp:nvSpPr>
       <dsp:spPr>
         <a:xfrm>
-          <a:off x="3953814" y="3243810"/>
-          <a:ext cx="653943" cy="268284"/>
+          <a:off x="4064018" y="3251701"/>
+          <a:ext cx="615476" cy="252503"/>
         </a:xfrm>
         <a:custGeom>
           <a:avLst/>
@@ -6014,16 +6027,16 @@
           <a:pathLst>
             <a:path>
               <a:moveTo>
-                <a:pt x="653943" y="0"/>
+                <a:pt x="615476" y="0"/>
               </a:moveTo>
               <a:lnTo>
-                <a:pt x="653943" y="134142"/>
+                <a:pt x="615476" y="126251"/>
               </a:lnTo>
               <a:lnTo>
-                <a:pt x="0" y="134142"/>
+                <a:pt x="0" y="126251"/>
               </a:lnTo>
               <a:lnTo>
-                <a:pt x="0" y="268284"/>
+                <a:pt x="0" y="252503"/>
               </a:lnTo>
             </a:path>
           </a:pathLst>
@@ -6071,8 +6084,8 @@
       </dsp:nvSpPr>
       <dsp:spPr>
         <a:xfrm>
-          <a:off x="3450780" y="3512095"/>
-          <a:ext cx="1006067" cy="670711"/>
+          <a:off x="3590574" y="3504204"/>
+          <a:ext cx="946887" cy="631258"/>
         </a:xfrm>
         <a:prstGeom prst="roundRect">
           <a:avLst>
@@ -6119,12 +6132,12 @@
         </a:fontRef>
       </dsp:style>
       <dsp:txBody>
-        <a:bodyPr spcFirstLastPara="0" vert="horz" wrap="square" lIns="53340" tIns="53340" rIns="53340" bIns="53340" numCol="1" spcCol="1270" anchor="ctr" anchorCtr="0">
+        <a:bodyPr spcFirstLastPara="0" vert="horz" wrap="square" lIns="49530" tIns="49530" rIns="49530" bIns="49530" numCol="1" spcCol="1270" anchor="ctr" anchorCtr="0">
           <a:noAutofit/>
         </a:bodyPr>
         <a:lstStyle/>
         <a:p>
-          <a:pPr marL="0" lvl="0" indent="0" algn="ctr" defTabSz="622300">
+          <a:pPr marL="0" lvl="0" indent="0" algn="ctr" defTabSz="577850">
             <a:lnSpc>
               <a:spcPct val="90000"/>
             </a:lnSpc>
@@ -6137,14 +6150,14 @@
             <a:buNone/>
           </a:pPr>
           <a:r>
-            <a:rPr lang="es-AR" sz="1400" kern="1200" dirty="0"/>
+            <a:rPr lang="es-AR" sz="1300" kern="1200" dirty="0"/>
             <a:t>TIMER</a:t>
           </a:r>
         </a:p>
       </dsp:txBody>
       <dsp:txXfrm>
-        <a:off x="3470424" y="3531739"/>
-        <a:ext cx="966779" cy="631423"/>
+        <a:off x="3609063" y="3522693"/>
+        <a:ext cx="909909" cy="594280"/>
       </dsp:txXfrm>
     </dsp:sp>
     <dsp:sp modelId="{190E5C43-FF52-41EF-BC65-4C3846DF4B2F}">
@@ -6154,8 +6167,8 @@
       </dsp:nvSpPr>
       <dsp:spPr>
         <a:xfrm>
-          <a:off x="3908094" y="4182807"/>
-          <a:ext cx="91440" cy="268284"/>
+          <a:off x="4018298" y="4135462"/>
+          <a:ext cx="91440" cy="252503"/>
         </a:xfrm>
         <a:custGeom>
           <a:avLst/>
@@ -6169,7 +6182,7 @@
                 <a:pt x="45720" y="0"/>
               </a:moveTo>
               <a:lnTo>
-                <a:pt x="45720" y="268284"/>
+                <a:pt x="45720" y="252503"/>
               </a:lnTo>
             </a:path>
           </a:pathLst>
@@ -6217,8 +6230,8 @@
       </dsp:nvSpPr>
       <dsp:spPr>
         <a:xfrm>
-          <a:off x="3450780" y="4451091"/>
-          <a:ext cx="1006067" cy="670711"/>
+          <a:off x="3590574" y="4387965"/>
+          <a:ext cx="946887" cy="631258"/>
         </a:xfrm>
         <a:prstGeom prst="roundRect">
           <a:avLst>
@@ -6265,12 +6278,12 @@
         </a:fontRef>
       </dsp:style>
       <dsp:txBody>
-        <a:bodyPr spcFirstLastPara="0" vert="horz" wrap="square" lIns="53340" tIns="53340" rIns="53340" bIns="53340" numCol="1" spcCol="1270" anchor="ctr" anchorCtr="0">
+        <a:bodyPr spcFirstLastPara="0" vert="horz" wrap="square" lIns="49530" tIns="49530" rIns="49530" bIns="49530" numCol="1" spcCol="1270" anchor="ctr" anchorCtr="0">
           <a:noAutofit/>
         </a:bodyPr>
         <a:lstStyle/>
         <a:p>
-          <a:pPr marL="0" lvl="0" indent="0" algn="ctr" defTabSz="622300">
+          <a:pPr marL="0" lvl="0" indent="0" algn="ctr" defTabSz="577850">
             <a:lnSpc>
               <a:spcPct val="90000"/>
             </a:lnSpc>
@@ -6283,14 +6296,14 @@
             <a:buNone/>
           </a:pPr>
           <a:r>
-            <a:rPr lang="es-AR" sz="1400" kern="1200" dirty="0"/>
+            <a:rPr lang="es-AR" sz="1300" kern="1200" dirty="0"/>
             <a:t>SYSTICK</a:t>
           </a:r>
         </a:p>
       </dsp:txBody>
       <dsp:txXfrm>
-        <a:off x="3470424" y="4470735"/>
-        <a:ext cx="966779" cy="631423"/>
+        <a:off x="3609063" y="4406454"/>
+        <a:ext cx="909909" cy="594280"/>
       </dsp:txXfrm>
     </dsp:sp>
     <dsp:sp modelId="{86087C67-4375-477E-84D1-836C1F14C793}">
@@ -6300,8 +6313,8 @@
       </dsp:nvSpPr>
       <dsp:spPr>
         <a:xfrm>
-          <a:off x="4607758" y="3243810"/>
-          <a:ext cx="645140" cy="261369"/>
+          <a:off x="4679494" y="3251701"/>
+          <a:ext cx="607191" cy="245994"/>
         </a:xfrm>
         <a:custGeom>
           <a:avLst/>
@@ -6315,13 +6328,13 @@
                 <a:pt x="0" y="0"/>
               </a:moveTo>
               <a:lnTo>
-                <a:pt x="0" y="130684"/>
+                <a:pt x="0" y="122997"/>
               </a:lnTo>
               <a:lnTo>
-                <a:pt x="645140" y="130684"/>
+                <a:pt x="607191" y="122997"/>
               </a:lnTo>
               <a:lnTo>
-                <a:pt x="645140" y="261369"/>
+                <a:pt x="607191" y="245994"/>
               </a:lnTo>
             </a:path>
           </a:pathLst>
@@ -6369,8 +6382,8 @@
       </dsp:nvSpPr>
       <dsp:spPr>
         <a:xfrm>
-          <a:off x="4749865" y="3505180"/>
-          <a:ext cx="1006067" cy="670711"/>
+          <a:off x="4813242" y="3497696"/>
+          <a:ext cx="946887" cy="631258"/>
         </a:xfrm>
         <a:prstGeom prst="roundRect">
           <a:avLst>
@@ -6417,12 +6430,12 @@
         </a:fontRef>
       </dsp:style>
       <dsp:txBody>
-        <a:bodyPr spcFirstLastPara="0" vert="horz" wrap="square" lIns="53340" tIns="53340" rIns="53340" bIns="53340" numCol="1" spcCol="1270" anchor="ctr" anchorCtr="0">
+        <a:bodyPr spcFirstLastPara="0" vert="horz" wrap="square" lIns="49530" tIns="49530" rIns="49530" bIns="49530" numCol="1" spcCol="1270" anchor="ctr" anchorCtr="0">
           <a:noAutofit/>
         </a:bodyPr>
         <a:lstStyle/>
         <a:p>
-          <a:pPr marL="0" lvl="0" indent="0" algn="ctr" defTabSz="622300">
+          <a:pPr marL="0" lvl="0" indent="0" algn="ctr" defTabSz="577850">
             <a:lnSpc>
               <a:spcPct val="90000"/>
             </a:lnSpc>
@@ -6435,14 +6448,14 @@
             <a:buNone/>
           </a:pPr>
           <a:r>
-            <a:rPr lang="es-AR" sz="1400" kern="1200" dirty="0"/>
+            <a:rPr lang="es-AR" sz="1300" kern="1200" dirty="0"/>
             <a:t>7 SEGMENTS</a:t>
           </a:r>
         </a:p>
       </dsp:txBody>
       <dsp:txXfrm>
-        <a:off x="4769509" y="3524824"/>
-        <a:ext cx="966779" cy="631423"/>
+        <a:off x="4831731" y="3516185"/>
+        <a:ext cx="909909" cy="594280"/>
       </dsp:txXfrm>
     </dsp:sp>
     <dsp:sp modelId="{F7EDE524-7426-42F9-9EA5-E64F8887CFAA}">
@@ -6452,8 +6465,8 @@
       </dsp:nvSpPr>
       <dsp:spPr>
         <a:xfrm>
-          <a:off x="6001442" y="2304814"/>
-          <a:ext cx="1876035" cy="268284"/>
+          <a:off x="6080477" y="2367940"/>
+          <a:ext cx="1676400" cy="252503"/>
         </a:xfrm>
         <a:custGeom>
           <a:avLst/>
@@ -6467,13 +6480,13 @@
                 <a:pt x="0" y="0"/>
               </a:moveTo>
               <a:lnTo>
-                <a:pt x="0" y="134142"/>
+                <a:pt x="0" y="126251"/>
               </a:lnTo>
               <a:lnTo>
-                <a:pt x="1876035" y="134142"/>
+                <a:pt x="1676400" y="126251"/>
               </a:lnTo>
               <a:lnTo>
-                <a:pt x="1876035" y="268284"/>
+                <a:pt x="1676400" y="252503"/>
               </a:lnTo>
             </a:path>
           </a:pathLst>
@@ -6521,8 +6534,8 @@
       </dsp:nvSpPr>
       <dsp:spPr>
         <a:xfrm>
-          <a:off x="7374444" y="2573098"/>
-          <a:ext cx="1006067" cy="670711"/>
+          <a:off x="7283434" y="2620443"/>
+          <a:ext cx="946887" cy="631258"/>
         </a:xfrm>
         <a:prstGeom prst="roundRect">
           <a:avLst>
@@ -6569,12 +6582,12 @@
         </a:fontRef>
       </dsp:style>
       <dsp:txBody>
-        <a:bodyPr spcFirstLastPara="0" vert="horz" wrap="square" lIns="53340" tIns="53340" rIns="53340" bIns="53340" numCol="1" spcCol="1270" anchor="ctr" anchorCtr="0">
+        <a:bodyPr spcFirstLastPara="0" vert="horz" wrap="square" lIns="49530" tIns="49530" rIns="49530" bIns="49530" numCol="1" spcCol="1270" anchor="ctr" anchorCtr="0">
           <a:noAutofit/>
         </a:bodyPr>
         <a:lstStyle/>
         <a:p>
-          <a:pPr marL="0" lvl="0" indent="0" algn="ctr" defTabSz="622300">
+          <a:pPr marL="0" lvl="0" indent="0" algn="ctr" defTabSz="577850">
             <a:lnSpc>
               <a:spcPct val="90000"/>
             </a:lnSpc>
@@ -6587,14 +6600,14 @@
             <a:buNone/>
           </a:pPr>
           <a:r>
-            <a:rPr lang="es-AR" sz="1400" kern="1200" dirty="0"/>
+            <a:rPr lang="es-AR" sz="1300" kern="1200" dirty="0"/>
             <a:t>LECTOR </a:t>
           </a:r>
         </a:p>
       </dsp:txBody>
       <dsp:txXfrm>
-        <a:off x="7394088" y="2592742"/>
-        <a:ext cx="966779" cy="631423"/>
+        <a:off x="7301923" y="2638932"/>
+        <a:ext cx="909909" cy="594280"/>
       </dsp:txXfrm>
     </dsp:sp>
     <dsp:sp modelId="{7D9DF814-EB3C-4A52-B166-0E4DD46DE296}">
@@ -6604,8 +6617,8 @@
       </dsp:nvSpPr>
       <dsp:spPr>
         <a:xfrm>
-          <a:off x="6569590" y="3243810"/>
-          <a:ext cx="1307887" cy="268284"/>
+          <a:off x="6525924" y="3251701"/>
+          <a:ext cx="1230953" cy="252503"/>
         </a:xfrm>
         <a:custGeom>
           <a:avLst/>
@@ -6616,16 +6629,16 @@
           <a:pathLst>
             <a:path>
               <a:moveTo>
-                <a:pt x="1307887" y="0"/>
+                <a:pt x="1230953" y="0"/>
               </a:moveTo>
               <a:lnTo>
-                <a:pt x="1307887" y="134142"/>
+                <a:pt x="1230953" y="126251"/>
               </a:lnTo>
               <a:lnTo>
-                <a:pt x="0" y="134142"/>
+                <a:pt x="0" y="126251"/>
               </a:lnTo>
               <a:lnTo>
-                <a:pt x="0" y="268284"/>
+                <a:pt x="0" y="252503"/>
               </a:lnTo>
             </a:path>
           </a:pathLst>
@@ -6673,8 +6686,8 @@
       </dsp:nvSpPr>
       <dsp:spPr>
         <a:xfrm>
-          <a:off x="6547834" y="3512095"/>
-          <a:ext cx="43512" cy="670711"/>
+          <a:off x="6158329" y="3504204"/>
+          <a:ext cx="735191" cy="631258"/>
         </a:xfrm>
         <a:prstGeom prst="roundRect">
           <a:avLst>
@@ -6721,12 +6734,12 @@
         </a:fontRef>
       </dsp:style>
       <dsp:txBody>
-        <a:bodyPr spcFirstLastPara="0" vert="horz" wrap="square" lIns="53340" tIns="53340" rIns="53340" bIns="53340" numCol="1" spcCol="1270" anchor="ctr" anchorCtr="0">
+        <a:bodyPr spcFirstLastPara="0" vert="horz" wrap="square" lIns="49530" tIns="49530" rIns="49530" bIns="49530" numCol="1" spcCol="1270" anchor="ctr" anchorCtr="0">
           <a:noAutofit/>
         </a:bodyPr>
         <a:lstStyle/>
         <a:p>
-          <a:pPr marL="0" lvl="0" indent="0" algn="ctr" defTabSz="622300">
+          <a:pPr marL="0" lvl="0" indent="0" algn="ctr" defTabSz="577850">
             <a:lnSpc>
               <a:spcPct val="90000"/>
             </a:lnSpc>
@@ -6738,12 +6751,15 @@
             </a:spcAft>
             <a:buNone/>
           </a:pPr>
-          <a:endParaRPr lang="es-AR" sz="1400" kern="1200" dirty="0"/>
+          <a:r>
+            <a:rPr lang="es-AR" sz="1300" kern="1200" dirty="0"/>
+            <a:t>LOW HAL</a:t>
+          </a:r>
         </a:p>
       </dsp:txBody>
       <dsp:txXfrm>
-        <a:off x="6549108" y="3513369"/>
-        <a:ext cx="40964" cy="668163"/>
+        <a:off x="6176818" y="3522693"/>
+        <a:ext cx="698213" cy="594280"/>
       </dsp:txXfrm>
     </dsp:sp>
     <dsp:sp modelId="{6693D620-D3B4-43A1-8165-358A23FCEFAD}">
@@ -6753,8 +6769,8 @@
       </dsp:nvSpPr>
       <dsp:spPr>
         <a:xfrm>
-          <a:off x="6523870" y="4182807"/>
-          <a:ext cx="91440" cy="268284"/>
+          <a:off x="6480204" y="4135462"/>
+          <a:ext cx="91440" cy="252503"/>
         </a:xfrm>
         <a:custGeom>
           <a:avLst/>
@@ -6768,7 +6784,7 @@
                 <a:pt x="45720" y="0"/>
               </a:moveTo>
               <a:lnTo>
-                <a:pt x="45720" y="268284"/>
+                <a:pt x="45720" y="252503"/>
               </a:lnTo>
             </a:path>
           </a:pathLst>
@@ -6816,8 +6832,8 @@
       </dsp:nvSpPr>
       <dsp:spPr>
         <a:xfrm>
-          <a:off x="6066556" y="4451091"/>
-          <a:ext cx="1006067" cy="670711"/>
+          <a:off x="6052481" y="4387965"/>
+          <a:ext cx="946887" cy="631258"/>
         </a:xfrm>
         <a:prstGeom prst="roundRect">
           <a:avLst>
@@ -6864,12 +6880,12 @@
         </a:fontRef>
       </dsp:style>
       <dsp:txBody>
-        <a:bodyPr spcFirstLastPara="0" vert="horz" wrap="square" lIns="53340" tIns="53340" rIns="53340" bIns="53340" numCol="1" spcCol="1270" anchor="ctr" anchorCtr="0">
+        <a:bodyPr spcFirstLastPara="0" vert="horz" wrap="square" lIns="49530" tIns="49530" rIns="49530" bIns="49530" numCol="1" spcCol="1270" anchor="ctr" anchorCtr="0">
           <a:noAutofit/>
         </a:bodyPr>
         <a:lstStyle/>
         <a:p>
-          <a:pPr marL="0" lvl="0" indent="0" algn="ctr" defTabSz="622300">
+          <a:pPr marL="0" lvl="0" indent="0" algn="ctr" defTabSz="577850">
             <a:lnSpc>
               <a:spcPct val="90000"/>
             </a:lnSpc>
@@ -6882,14 +6898,14 @@
             <a:buNone/>
           </a:pPr>
           <a:r>
-            <a:rPr lang="es-AR" sz="1400" kern="1200" dirty="0"/>
+            <a:rPr lang="es-AR" sz="1300" kern="1200" dirty="0"/>
             <a:t>GPIO</a:t>
           </a:r>
         </a:p>
       </dsp:txBody>
       <dsp:txXfrm>
-        <a:off x="6086200" y="4470735"/>
-        <a:ext cx="966779" cy="631423"/>
+        <a:off x="6070970" y="4406454"/>
+        <a:ext cx="909909" cy="594280"/>
       </dsp:txXfrm>
     </dsp:sp>
     <dsp:sp modelId="{E6E5601B-39F7-4D6D-B067-78B9A4C88F76}">
@@ -6899,8 +6915,8 @@
       </dsp:nvSpPr>
       <dsp:spPr>
         <a:xfrm>
-          <a:off x="7396200" y="3243810"/>
-          <a:ext cx="481277" cy="268284"/>
+          <a:off x="7651030" y="3251701"/>
+          <a:ext cx="105847" cy="252503"/>
         </a:xfrm>
         <a:custGeom>
           <a:avLst/>
@@ -6911,16 +6927,16 @@
           <a:pathLst>
             <a:path>
               <a:moveTo>
-                <a:pt x="481277" y="0"/>
+                <a:pt x="105847" y="0"/>
               </a:moveTo>
               <a:lnTo>
-                <a:pt x="481277" y="134142"/>
+                <a:pt x="105847" y="126251"/>
               </a:lnTo>
               <a:lnTo>
-                <a:pt x="0" y="134142"/>
+                <a:pt x="0" y="126251"/>
               </a:lnTo>
               <a:lnTo>
-                <a:pt x="0" y="268284"/>
+                <a:pt x="0" y="252503"/>
               </a:lnTo>
             </a:path>
           </a:pathLst>
@@ -6968,8 +6984,8 @@
       </dsp:nvSpPr>
       <dsp:spPr>
         <a:xfrm>
-          <a:off x="6893166" y="3512095"/>
-          <a:ext cx="1006067" cy="670711"/>
+          <a:off x="7177586" y="3504204"/>
+          <a:ext cx="946887" cy="631258"/>
         </a:xfrm>
         <a:prstGeom prst="roundRect">
           <a:avLst>
@@ -7016,12 +7032,12 @@
         </a:fontRef>
       </dsp:style>
       <dsp:txBody>
-        <a:bodyPr spcFirstLastPara="0" vert="horz" wrap="square" lIns="53340" tIns="53340" rIns="53340" bIns="53340" numCol="1" spcCol="1270" anchor="ctr" anchorCtr="0">
+        <a:bodyPr spcFirstLastPara="0" vert="horz" wrap="square" lIns="49530" tIns="49530" rIns="49530" bIns="49530" numCol="1" spcCol="1270" anchor="ctr" anchorCtr="0">
           <a:noAutofit/>
         </a:bodyPr>
         <a:lstStyle/>
         <a:p>
-          <a:pPr marL="0" lvl="0" indent="0" algn="ctr" defTabSz="622300">
+          <a:pPr marL="0" lvl="0" indent="0" algn="ctr" defTabSz="577850">
             <a:lnSpc>
               <a:spcPct val="90000"/>
             </a:lnSpc>
@@ -7034,14 +7050,14 @@
             <a:buNone/>
           </a:pPr>
           <a:r>
-            <a:rPr lang="es-AR" sz="1400" kern="1200" dirty="0"/>
+            <a:rPr lang="es-AR" sz="1300" kern="1200" dirty="0"/>
             <a:t>DECODER</a:t>
           </a:r>
         </a:p>
       </dsp:txBody>
       <dsp:txXfrm>
-        <a:off x="6912810" y="3531739"/>
-        <a:ext cx="966779" cy="631423"/>
+        <a:off x="7196075" y="3522693"/>
+        <a:ext cx="909909" cy="594280"/>
       </dsp:txXfrm>
     </dsp:sp>
     <dsp:sp modelId="{7F15DC38-3E35-4ED9-83CB-208CB23EA7A4}">
@@ -7051,8 +7067,8 @@
       </dsp:nvSpPr>
       <dsp:spPr>
         <a:xfrm>
-          <a:off x="7877478" y="3243810"/>
-          <a:ext cx="826610" cy="268284"/>
+          <a:off x="7756878" y="3251701"/>
+          <a:ext cx="1125105" cy="252503"/>
         </a:xfrm>
         <a:custGeom>
           <a:avLst/>
@@ -7066,13 +7082,13 @@
                 <a:pt x="0" y="0"/>
               </a:moveTo>
               <a:lnTo>
-                <a:pt x="0" y="134142"/>
+                <a:pt x="0" y="126251"/>
               </a:lnTo>
               <a:lnTo>
-                <a:pt x="826610" y="134142"/>
+                <a:pt x="1125105" y="126251"/>
               </a:lnTo>
               <a:lnTo>
-                <a:pt x="826610" y="268284"/>
+                <a:pt x="1125105" y="252503"/>
               </a:lnTo>
             </a:path>
           </a:pathLst>
@@ -7120,8 +7136,8 @@
       </dsp:nvSpPr>
       <dsp:spPr>
         <a:xfrm>
-          <a:off x="8201054" y="3512095"/>
-          <a:ext cx="1006067" cy="670711"/>
+          <a:off x="8408540" y="3504204"/>
+          <a:ext cx="946887" cy="631258"/>
         </a:xfrm>
         <a:prstGeom prst="roundRect">
           <a:avLst>
@@ -7168,12 +7184,12 @@
         </a:fontRef>
       </dsp:style>
       <dsp:txBody>
-        <a:bodyPr spcFirstLastPara="0" vert="horz" wrap="square" lIns="53340" tIns="53340" rIns="53340" bIns="53340" numCol="1" spcCol="1270" anchor="ctr" anchorCtr="0">
+        <a:bodyPr spcFirstLastPara="0" vert="horz" wrap="square" lIns="49530" tIns="49530" rIns="49530" bIns="49530" numCol="1" spcCol="1270" anchor="ctr" anchorCtr="0">
           <a:noAutofit/>
         </a:bodyPr>
         <a:lstStyle/>
         <a:p>
-          <a:pPr marL="0" lvl="0" indent="0" algn="ctr" defTabSz="622300">
+          <a:pPr marL="0" lvl="0" indent="0" algn="ctr" defTabSz="577850">
             <a:lnSpc>
               <a:spcPct val="90000"/>
             </a:lnSpc>
@@ -7186,14 +7202,14 @@
             <a:buNone/>
           </a:pPr>
           <a:r>
-            <a:rPr lang="es-AR" sz="1400" kern="1200" dirty="0"/>
+            <a:rPr lang="es-AR" sz="1300" kern="1200" dirty="0"/>
             <a:t>STANDARD</a:t>
           </a:r>
         </a:p>
       </dsp:txBody>
       <dsp:txXfrm>
-        <a:off x="8220698" y="3531739"/>
-        <a:ext cx="966779" cy="631423"/>
+        <a:off x="8427029" y="3522693"/>
+        <a:ext cx="909909" cy="594280"/>
       </dsp:txXfrm>
     </dsp:sp>
     <dsp:sp modelId="{5B1BDFAD-02C6-44F1-B889-E8B7F6D74DD3}">
@@ -7203,8 +7219,8 @@
       </dsp:nvSpPr>
       <dsp:spPr>
         <a:xfrm>
-          <a:off x="6001442" y="2304814"/>
-          <a:ext cx="4426140" cy="268284"/>
+          <a:off x="6080477" y="2367940"/>
+          <a:ext cx="4423618" cy="252503"/>
         </a:xfrm>
         <a:custGeom>
           <a:avLst/>
@@ -7218,13 +7234,13 @@
                 <a:pt x="0" y="0"/>
               </a:moveTo>
               <a:lnTo>
-                <a:pt x="0" y="134142"/>
+                <a:pt x="0" y="126251"/>
               </a:lnTo>
               <a:lnTo>
-                <a:pt x="4426140" y="134142"/>
+                <a:pt x="4423618" y="126251"/>
               </a:lnTo>
               <a:lnTo>
-                <a:pt x="4426140" y="268284"/>
+                <a:pt x="4423618" y="252503"/>
               </a:lnTo>
             </a:path>
           </a:pathLst>
@@ -7272,8 +7288,8 @@
       </dsp:nvSpPr>
       <dsp:spPr>
         <a:xfrm>
-          <a:off x="9924549" y="2573098"/>
-          <a:ext cx="1006067" cy="670711"/>
+          <a:off x="10030652" y="2620443"/>
+          <a:ext cx="946887" cy="631258"/>
         </a:xfrm>
         <a:prstGeom prst="roundRect">
           <a:avLst>
@@ -7320,12 +7336,12 @@
         </a:fontRef>
       </dsp:style>
       <dsp:txBody>
-        <a:bodyPr spcFirstLastPara="0" vert="horz" wrap="square" lIns="53340" tIns="53340" rIns="53340" bIns="53340" numCol="1" spcCol="1270" anchor="ctr" anchorCtr="0">
+        <a:bodyPr spcFirstLastPara="0" vert="horz" wrap="square" lIns="49530" tIns="49530" rIns="49530" bIns="49530" numCol="1" spcCol="1270" anchor="ctr" anchorCtr="0">
           <a:noAutofit/>
         </a:bodyPr>
         <a:lstStyle/>
         <a:p>
-          <a:pPr marL="0" lvl="0" indent="0" algn="ctr" defTabSz="622300">
+          <a:pPr marL="0" lvl="0" indent="0" algn="ctr" defTabSz="577850">
             <a:lnSpc>
               <a:spcPct val="90000"/>
             </a:lnSpc>
@@ -7338,14 +7354,14 @@
             <a:buNone/>
           </a:pPr>
           <a:r>
-            <a:rPr lang="es-AR" sz="1400" kern="1200" dirty="0"/>
+            <a:rPr lang="es-AR" sz="1300" kern="1200" dirty="0"/>
             <a:t>DOOR MANAGER</a:t>
           </a:r>
         </a:p>
       </dsp:txBody>
       <dsp:txXfrm>
-        <a:off x="9944193" y="2592742"/>
-        <a:ext cx="966779" cy="631423"/>
+        <a:off x="10049141" y="2638932"/>
+        <a:ext cx="909909" cy="594280"/>
       </dsp:txXfrm>
     </dsp:sp>
     <dsp:sp modelId="{15A86F3B-D9E7-41FD-8AB1-37718931BB58}">
@@ -7355,8 +7371,8 @@
       </dsp:nvSpPr>
       <dsp:spPr>
         <a:xfrm>
-          <a:off x="10011976" y="3243810"/>
-          <a:ext cx="415606" cy="268284"/>
+          <a:off x="10112937" y="3251701"/>
+          <a:ext cx="391159" cy="252503"/>
         </a:xfrm>
         <a:custGeom>
           <a:avLst/>
@@ -7367,16 +7383,16 @@
           <a:pathLst>
             <a:path>
               <a:moveTo>
-                <a:pt x="415606" y="0"/>
+                <a:pt x="391159" y="0"/>
               </a:moveTo>
               <a:lnTo>
-                <a:pt x="415606" y="134142"/>
+                <a:pt x="391159" y="126251"/>
               </a:lnTo>
               <a:lnTo>
-                <a:pt x="0" y="134142"/>
+                <a:pt x="0" y="126251"/>
               </a:lnTo>
               <a:lnTo>
-                <a:pt x="0" y="268284"/>
+                <a:pt x="0" y="252503"/>
               </a:lnTo>
             </a:path>
           </a:pathLst>
@@ -7424,8 +7440,8 @@
       </dsp:nvSpPr>
       <dsp:spPr>
         <a:xfrm>
-          <a:off x="9508942" y="3512095"/>
-          <a:ext cx="1006067" cy="670711"/>
+          <a:off x="9639493" y="3504204"/>
+          <a:ext cx="946887" cy="631258"/>
         </a:xfrm>
         <a:prstGeom prst="roundRect">
           <a:avLst>
@@ -7472,12 +7488,12 @@
         </a:fontRef>
       </dsp:style>
       <dsp:txBody>
-        <a:bodyPr spcFirstLastPara="0" vert="horz" wrap="square" lIns="53340" tIns="53340" rIns="53340" bIns="53340" numCol="1" spcCol="1270" anchor="ctr" anchorCtr="0">
+        <a:bodyPr spcFirstLastPara="0" vert="horz" wrap="square" lIns="49530" tIns="49530" rIns="49530" bIns="49530" numCol="1" spcCol="1270" anchor="ctr" anchorCtr="0">
           <a:noAutofit/>
         </a:bodyPr>
         <a:lstStyle/>
         <a:p>
-          <a:pPr marL="0" lvl="0" indent="0" algn="ctr" defTabSz="622300">
+          <a:pPr marL="0" lvl="0" indent="0" algn="ctr" defTabSz="577850">
             <a:lnSpc>
               <a:spcPct val="90000"/>
             </a:lnSpc>
@@ -7490,14 +7506,14 @@
             <a:buNone/>
           </a:pPr>
           <a:r>
-            <a:rPr lang="es-AR" sz="1400" kern="1200" dirty="0"/>
+            <a:rPr lang="es-AR" sz="1300" kern="1200" dirty="0"/>
             <a:t>TIMER</a:t>
           </a:r>
         </a:p>
       </dsp:txBody>
       <dsp:txXfrm>
-        <a:off x="9528586" y="3531739"/>
-        <a:ext cx="966779" cy="631423"/>
+        <a:off x="9657982" y="3522693"/>
+        <a:ext cx="909909" cy="594280"/>
       </dsp:txXfrm>
     </dsp:sp>
     <dsp:sp modelId="{531E14F9-BE8E-487D-9FBC-BD239BDE74DC}">
@@ -7507,8 +7523,8 @@
       </dsp:nvSpPr>
       <dsp:spPr>
         <a:xfrm>
-          <a:off x="9966256" y="4182807"/>
-          <a:ext cx="91440" cy="268284"/>
+          <a:off x="10067217" y="4135462"/>
+          <a:ext cx="91440" cy="252503"/>
         </a:xfrm>
         <a:custGeom>
           <a:avLst/>
@@ -7522,7 +7538,7 @@
                 <a:pt x="45720" y="0"/>
               </a:moveTo>
               <a:lnTo>
-                <a:pt x="45720" y="268284"/>
+                <a:pt x="45720" y="252503"/>
               </a:lnTo>
             </a:path>
           </a:pathLst>
@@ -7570,8 +7586,8 @@
       </dsp:nvSpPr>
       <dsp:spPr>
         <a:xfrm>
-          <a:off x="9508942" y="4451091"/>
-          <a:ext cx="1006067" cy="670711"/>
+          <a:off x="9639493" y="4387965"/>
+          <a:ext cx="946887" cy="631258"/>
         </a:xfrm>
         <a:prstGeom prst="roundRect">
           <a:avLst>
@@ -7618,12 +7634,12 @@
         </a:fontRef>
       </dsp:style>
       <dsp:txBody>
-        <a:bodyPr spcFirstLastPara="0" vert="horz" wrap="square" lIns="53340" tIns="53340" rIns="53340" bIns="53340" numCol="1" spcCol="1270" anchor="ctr" anchorCtr="0">
+        <a:bodyPr spcFirstLastPara="0" vert="horz" wrap="square" lIns="49530" tIns="49530" rIns="49530" bIns="49530" numCol="1" spcCol="1270" anchor="ctr" anchorCtr="0">
           <a:noAutofit/>
         </a:bodyPr>
         <a:lstStyle/>
         <a:p>
-          <a:pPr marL="0" lvl="0" indent="0" algn="ctr" defTabSz="622300">
+          <a:pPr marL="0" lvl="0" indent="0" algn="ctr" defTabSz="577850">
             <a:lnSpc>
               <a:spcPct val="90000"/>
             </a:lnSpc>
@@ -7636,14 +7652,14 @@
             <a:buNone/>
           </a:pPr>
           <a:r>
-            <a:rPr lang="es-AR" sz="1400" kern="1200" dirty="0"/>
+            <a:rPr lang="es-AR" sz="1300" kern="1200" dirty="0"/>
             <a:t>SYSTICK</a:t>
           </a:r>
         </a:p>
       </dsp:txBody>
       <dsp:txXfrm>
-        <a:off x="9528586" y="4470735"/>
-        <a:ext cx="966779" cy="631423"/>
+        <a:off x="9657982" y="4406454"/>
+        <a:ext cx="909909" cy="594280"/>
       </dsp:txXfrm>
     </dsp:sp>
     <dsp:sp modelId="{85E03D00-B215-4479-AFBA-5CEB429504C9}">
@@ -7653,8 +7669,8 @@
       </dsp:nvSpPr>
       <dsp:spPr>
         <a:xfrm>
-          <a:off x="10427582" y="3243810"/>
-          <a:ext cx="892281" cy="268284"/>
+          <a:off x="10504096" y="3251701"/>
+          <a:ext cx="839794" cy="252503"/>
         </a:xfrm>
         <a:custGeom>
           <a:avLst/>
@@ -7668,13 +7684,13 @@
                 <a:pt x="0" y="0"/>
               </a:moveTo>
               <a:lnTo>
-                <a:pt x="0" y="134142"/>
+                <a:pt x="0" y="126251"/>
               </a:lnTo>
               <a:lnTo>
-                <a:pt x="892281" y="134142"/>
+                <a:pt x="839794" y="126251"/>
               </a:lnTo>
               <a:lnTo>
-                <a:pt x="892281" y="268284"/>
+                <a:pt x="839794" y="252503"/>
               </a:lnTo>
             </a:path>
           </a:pathLst>
@@ -7722,8 +7738,8 @@
       </dsp:nvSpPr>
       <dsp:spPr>
         <a:xfrm>
-          <a:off x="11293505" y="3512095"/>
-          <a:ext cx="52717" cy="670711"/>
+          <a:off x="11319081" y="3504204"/>
+          <a:ext cx="49616" cy="631258"/>
         </a:xfrm>
         <a:prstGeom prst="roundRect">
           <a:avLst>
@@ -7770,12 +7786,12 @@
         </a:fontRef>
       </dsp:style>
       <dsp:txBody>
-        <a:bodyPr spcFirstLastPara="0" vert="horz" wrap="square" lIns="53340" tIns="53340" rIns="53340" bIns="53340" numCol="1" spcCol="1270" anchor="ctr" anchorCtr="0">
+        <a:bodyPr spcFirstLastPara="0" vert="horz" wrap="square" lIns="49530" tIns="49530" rIns="49530" bIns="49530" numCol="1" spcCol="1270" anchor="ctr" anchorCtr="0">
           <a:noAutofit/>
         </a:bodyPr>
         <a:lstStyle/>
         <a:p>
-          <a:pPr marL="0" lvl="0" indent="0" algn="ctr" defTabSz="622300">
+          <a:pPr marL="0" lvl="0" indent="0" algn="ctr" defTabSz="577850">
             <a:lnSpc>
               <a:spcPct val="90000"/>
             </a:lnSpc>
@@ -7787,12 +7803,12 @@
             </a:spcAft>
             <a:buNone/>
           </a:pPr>
-          <a:endParaRPr lang="es-AR" sz="1400" kern="1200" dirty="0"/>
+          <a:endParaRPr lang="es-AR" sz="1300" kern="1200" dirty="0"/>
         </a:p>
       </dsp:txBody>
       <dsp:txXfrm>
-        <a:off x="11295049" y="3513639"/>
-        <a:ext cx="49629" cy="667623"/>
+        <a:off x="11320534" y="3505657"/>
+        <a:ext cx="46710" cy="628352"/>
       </dsp:txXfrm>
     </dsp:sp>
     <dsp:sp modelId="{ECB6E3E8-C365-4657-9343-AE63156F3519}">
@@ -7802,8 +7818,8 @@
       </dsp:nvSpPr>
       <dsp:spPr>
         <a:xfrm>
-          <a:off x="11274144" y="4182807"/>
-          <a:ext cx="91440" cy="268284"/>
+          <a:off x="11298170" y="4135462"/>
+          <a:ext cx="91440" cy="252503"/>
         </a:xfrm>
         <a:custGeom>
           <a:avLst/>
@@ -7817,7 +7833,7 @@
                 <a:pt x="45720" y="0"/>
               </a:moveTo>
               <a:lnTo>
-                <a:pt x="45720" y="268284"/>
+                <a:pt x="45720" y="252503"/>
               </a:lnTo>
             </a:path>
           </a:pathLst>
@@ -7865,8 +7881,8 @@
       </dsp:nvSpPr>
       <dsp:spPr>
         <a:xfrm>
-          <a:off x="10816830" y="4451091"/>
-          <a:ext cx="1006067" cy="670711"/>
+          <a:off x="10870446" y="4387965"/>
+          <a:ext cx="946887" cy="631258"/>
         </a:xfrm>
         <a:prstGeom prst="roundRect">
           <a:avLst>
@@ -7913,12 +7929,12 @@
         </a:fontRef>
       </dsp:style>
       <dsp:txBody>
-        <a:bodyPr spcFirstLastPara="0" vert="horz" wrap="square" lIns="53340" tIns="53340" rIns="53340" bIns="53340" numCol="1" spcCol="1270" anchor="ctr" anchorCtr="0">
+        <a:bodyPr spcFirstLastPara="0" vert="horz" wrap="square" lIns="49530" tIns="49530" rIns="49530" bIns="49530" numCol="1" spcCol="1270" anchor="ctr" anchorCtr="0">
           <a:noAutofit/>
         </a:bodyPr>
         <a:lstStyle/>
         <a:p>
-          <a:pPr marL="0" lvl="0" indent="0" algn="ctr" defTabSz="622300">
+          <a:pPr marL="0" lvl="0" indent="0" algn="ctr" defTabSz="577850">
             <a:lnSpc>
               <a:spcPct val="90000"/>
             </a:lnSpc>
@@ -7931,14 +7947,14 @@
             <a:buNone/>
           </a:pPr>
           <a:r>
-            <a:rPr lang="es-AR" sz="1400" kern="1200" dirty="0"/>
+            <a:rPr lang="es-AR" sz="1300" kern="1200" dirty="0"/>
             <a:t>GPIO</a:t>
           </a:r>
         </a:p>
       </dsp:txBody>
       <dsp:txXfrm>
-        <a:off x="10836474" y="4470735"/>
-        <a:ext cx="966779" cy="631423"/>
+        <a:off x="10888935" y="4406454"/>
+        <a:ext cx="909909" cy="594280"/>
       </dsp:txXfrm>
     </dsp:sp>
   </dsp:spTree>
@@ -8161,8 +8177,12 @@
             <a:buNone/>
           </a:pPr>
           <a:r>
+            <a:rPr lang="es-AR" sz="2100" kern="1200"/>
+            <a:t>LOW </a:t>
+          </a:r>
+          <a:r>
             <a:rPr lang="es-AR" sz="2100" kern="1200" dirty="0"/>
-            <a:t>ENCODER HAL</a:t>
+            <a:t>HAL</a:t>
           </a:r>
         </a:p>
       </dsp:txBody>
@@ -14915,7 +14935,7 @@
           <a:p>
             <a:fld id="{78ABE3C1-DBE1-495D-B57B-2849774B866A}" type="datetimeFigureOut">
               <a:rPr lang="en-US" dirty="0"/>
-              <a:t>13-Sep-19</a:t>
+              <a:t>9/13/2019</a:t>
             </a:fld>
             <a:endParaRPr lang="en-US" dirty="0"/>
           </a:p>
@@ -14962,7 +14982,7 @@
           <a:p>
             <a:fld id="{6D22F896-40B5-4ADD-8801-0D06FADFA095}" type="slidenum">
               <a:rPr lang="en-US" dirty="0"/>
-              <a:t>‹#›</a:t>
+              <a:t>‹Nº›</a:t>
             </a:fld>
             <a:endParaRPr lang="en-US" dirty="0"/>
           </a:p>
@@ -15324,7 +15344,7 @@
           <a:p>
             <a:fld id="{446C117F-5CCF-4837-BE5F-2B92066CAFAF}" type="datetimeFigureOut">
               <a:rPr lang="en-US" dirty="0"/>
-              <a:t>13-Sep-19</a:t>
+              <a:t>9/13/2019</a:t>
             </a:fld>
             <a:endParaRPr lang="en-US" dirty="0"/>
           </a:p>
@@ -15371,7 +15391,7 @@
           <a:p>
             <a:fld id="{6D22F896-40B5-4ADD-8801-0D06FADFA095}" type="slidenum">
               <a:rPr lang="en-US" dirty="0"/>
-              <a:t>‹#›</a:t>
+              <a:t>‹Nº›</a:t>
             </a:fld>
             <a:endParaRPr lang="en-US" dirty="0"/>
           </a:p>
@@ -15655,7 +15675,7 @@
           <a:p>
             <a:fld id="{84EB90BD-B6CE-46B7-997F-7313B992CCDC}" type="datetimeFigureOut">
               <a:rPr lang="en-US" dirty="0"/>
-              <a:t>13-Sep-19</a:t>
+              <a:t>9/13/2019</a:t>
             </a:fld>
             <a:endParaRPr lang="en-US" dirty="0"/>
           </a:p>
@@ -15702,7 +15722,7 @@
           <a:p>
             <a:fld id="{6D22F896-40B5-4ADD-8801-0D06FADFA095}" type="slidenum">
               <a:rPr lang="en-US" dirty="0"/>
-              <a:t>‹#›</a:t>
+              <a:t>‹Nº›</a:t>
             </a:fld>
             <a:endParaRPr lang="en-US" dirty="0"/>
           </a:p>
@@ -16055,7 +16075,7 @@
           <a:p>
             <a:fld id="{CDB9D11F-B188-461D-B23F-39381795C052}" type="datetimeFigureOut">
               <a:rPr lang="en-US" dirty="0"/>
-              <a:t>13-Sep-19</a:t>
+              <a:t>9/13/2019</a:t>
             </a:fld>
             <a:endParaRPr lang="en-US" dirty="0"/>
           </a:p>
@@ -16102,7 +16122,7 @@
           <a:p>
             <a:fld id="{6D22F896-40B5-4ADD-8801-0D06FADFA095}" type="slidenum">
               <a:rPr lang="en-US" dirty="0"/>
-              <a:t>‹#›</a:t>
+              <a:t>‹Nº›</a:t>
             </a:fld>
             <a:endParaRPr lang="en-US" dirty="0"/>
           </a:p>
@@ -16618,7 +16638,7 @@
           <a:p>
             <a:fld id="{52E6D8D9-55A2-4063-B0F3-121F44549695}" type="datetimeFigureOut">
               <a:rPr lang="en-US" dirty="0"/>
-              <a:t>13-Sep-19</a:t>
+              <a:t>9/13/2019</a:t>
             </a:fld>
             <a:endParaRPr lang="en-US" dirty="0"/>
           </a:p>
@@ -16665,7 +16685,7 @@
           <a:p>
             <a:fld id="{6D22F896-40B5-4ADD-8801-0D06FADFA095}" type="slidenum">
               <a:rPr lang="en-US" dirty="0"/>
-              <a:t>‹#›</a:t>
+              <a:t>‹Nº›</a:t>
             </a:fld>
             <a:endParaRPr lang="en-US" dirty="0"/>
           </a:p>
@@ -17294,7 +17314,7 @@
           <a:p>
             <a:fld id="{D4B24536-994D-4021-A283-9F449C0DB509}" type="datetimeFigureOut">
               <a:rPr lang="en-US" dirty="0"/>
-              <a:t>13-Sep-19</a:t>
+              <a:t>9/13/2019</a:t>
             </a:fld>
             <a:endParaRPr lang="en-US" dirty="0"/>
           </a:p>
@@ -17336,7 +17356,7 @@
           <a:p>
             <a:fld id="{6D22F896-40B5-4ADD-8801-0D06FADFA095}" type="slidenum">
               <a:rPr lang="en-US" dirty="0"/>
-              <a:t>‹#›</a:t>
+              <a:t>‹Nº›</a:t>
             </a:fld>
             <a:endParaRPr lang="en-US" dirty="0"/>
           </a:p>
@@ -18202,7 +18222,7 @@
           <a:p>
             <a:fld id="{3CBBBB78-C96F-47B7-AB17-D852CA960AC9}" type="datetimeFigureOut">
               <a:rPr lang="en-US" dirty="0"/>
-              <a:t>13-Sep-19</a:t>
+              <a:t>9/13/2019</a:t>
             </a:fld>
             <a:endParaRPr lang="en-US" dirty="0"/>
           </a:p>
@@ -18244,7 +18264,7 @@
           <a:p>
             <a:fld id="{6D22F896-40B5-4ADD-8801-0D06FADFA095}" type="slidenum">
               <a:rPr lang="en-US" dirty="0"/>
-              <a:t>‹#›</a:t>
+              <a:t>‹Nº›</a:t>
             </a:fld>
             <a:endParaRPr lang="en-US" dirty="0"/>
           </a:p>
@@ -18510,7 +18530,7 @@
           <a:p>
             <a:fld id="{1FA3F48C-C7C6-4055-9F49-3777875E72AE}" type="datetimeFigureOut">
               <a:rPr lang="en-US" dirty="0"/>
-              <a:t>13-Sep-19</a:t>
+              <a:t>9/13/2019</a:t>
             </a:fld>
             <a:endParaRPr lang="en-US" dirty="0"/>
           </a:p>
@@ -18552,7 +18572,7 @@
           <a:p>
             <a:fld id="{6D22F896-40B5-4ADD-8801-0D06FADFA095}" type="slidenum">
               <a:rPr lang="en-US" dirty="0"/>
-              <a:t>‹#›</a:t>
+              <a:t>‹Nº›</a:t>
             </a:fld>
             <a:endParaRPr lang="en-US" dirty="0"/>
           </a:p>
@@ -18769,7 +18789,7 @@
           <a:p>
             <a:fld id="{6178E61D-D431-422C-9764-11DAFE33AB63}" type="datetimeFigureOut">
               <a:rPr lang="en-US" dirty="0"/>
-              <a:t>13-Sep-19</a:t>
+              <a:t>9/13/2019</a:t>
             </a:fld>
             <a:endParaRPr lang="en-US" dirty="0"/>
           </a:p>
@@ -18826,7 +18846,7 @@
             <a:fld id="{6D22F896-40B5-4ADD-8801-0D06FADFA095}" type="slidenum">
               <a:rPr lang="en-US" dirty="0"/>
               <a:pPr/>
-              <a:t>‹#›</a:t>
+              <a:t>‹Nº›</a:t>
             </a:fld>
             <a:endParaRPr lang="en-US" dirty="0"/>
           </a:p>
@@ -19088,7 +19108,7 @@
           <a:p>
             <a:fld id="{12DE42F4-6EEF-4EF7-8ED4-2208F0F89A08}" type="datetimeFigureOut">
               <a:rPr lang="en-US" dirty="0"/>
-              <a:t>13-Sep-19</a:t>
+              <a:t>9/13/2019</a:t>
             </a:fld>
             <a:endParaRPr lang="en-US" dirty="0"/>
           </a:p>
@@ -19130,7 +19150,7 @@
           <a:p>
             <a:fld id="{6D22F896-40B5-4ADD-8801-0D06FADFA095}" type="slidenum">
               <a:rPr lang="en-US" dirty="0"/>
-              <a:t>‹#›</a:t>
+              <a:t>‹Nº›</a:t>
             </a:fld>
             <a:endParaRPr lang="en-US" dirty="0"/>
           </a:p>
@@ -19472,7 +19492,7 @@
           <a:p>
             <a:fld id="{30578ACC-22D6-47C1-A373-4FD133E34F3C}" type="datetimeFigureOut">
               <a:rPr lang="en-US" dirty="0"/>
-              <a:t>13-Sep-19</a:t>
+              <a:t>9/13/2019</a:t>
             </a:fld>
             <a:endParaRPr lang="en-US" dirty="0"/>
           </a:p>
@@ -19519,7 +19539,7 @@
           <a:p>
             <a:fld id="{6D22F896-40B5-4ADD-8801-0D06FADFA095}" type="slidenum">
               <a:rPr lang="en-US" dirty="0"/>
-              <a:t>‹#›</a:t>
+              <a:t>‹Nº›</a:t>
             </a:fld>
             <a:endParaRPr lang="en-US" dirty="0"/>
           </a:p>
@@ -19843,7 +19863,7 @@
           <a:p>
             <a:fld id="{4E5A6C69-6797-4E8A-BF37-F2C3751466E9}" type="datetimeFigureOut">
               <a:rPr lang="en-US" dirty="0"/>
-              <a:t>13-Sep-19</a:t>
+              <a:t>9/13/2019</a:t>
             </a:fld>
             <a:endParaRPr lang="en-US" dirty="0"/>
           </a:p>
@@ -19885,7 +19905,7 @@
           <a:p>
             <a:fld id="{6D22F896-40B5-4ADD-8801-0D06FADFA095}" type="slidenum">
               <a:rPr lang="en-US" dirty="0"/>
-              <a:t>‹#›</a:t>
+              <a:t>‹Nº›</a:t>
             </a:fld>
             <a:endParaRPr lang="en-US" dirty="0"/>
           </a:p>
@@ -20344,7 +20364,7 @@
           <a:p>
             <a:fld id="{D82014A1-A632-4878-A0D3-F52BA7563730}" type="datetimeFigureOut">
               <a:rPr lang="en-US" dirty="0"/>
-              <a:t>13-Sep-19</a:t>
+              <a:t>9/13/2019</a:t>
             </a:fld>
             <a:endParaRPr lang="en-US" dirty="0"/>
           </a:p>
@@ -20386,7 +20406,7 @@
           <a:p>
             <a:fld id="{6D22F896-40B5-4ADD-8801-0D06FADFA095}" type="slidenum">
               <a:rPr lang="en-US" dirty="0"/>
-              <a:t>‹#›</a:t>
+              <a:t>‹Nº›</a:t>
             </a:fld>
             <a:endParaRPr lang="en-US" dirty="0"/>
           </a:p>
@@ -20596,7 +20616,7 @@
           <a:p>
             <a:fld id="{CE99F462-093F-4566-844B-4C71F2739DA5}" type="datetimeFigureOut">
               <a:rPr lang="en-US" dirty="0"/>
-              <a:t>13-Sep-19</a:t>
+              <a:t>9/13/2019</a:t>
             </a:fld>
             <a:endParaRPr lang="en-US" dirty="0"/>
           </a:p>
@@ -20638,7 +20658,7 @@
           <a:p>
             <a:fld id="{6D22F896-40B5-4ADD-8801-0D06FADFA095}" type="slidenum">
               <a:rPr lang="en-US" dirty="0"/>
-              <a:t>‹#›</a:t>
+              <a:t>‹Nº›</a:t>
             </a:fld>
             <a:endParaRPr lang="en-US" dirty="0"/>
           </a:p>
@@ -20754,7 +20774,7 @@
           <a:p>
             <a:fld id="{3D24A7AC-904D-4781-85BA-7D10C17ED021}" type="datetimeFigureOut">
               <a:rPr lang="en-US" dirty="0"/>
-              <a:t>13-Sep-19</a:t>
+              <a:t>9/13/2019</a:t>
             </a:fld>
             <a:endParaRPr lang="en-US" dirty="0"/>
           </a:p>
@@ -20796,7 +20816,7 @@
           <a:p>
             <a:fld id="{6D22F896-40B5-4ADD-8801-0D06FADFA095}" type="slidenum">
               <a:rPr lang="en-US" dirty="0"/>
-              <a:t>‹#›</a:t>
+              <a:t>‹Nº›</a:t>
             </a:fld>
             <a:endParaRPr lang="en-US" dirty="0"/>
           </a:p>
@@ -21139,7 +21159,7 @@
           <a:p>
             <a:fld id="{E331444B-B92B-4E27-8C94-BB93EAF5CB18}" type="datetimeFigureOut">
               <a:rPr lang="en-US" dirty="0"/>
-              <a:t>13-Sep-19</a:t>
+              <a:t>9/13/2019</a:t>
             </a:fld>
             <a:endParaRPr lang="en-US" dirty="0"/>
           </a:p>
@@ -21181,7 +21201,7 @@
           <a:p>
             <a:fld id="{6D22F896-40B5-4ADD-8801-0D06FADFA095}" type="slidenum">
               <a:rPr lang="en-US" dirty="0"/>
-              <a:t>‹#›</a:t>
+              <a:t>‹Nº›</a:t>
             </a:fld>
             <a:endParaRPr lang="en-US" dirty="0"/>
           </a:p>
@@ -21543,7 +21563,7 @@
           <a:p>
             <a:fld id="{363EFA5E-FA76-400D-B3DC-F0BA90E6D107}" type="datetimeFigureOut">
               <a:rPr lang="en-US" dirty="0"/>
-              <a:t>13-Sep-19</a:t>
+              <a:t>9/13/2019</a:t>
             </a:fld>
             <a:endParaRPr lang="en-US" dirty="0"/>
           </a:p>
@@ -21585,7 +21605,7 @@
           <a:p>
             <a:fld id="{6D22F896-40B5-4ADD-8801-0D06FADFA095}" type="slidenum">
               <a:rPr lang="en-US" dirty="0"/>
-              <a:t>‹#›</a:t>
+              <a:t>‹Nº›</a:t>
             </a:fld>
             <a:endParaRPr lang="en-US" dirty="0"/>
           </a:p>
@@ -21782,7 +21802,7 @@
           <a:p>
             <a:fld id="{9D6E9DEC-419B-4CC5-A080-3B06BD5A8291}" type="datetimeFigureOut">
               <a:rPr lang="en-US" dirty="0"/>
-              <a:t>13-Sep-19</a:t>
+              <a:t>9/13/2019</a:t>
             </a:fld>
             <a:endParaRPr lang="en-US" dirty="0"/>
           </a:p>
@@ -21861,7 +21881,7 @@
             <a:fld id="{6D22F896-40B5-4ADD-8801-0D06FADFA095}" type="slidenum">
               <a:rPr lang="en-US" dirty="0"/>
               <a:pPr/>
-              <a:t>‹#›</a:t>
+              <a:t>‹Nº›</a:t>
             </a:fld>
             <a:endParaRPr lang="en-US" dirty="0"/>
           </a:p>
@@ -22345,13 +22365,8 @@
           <a:p>
             <a:r>
               <a:rPr lang="es-AR" dirty="0"/>
-              <a:t>Eventos de </a:t>
-            </a:r>
-            <a:r>
-              <a:rPr lang="es-AR" dirty="0" err="1"/>
-              <a:t>Encoder</a:t>
-            </a:r>
-            <a:endParaRPr lang="es-AR" dirty="0"/>
+              <a:t>Eventos de Encoder</a:t>
+            </a:r>
           </a:p>
         </p:txBody>
       </p:sp>
@@ -22854,6 +22869,36 @@
           </a:p>
         </p:txBody>
       </p:sp>
+      <p:pic>
+        <p:nvPicPr>
+          <p:cNvPr id="5" name="Imagen 4">
+            <a:extLst>
+              <a:ext uri="{FF2B5EF4-FFF2-40B4-BE49-F238E27FC236}">
+                <a16:creationId xmlns:a16="http://schemas.microsoft.com/office/drawing/2014/main" id="{371D79A3-402C-4E89-A0A4-91A3A89FBC31}"/>
+              </a:ext>
+            </a:extLst>
+          </p:cNvPr>
+          <p:cNvPicPr>
+            <a:picLocks noChangeAspect="1"/>
+          </p:cNvPicPr>
+          <p:nvPr/>
+        </p:nvPicPr>
+        <p:blipFill>
+          <a:blip r:embed="rId2"/>
+          <a:stretch>
+            <a:fillRect/>
+          </a:stretch>
+        </p:blipFill>
+        <p:spPr>
+          <a:xfrm>
+            <a:off x="1066800" y="4825219"/>
+            <a:ext cx="10058400" cy="1640180"/>
+          </a:xfrm>
+          <a:prstGeom prst="rect">
+            <a:avLst/>
+          </a:prstGeom>
+        </p:spPr>
+      </p:pic>
     </p:spTree>
     <p:extLst>
       <p:ext uri="{BB962C8B-B14F-4D97-AF65-F5344CB8AC3E}">
@@ -22954,7 +22999,7 @@
           <a:p>
             <a:r>
               <a:rPr lang="es-AR" sz="2400" dirty="0"/>
-              <a:t>(x useg de duración)</a:t>
+              <a:t>(2 useg de duración)</a:t>
             </a:r>
           </a:p>
           <a:p>
@@ -22969,7 +23014,7 @@
           <a:p>
             <a:r>
               <a:rPr lang="es-AR" sz="2400" dirty="0"/>
-              <a:t>(x useg de duración)</a:t>
+              <a:t>(3 useg de duración)</a:t>
             </a:r>
           </a:p>
           <a:p>
@@ -22984,7 +23029,7 @@
           <a:p>
             <a:r>
               <a:rPr lang="es-AR" sz="2400" dirty="0"/>
-              <a:t>(x useg de duración)</a:t>
+              <a:t>(2 useg de duración)</a:t>
             </a:r>
           </a:p>
           <a:p>
@@ -23386,6 +23431,41 @@
 <file path=ppt/slides/slide17.xml><?xml version="1.0" encoding="utf-8"?>
 <p:sld xmlns:a="http://schemas.openxmlformats.org/drawingml/2006/main" xmlns:r="http://schemas.openxmlformats.org/officeDocument/2006/relationships" xmlns:p="http://schemas.openxmlformats.org/presentationml/2006/main">
   <p:cSld>
+    <p:bg>
+      <p:bgPr>
+        <a:gradFill rotWithShape="1">
+          <a:gsLst>
+            <a:gs pos="0">
+              <a:schemeClr val="bg2">
+                <a:tint val="96000"/>
+                <a:shade val="100000"/>
+                <a:hueMod val="270000"/>
+                <a:satMod val="200000"/>
+                <a:lumMod val="128000"/>
+              </a:schemeClr>
+            </a:gs>
+            <a:gs pos="50000">
+              <a:schemeClr val="bg2">
+                <a:shade val="100000"/>
+                <a:hueMod val="100000"/>
+                <a:satMod val="110000"/>
+                <a:lumMod val="130000"/>
+              </a:schemeClr>
+            </a:gs>
+            <a:gs pos="100000">
+              <a:schemeClr val="bg2">
+                <a:shade val="78000"/>
+                <a:hueMod val="44000"/>
+                <a:satMod val="200000"/>
+                <a:lumMod val="69000"/>
+              </a:schemeClr>
+            </a:gs>
+          </a:gsLst>
+          <a:lin ang="2520000" scaled="0"/>
+        </a:gradFill>
+        <a:effectLst/>
+      </p:bgPr>
+    </p:bg>
     <p:spTree>
       <p:nvGrpSpPr>
         <p:cNvPr id="1" name=""/>
@@ -23400,6 +23480,468 @@
           <a:chExt cx="0" cy="0"/>
         </a:xfrm>
       </p:grpSpPr>
+      <p:pic>
+        <p:nvPicPr>
+          <p:cNvPr id="7" name="Picture 6">
+            <a:extLst>
+              <a:ext uri="{FF2B5EF4-FFF2-40B4-BE49-F238E27FC236}">
+                <a16:creationId xmlns:a16="http://schemas.microsoft.com/office/drawing/2014/main" id="{AC3E6C53-102E-4ACA-BCBB-3CC973B99486}"/>
+              </a:ext>
+              <a:ext uri="{C183D7F6-B498-43B3-948B-1728B52AA6E4}">
+                <adec:decorative xmlns:adec="http://schemas.microsoft.com/office/drawing/2017/decorative" val="1"/>
+              </a:ext>
+            </a:extLst>
+          </p:cNvPr>
+          <p:cNvPicPr>
+            <a:picLocks noGrp="1" noRot="1" noChangeAspect="1" noMove="1" noResize="1" noEditPoints="1" noAdjustHandles="1" noChangeArrowheads="1" noChangeShapeType="1" noCrop="1"/>
+          </p:cNvPicPr>
+          <p:nvPr>
+            <p:extLst>
+              <p:ext uri="{386F3935-93C4-4BCD-93E2-E3B085C9AB24}">
+                <p16:designElem xmlns:p16="http://schemas.microsoft.com/office/powerpoint/2015/main" val="1"/>
+              </p:ext>
+            </p:extLst>
+          </p:nvPr>
+        </p:nvPicPr>
+        <p:blipFill>
+          <a:blip r:embed="rId2">
+            <a:alphaModFix amt="10000"/>
+            <a:extLst>
+              <a:ext uri="{28A0092B-C50C-407E-A947-70E740481C1C}">
+                <a14:useLocalDpi xmlns:a14="http://schemas.microsoft.com/office/drawing/2010/main" val="0"/>
+              </a:ext>
+            </a:extLst>
+          </a:blip>
+          <a:stretch>
+            <a:fillRect/>
+          </a:stretch>
+        </p:blipFill>
+        <p:spPr>
+          <a:xfrm>
+            <a:off x="0" y="0"/>
+            <a:ext cx="12192000" cy="6858000"/>
+          </a:xfrm>
+          <a:prstGeom prst="rect">
+            <a:avLst/>
+          </a:prstGeom>
+        </p:spPr>
+      </p:pic>
+      <p:pic>
+        <p:nvPicPr>
+          <p:cNvPr id="9" name="Picture 8">
+            <a:extLst>
+              <a:ext uri="{FF2B5EF4-FFF2-40B4-BE49-F238E27FC236}">
+                <a16:creationId xmlns:a16="http://schemas.microsoft.com/office/drawing/2014/main" id="{17B2B42C-0777-4D6E-9432-535281803A88}"/>
+              </a:ext>
+              <a:ext uri="{C183D7F6-B498-43B3-948B-1728B52AA6E4}">
+                <adec:decorative xmlns:adec="http://schemas.microsoft.com/office/drawing/2017/decorative" val="1"/>
+              </a:ext>
+            </a:extLst>
+          </p:cNvPr>
+          <p:cNvPicPr>
+            <a:picLocks noGrp="1" noRot="1" noChangeAspect="1" noMove="1" noResize="1" noEditPoints="1" noAdjustHandles="1" noChangeArrowheads="1" noChangeShapeType="1" noCrop="1"/>
+          </p:cNvPicPr>
+          <p:nvPr>
+            <p:extLst>
+              <p:ext uri="{386F3935-93C4-4BCD-93E2-E3B085C9AB24}">
+                <p16:designElem xmlns:p16="http://schemas.microsoft.com/office/powerpoint/2015/main" val="1"/>
+              </p:ext>
+            </p:extLst>
+          </p:nvPr>
+        </p:nvPicPr>
+        <p:blipFill>
+          <a:blip r:embed="rId3">
+            <a:extLst>
+              <a:ext uri="{28A0092B-C50C-407E-A947-70E740481C1C}">
+                <a14:useLocalDpi xmlns:a14="http://schemas.microsoft.com/office/drawing/2010/main" val="0"/>
+              </a:ext>
+            </a:extLst>
+          </a:blip>
+          <a:stretch>
+            <a:fillRect/>
+          </a:stretch>
+        </p:blipFill>
+        <p:spPr>
+          <a:xfrm>
+            <a:off x="1" y="4242851"/>
+            <a:ext cx="8968084" cy="275942"/>
+          </a:xfrm>
+          <a:prstGeom prst="rect">
+            <a:avLst/>
+          </a:prstGeom>
+        </p:spPr>
+      </p:pic>
+      <p:pic>
+        <p:nvPicPr>
+          <p:cNvPr id="11" name="Picture 10">
+            <a:extLst>
+              <a:ext uri="{FF2B5EF4-FFF2-40B4-BE49-F238E27FC236}">
+                <a16:creationId xmlns:a16="http://schemas.microsoft.com/office/drawing/2014/main" id="{EFEAAB60-93E2-4DC6-99AC-939637BCE864}"/>
+              </a:ext>
+              <a:ext uri="{C183D7F6-B498-43B3-948B-1728B52AA6E4}">
+                <adec:decorative xmlns:adec="http://schemas.microsoft.com/office/drawing/2017/decorative" val="1"/>
+              </a:ext>
+            </a:extLst>
+          </p:cNvPr>
+          <p:cNvPicPr>
+            <a:picLocks noGrp="1" noRot="1" noChangeAspect="1" noMove="1" noResize="1" noEditPoints="1" noAdjustHandles="1" noChangeArrowheads="1" noChangeShapeType="1" noCrop="1"/>
+          </p:cNvPicPr>
+          <p:nvPr>
+            <p:extLst>
+              <p:ext uri="{386F3935-93C4-4BCD-93E2-E3B085C9AB24}">
+                <p16:designElem xmlns:p16="http://schemas.microsoft.com/office/powerpoint/2015/main" val="1"/>
+              </p:ext>
+            </p:extLst>
+          </p:nvPr>
+        </p:nvPicPr>
+        <p:blipFill>
+          <a:blip r:embed="rId4">
+            <a:extLst>
+              <a:ext uri="{28A0092B-C50C-407E-A947-70E740481C1C}">
+                <a14:useLocalDpi xmlns:a14="http://schemas.microsoft.com/office/drawing/2010/main" val="0"/>
+              </a:ext>
+            </a:extLst>
+          </a:blip>
+          <a:stretch>
+            <a:fillRect/>
+          </a:stretch>
+        </p:blipFill>
+        <p:spPr>
+          <a:xfrm>
+            <a:off x="9111716" y="4243845"/>
+            <a:ext cx="3077108" cy="276940"/>
+          </a:xfrm>
+          <a:prstGeom prst="rect">
+            <a:avLst/>
+          </a:prstGeom>
+        </p:spPr>
+      </p:pic>
+      <p:sp>
+        <p:nvSpPr>
+          <p:cNvPr id="13" name="Rectangle 12">
+            <a:extLst>
+              <a:ext uri="{FF2B5EF4-FFF2-40B4-BE49-F238E27FC236}">
+                <a16:creationId xmlns:a16="http://schemas.microsoft.com/office/drawing/2014/main" id="{7EF5ECB8-D49C-48FB-A93E-88EB2FFDFD42}"/>
+              </a:ext>
+              <a:ext uri="{C183D7F6-B498-43B3-948B-1728B52AA6E4}">
+                <adec:decorative xmlns:adec="http://schemas.microsoft.com/office/drawing/2017/decorative" val="1"/>
+              </a:ext>
+            </a:extLst>
+          </p:cNvPr>
+          <p:cNvSpPr>
+            <a:spLocks noGrp="1" noRot="1" noChangeAspect="1" noMove="1" noResize="1" noEditPoints="1" noAdjustHandles="1" noChangeArrowheads="1" noChangeShapeType="1" noTextEdit="1"/>
+          </p:cNvSpPr>
+          <p:nvPr>
+            <p:extLst>
+              <p:ext uri="{386F3935-93C4-4BCD-93E2-E3B085C9AB24}">
+                <p16:designElem xmlns:p16="http://schemas.microsoft.com/office/powerpoint/2015/main" val="1"/>
+              </p:ext>
+            </p:extLst>
+          </p:nvPr>
+        </p:nvSpPr>
+        <p:spPr bwMode="ltGray">
+          <a:xfrm>
+            <a:off x="0" y="2590078"/>
+            <a:ext cx="8968085" cy="1660332"/>
+          </a:xfrm>
+          <a:prstGeom prst="rect">
+            <a:avLst/>
+          </a:prstGeom>
+          <a:solidFill>
+            <a:schemeClr val="bg1">
+              <a:lumMod val="85000"/>
+              <a:lumOff val="15000"/>
+            </a:schemeClr>
+          </a:solidFill>
+          <a:ln>
+            <a:noFill/>
+          </a:ln>
+        </p:spPr>
+        <p:style>
+          <a:lnRef idx="2">
+            <a:schemeClr val="accent1">
+              <a:shade val="50000"/>
+            </a:schemeClr>
+          </a:lnRef>
+          <a:fillRef idx="1">
+            <a:schemeClr val="accent1"/>
+          </a:fillRef>
+          <a:effectRef idx="0">
+            <a:schemeClr val="accent1"/>
+          </a:effectRef>
+          <a:fontRef idx="minor">
+            <a:schemeClr val="lt1"/>
+          </a:fontRef>
+        </p:style>
+      </p:sp>
+      <p:sp>
+        <p:nvSpPr>
+          <p:cNvPr id="15" name="Rectangle 14">
+            <a:extLst>
+              <a:ext uri="{FF2B5EF4-FFF2-40B4-BE49-F238E27FC236}">
+                <a16:creationId xmlns:a16="http://schemas.microsoft.com/office/drawing/2014/main" id="{411B77A2-BD5C-432D-B52E-C12612C74C17}"/>
+              </a:ext>
+              <a:ext uri="{C183D7F6-B498-43B3-948B-1728B52AA6E4}">
+                <adec:decorative xmlns:adec="http://schemas.microsoft.com/office/drawing/2017/decorative" val="1"/>
+              </a:ext>
+            </a:extLst>
+          </p:cNvPr>
+          <p:cNvSpPr>
+            <a:spLocks noGrp="1" noRot="1" noChangeAspect="1" noMove="1" noResize="1" noEditPoints="1" noAdjustHandles="1" noChangeArrowheads="1" noChangeShapeType="1" noTextEdit="1"/>
+          </p:cNvSpPr>
+          <p:nvPr>
+            <p:extLst>
+              <p:ext uri="{386F3935-93C4-4BCD-93E2-E3B085C9AB24}">
+                <p16:designElem xmlns:p16="http://schemas.microsoft.com/office/powerpoint/2015/main" val="1"/>
+              </p:ext>
+            </p:extLst>
+          </p:nvPr>
+        </p:nvSpPr>
+        <p:spPr>
+          <a:xfrm>
+            <a:off x="9111715" y="2590078"/>
+            <a:ext cx="3077109" cy="1660332"/>
+          </a:xfrm>
+          <a:prstGeom prst="rect">
+            <a:avLst/>
+          </a:prstGeom>
+          <a:solidFill>
+            <a:schemeClr val="accent1"/>
+          </a:solidFill>
+          <a:ln>
+            <a:noFill/>
+          </a:ln>
+        </p:spPr>
+        <p:style>
+          <a:lnRef idx="2">
+            <a:schemeClr val="accent1">
+              <a:shade val="50000"/>
+            </a:schemeClr>
+          </a:lnRef>
+          <a:fillRef idx="1">
+            <a:schemeClr val="accent1"/>
+          </a:fillRef>
+          <a:effectRef idx="0">
+            <a:schemeClr val="accent1"/>
+          </a:effectRef>
+          <a:fontRef idx="minor">
+            <a:schemeClr val="lt1"/>
+          </a:fontRef>
+        </p:style>
+      </p:sp>
+      <p:sp useBgFill="1">
+        <p:nvSpPr>
+          <p:cNvPr id="17" name="Rectangle 16">
+            <a:extLst>
+              <a:ext uri="{FF2B5EF4-FFF2-40B4-BE49-F238E27FC236}">
+                <a16:creationId xmlns:a16="http://schemas.microsoft.com/office/drawing/2014/main" id="{87C031CB-DEB3-405F-9996-5322C24A6A93}"/>
+              </a:ext>
+              <a:ext uri="{C183D7F6-B498-43B3-948B-1728B52AA6E4}">
+                <adec:decorative xmlns:adec="http://schemas.microsoft.com/office/drawing/2017/decorative" val="1"/>
+              </a:ext>
+            </a:extLst>
+          </p:cNvPr>
+          <p:cNvSpPr>
+            <a:spLocks noGrp="1" noRot="1" noChangeAspect="1" noMove="1" noResize="1" noEditPoints="1" noAdjustHandles="1" noChangeArrowheads="1" noChangeShapeType="1" noTextEdit="1"/>
+          </p:cNvSpPr>
+          <p:nvPr>
+            <p:extLst>
+              <p:ext uri="{386F3935-93C4-4BCD-93E2-E3B085C9AB24}">
+                <p16:designElem xmlns:p16="http://schemas.microsoft.com/office/powerpoint/2015/main" val="1"/>
+              </p:ext>
+            </p:extLst>
+          </p:nvPr>
+        </p:nvSpPr>
+        <p:spPr>
+          <a:xfrm>
+            <a:off x="0" y="0"/>
+            <a:ext cx="12192000" cy="6858000"/>
+          </a:xfrm>
+          <a:prstGeom prst="rect">
+            <a:avLst/>
+          </a:prstGeom>
+          <a:ln>
+            <a:noFill/>
+          </a:ln>
+        </p:spPr>
+        <p:style>
+          <a:lnRef idx="2">
+            <a:schemeClr val="accent1">
+              <a:shade val="50000"/>
+            </a:schemeClr>
+          </a:lnRef>
+          <a:fillRef idx="1">
+            <a:schemeClr val="accent1"/>
+          </a:fillRef>
+          <a:effectRef idx="0">
+            <a:schemeClr val="accent1"/>
+          </a:effectRef>
+          <a:fontRef idx="minor">
+            <a:schemeClr val="lt1"/>
+          </a:fontRef>
+        </p:style>
+        <p:txBody>
+          <a:bodyPr rtlCol="0" anchor="ctr"/>
+          <a:lstStyle/>
+          <a:p>
+            <a:pPr algn="ctr"/>
+            <a:endParaRPr lang="en-US"/>
+          </a:p>
+        </p:txBody>
+      </p:sp>
+      <p:pic>
+        <p:nvPicPr>
+          <p:cNvPr id="19" name="Picture 18">
+            <a:extLst>
+              <a:ext uri="{FF2B5EF4-FFF2-40B4-BE49-F238E27FC236}">
+                <a16:creationId xmlns:a16="http://schemas.microsoft.com/office/drawing/2014/main" id="{92031F0E-C3FA-4DAF-BD13-4AC665CFF0FC}"/>
+              </a:ext>
+              <a:ext uri="{C183D7F6-B498-43B3-948B-1728B52AA6E4}">
+                <adec:decorative xmlns:adec="http://schemas.microsoft.com/office/drawing/2017/decorative" val="1"/>
+              </a:ext>
+            </a:extLst>
+          </p:cNvPr>
+          <p:cNvPicPr>
+            <a:picLocks noGrp="1" noRot="1" noChangeAspect="1" noMove="1" noResize="1" noEditPoints="1" noAdjustHandles="1" noChangeArrowheads="1" noChangeShapeType="1" noCrop="1"/>
+          </p:cNvPicPr>
+          <p:nvPr>
+            <p:extLst>
+              <p:ext uri="{386F3935-93C4-4BCD-93E2-E3B085C9AB24}">
+                <p16:designElem xmlns:p16="http://schemas.microsoft.com/office/powerpoint/2015/main" val="1"/>
+              </p:ext>
+            </p:extLst>
+          </p:nvPr>
+        </p:nvPicPr>
+        <p:blipFill>
+          <a:blip r:embed="rId2">
+            <a:alphaModFix amt="10000"/>
+            <a:extLst>
+              <a:ext uri="{28A0092B-C50C-407E-A947-70E740481C1C}">
+                <a14:useLocalDpi xmlns:a14="http://schemas.microsoft.com/office/drawing/2010/main" val="0"/>
+              </a:ext>
+            </a:extLst>
+          </a:blip>
+          <a:stretch>
+            <a:fillRect/>
+          </a:stretch>
+        </p:blipFill>
+        <p:spPr>
+          <a:xfrm>
+            <a:off x="0" y="0"/>
+            <a:ext cx="12192000" cy="6858000"/>
+          </a:xfrm>
+          <a:prstGeom prst="rect">
+            <a:avLst/>
+          </a:prstGeom>
+        </p:spPr>
+      </p:pic>
+      <p:pic>
+        <p:nvPicPr>
+          <p:cNvPr id="21" name="Picture 20">
+            <a:extLst>
+              <a:ext uri="{FF2B5EF4-FFF2-40B4-BE49-F238E27FC236}">
+                <a16:creationId xmlns:a16="http://schemas.microsoft.com/office/drawing/2014/main" id="{BE685C68-BF28-4330-A4FE-33ABD88511AA}"/>
+              </a:ext>
+              <a:ext uri="{C183D7F6-B498-43B3-948B-1728B52AA6E4}">
+                <adec:decorative xmlns:adec="http://schemas.microsoft.com/office/drawing/2017/decorative" val="1"/>
+              </a:ext>
+            </a:extLst>
+          </p:cNvPr>
+          <p:cNvPicPr>
+            <a:picLocks noGrp="1" noRot="1" noChangeAspect="1" noMove="1" noResize="1" noEditPoints="1" noAdjustHandles="1" noChangeArrowheads="1" noChangeShapeType="1" noCrop="1"/>
+          </p:cNvPicPr>
+          <p:nvPr>
+            <p:extLst>
+              <p:ext uri="{386F3935-93C4-4BCD-93E2-E3B085C9AB24}">
+                <p16:designElem xmlns:p16="http://schemas.microsoft.com/office/powerpoint/2015/main" val="1"/>
+              </p:ext>
+            </p:extLst>
+          </p:nvPr>
+        </p:nvPicPr>
+        <p:blipFill>
+          <a:blip r:embed="rId3">
+            <a:extLst>
+              <a:ext uri="{28A0092B-C50C-407E-A947-70E740481C1C}">
+                <a14:useLocalDpi xmlns:a14="http://schemas.microsoft.com/office/drawing/2010/main" val="0"/>
+              </a:ext>
+            </a:extLst>
+          </a:blip>
+          <a:stretch>
+            <a:fillRect/>
+          </a:stretch>
+        </p:blipFill>
+        <p:spPr>
+          <a:xfrm>
+            <a:off x="0" y="5349629"/>
+            <a:ext cx="11525954" cy="275942"/>
+          </a:xfrm>
+          <a:prstGeom prst="rect">
+            <a:avLst/>
+          </a:prstGeom>
+        </p:spPr>
+      </p:pic>
+      <p:sp>
+        <p:nvSpPr>
+          <p:cNvPr id="23" name="Rectangle 22">
+            <a:extLst>
+              <a:ext uri="{FF2B5EF4-FFF2-40B4-BE49-F238E27FC236}">
+                <a16:creationId xmlns:a16="http://schemas.microsoft.com/office/drawing/2014/main" id="{273350E1-40B5-47D9-8DDD-3C2A17B4B6D9}"/>
+              </a:ext>
+              <a:ext uri="{C183D7F6-B498-43B3-948B-1728B52AA6E4}">
+                <adec:decorative xmlns:adec="http://schemas.microsoft.com/office/drawing/2017/decorative" val="1"/>
+              </a:ext>
+            </a:extLst>
+          </p:cNvPr>
+          <p:cNvSpPr>
+            <a:spLocks noGrp="1" noRot="1" noChangeAspect="1" noMove="1" noResize="1" noEditPoints="1" noAdjustHandles="1" noChangeArrowheads="1" noChangeShapeType="1" noTextEdit="1"/>
+          </p:cNvSpPr>
+          <p:nvPr>
+            <p:extLst>
+              <p:ext uri="{386F3935-93C4-4BCD-93E2-E3B085C9AB24}">
+                <p16:designElem xmlns:p16="http://schemas.microsoft.com/office/powerpoint/2015/main" val="1"/>
+              </p:ext>
+            </p:extLst>
+          </p:nvPr>
+        </p:nvSpPr>
+        <p:spPr bwMode="ltGray">
+          <a:xfrm>
+            <a:off x="1" y="0"/>
+            <a:ext cx="11525954" cy="5379499"/>
+          </a:xfrm>
+          <a:prstGeom prst="rect">
+            <a:avLst/>
+          </a:prstGeom>
+          <a:solidFill>
+            <a:srgbClr val="262626"/>
+          </a:solidFill>
+          <a:ln>
+            <a:noFill/>
+          </a:ln>
+        </p:spPr>
+        <p:style>
+          <a:lnRef idx="2">
+            <a:schemeClr val="accent1">
+              <a:shade val="50000"/>
+            </a:schemeClr>
+          </a:lnRef>
+          <a:fillRef idx="1">
+            <a:schemeClr val="accent1"/>
+          </a:fillRef>
+          <a:effectRef idx="0">
+            <a:schemeClr val="accent1"/>
+          </a:effectRef>
+          <a:fontRef idx="minor">
+            <a:schemeClr val="lt1"/>
+          </a:fontRef>
+        </p:style>
+        <p:txBody>
+          <a:bodyPr/>
+          <a:lstStyle/>
+          <a:p>
+            <a:endParaRPr lang="en-US"/>
+          </a:p>
+        </p:txBody>
+      </p:sp>
       <p:sp>
         <p:nvSpPr>
           <p:cNvPr id="2" name="Título 1">
@@ -23416,17 +23958,128 @@
             <p:ph type="title"/>
           </p:nvPr>
         </p:nvSpPr>
-        <p:spPr/>
+        <p:spPr>
+          <a:xfrm>
+            <a:off x="4063113" y="1997765"/>
+            <a:ext cx="5872891" cy="2696635"/>
+          </a:xfrm>
+        </p:spPr>
         <p:txBody>
-          <a:bodyPr/>
+          <a:bodyPr vert="horz" lIns="91440" tIns="45720" rIns="91440" bIns="45720" rtlCol="0" anchor="b">
+            <a:normAutofit/>
+          </a:bodyPr>
           <a:lstStyle/>
           <a:p>
             <a:r>
-              <a:rPr lang="es-AR" dirty="0"/>
-              <a:t>¿10?</a:t>
+              <a:rPr lang="en-US" sz="6000" dirty="0">
+                <a:solidFill>
+                  <a:srgbClr val="FFFFFF"/>
+                </a:solidFill>
+              </a:rPr>
+              <a:t>GRACIAS POR SU ATENCIÓN</a:t>
             </a:r>
           </a:p>
         </p:txBody>
+      </p:sp>
+      <p:pic>
+        <p:nvPicPr>
+          <p:cNvPr id="25" name="Picture 24">
+            <a:extLst>
+              <a:ext uri="{FF2B5EF4-FFF2-40B4-BE49-F238E27FC236}">
+                <a16:creationId xmlns:a16="http://schemas.microsoft.com/office/drawing/2014/main" id="{A1500D0A-0DCA-4E06-8B25-618E6299CC9A}"/>
+              </a:ext>
+              <a:ext uri="{C183D7F6-B498-43B3-948B-1728B52AA6E4}">
+                <adec:decorative xmlns:adec="http://schemas.microsoft.com/office/drawing/2017/decorative" val="1"/>
+              </a:ext>
+            </a:extLst>
+          </p:cNvPr>
+          <p:cNvPicPr>
+            <a:picLocks noGrp="1" noRot="1" noChangeAspect="1" noMove="1" noResize="1" noEditPoints="1" noAdjustHandles="1" noChangeArrowheads="1" noChangeShapeType="1" noCrop="1"/>
+          </p:cNvPicPr>
+          <p:nvPr>
+            <p:extLst>
+              <p:ext uri="{386F3935-93C4-4BCD-93E2-E3B085C9AB24}">
+                <p16:designElem xmlns:p16="http://schemas.microsoft.com/office/powerpoint/2015/main" val="1"/>
+              </p:ext>
+            </p:extLst>
+          </p:nvPr>
+        </p:nvPicPr>
+        <p:blipFill>
+          <a:blip r:embed="rId4" cstate="print">
+            <a:extLst>
+              <a:ext uri="{28A0092B-C50C-407E-A947-70E740481C1C}">
+                <a14:useLocalDpi xmlns:a14="http://schemas.microsoft.com/office/drawing/2010/main" val="0"/>
+              </a:ext>
+            </a:extLst>
+          </a:blip>
+          <a:stretch>
+            <a:fillRect/>
+          </a:stretch>
+        </p:blipFill>
+        <p:spPr>
+          <a:xfrm>
+            <a:off x="10585826" y="4686838"/>
+            <a:ext cx="1602997" cy="144270"/>
+          </a:xfrm>
+          <a:prstGeom prst="rect">
+            <a:avLst/>
+          </a:prstGeom>
+        </p:spPr>
+      </p:pic>
+      <p:sp>
+        <p:nvSpPr>
+          <p:cNvPr id="27" name="Rectangle 26">
+            <a:extLst>
+              <a:ext uri="{FF2B5EF4-FFF2-40B4-BE49-F238E27FC236}">
+                <a16:creationId xmlns:a16="http://schemas.microsoft.com/office/drawing/2014/main" id="{108AC4DC-69B5-4DD1-84BC-850C5A286185}"/>
+              </a:ext>
+              <a:ext uri="{C183D7F6-B498-43B3-948B-1728B52AA6E4}">
+                <adec:decorative xmlns:adec="http://schemas.microsoft.com/office/drawing/2017/decorative" val="1"/>
+              </a:ext>
+            </a:extLst>
+          </p:cNvPr>
+          <p:cNvSpPr>
+            <a:spLocks noGrp="1" noRot="1" noChangeAspect="1" noMove="1" noResize="1" noEditPoints="1" noAdjustHandles="1" noChangeArrowheads="1" noChangeShapeType="1" noTextEdit="1"/>
+          </p:cNvSpPr>
+          <p:nvPr>
+            <p:extLst>
+              <p:ext uri="{386F3935-93C4-4BCD-93E2-E3B085C9AB24}">
+                <p16:designElem xmlns:p16="http://schemas.microsoft.com/office/powerpoint/2015/main" val="1"/>
+              </p:ext>
+            </p:extLst>
+          </p:nvPr>
+        </p:nvSpPr>
+        <p:spPr>
+          <a:xfrm>
+            <a:off x="10585827" y="3034068"/>
+            <a:ext cx="1602997" cy="1660332"/>
+          </a:xfrm>
+          <a:prstGeom prst="rect">
+            <a:avLst/>
+          </a:prstGeom>
+          <a:solidFill>
+            <a:schemeClr val="accent1"/>
+          </a:solidFill>
+          <a:ln>
+            <a:noFill/>
+          </a:ln>
+        </p:spPr>
+        <p:style>
+          <a:lnRef idx="2">
+            <a:schemeClr val="accent1">
+              <a:shade val="50000"/>
+            </a:schemeClr>
+          </a:lnRef>
+          <a:fillRef idx="1">
+            <a:schemeClr val="accent1"/>
+          </a:fillRef>
+          <a:effectRef idx="0">
+            <a:schemeClr val="accent1"/>
+          </a:effectRef>
+          <a:fontRef idx="minor">
+            <a:schemeClr val="lt1"/>
+          </a:fontRef>
+        </p:style>
       </p:sp>
     </p:spTree>
     <p:extLst>
@@ -23471,7 +24124,7 @@
           <p:nvPr>
             <p:extLst>
               <p:ext uri="{D42A27DB-BD31-4B8C-83A1-F6EECF244321}">
-                <p14:modId xmlns:p14="http://schemas.microsoft.com/office/powerpoint/2010/main" val="2629440265"/>
+                <p14:modId xmlns:p14="http://schemas.microsoft.com/office/powerpoint/2010/main" val="1412148335"/>
               </p:ext>
             </p:extLst>
           </p:nvPr>
@@ -23544,6 +24197,929 @@
           </a:p>
         </p:txBody>
       </p:sp>
+      <p:sp>
+        <p:nvSpPr>
+          <p:cNvPr id="3" name="Elipse 2">
+            <a:extLst>
+              <a:ext uri="{FF2B5EF4-FFF2-40B4-BE49-F238E27FC236}">
+                <a16:creationId xmlns:a16="http://schemas.microsoft.com/office/drawing/2014/main" id="{052E7970-F2DA-4D46-AC57-44B841CD74D2}"/>
+              </a:ext>
+            </a:extLst>
+          </p:cNvPr>
+          <p:cNvSpPr/>
+          <p:nvPr/>
+        </p:nvSpPr>
+        <p:spPr>
+          <a:xfrm>
+            <a:off x="470452" y="3383876"/>
+            <a:ext cx="1510748" cy="1285461"/>
+          </a:xfrm>
+          <a:prstGeom prst="ellipse">
+            <a:avLst/>
+          </a:prstGeom>
+        </p:spPr>
+        <p:style>
+          <a:lnRef idx="2">
+            <a:schemeClr val="accent1">
+              <a:shade val="50000"/>
+            </a:schemeClr>
+          </a:lnRef>
+          <a:fillRef idx="1">
+            <a:schemeClr val="accent1"/>
+          </a:fillRef>
+          <a:effectRef idx="0">
+            <a:schemeClr val="accent1"/>
+          </a:effectRef>
+          <a:fontRef idx="minor">
+            <a:schemeClr val="lt1"/>
+          </a:fontRef>
+        </p:style>
+        <p:txBody>
+          <a:bodyPr rtlCol="0" anchor="ctr"/>
+          <a:lstStyle/>
+          <a:p>
+            <a:pPr algn="ctr"/>
+            <a:r>
+              <a:rPr lang="es-AR" dirty="0"/>
+              <a:t>MENU</a:t>
+            </a:r>
+          </a:p>
+        </p:txBody>
+      </p:sp>
+      <p:sp>
+        <p:nvSpPr>
+          <p:cNvPr id="4" name="Elipse 3">
+            <a:extLst>
+              <a:ext uri="{FF2B5EF4-FFF2-40B4-BE49-F238E27FC236}">
+                <a16:creationId xmlns:a16="http://schemas.microsoft.com/office/drawing/2014/main" id="{CA4A7CF1-D96A-4BBD-89FF-70117E82D51D}"/>
+              </a:ext>
+            </a:extLst>
+          </p:cNvPr>
+          <p:cNvSpPr/>
+          <p:nvPr/>
+        </p:nvSpPr>
+        <p:spPr>
+          <a:xfrm>
+            <a:off x="2292611" y="2617299"/>
+            <a:ext cx="1961337" cy="1285461"/>
+          </a:xfrm>
+          <a:prstGeom prst="ellipse">
+            <a:avLst/>
+          </a:prstGeom>
+        </p:spPr>
+        <p:style>
+          <a:lnRef idx="2">
+            <a:schemeClr val="accent1">
+              <a:shade val="50000"/>
+            </a:schemeClr>
+          </a:lnRef>
+          <a:fillRef idx="1">
+            <a:schemeClr val="accent1"/>
+          </a:fillRef>
+          <a:effectRef idx="0">
+            <a:schemeClr val="accent1"/>
+          </a:effectRef>
+          <a:fontRef idx="minor">
+            <a:schemeClr val="lt1"/>
+          </a:fontRef>
+        </p:style>
+        <p:txBody>
+          <a:bodyPr rtlCol="0" anchor="ctr"/>
+          <a:lstStyle/>
+          <a:p>
+            <a:pPr algn="ctr"/>
+            <a:r>
+              <a:rPr lang="es-AR" dirty="0"/>
+              <a:t>RECEIVING ID</a:t>
+            </a:r>
+          </a:p>
+        </p:txBody>
+      </p:sp>
+      <p:sp>
+        <p:nvSpPr>
+          <p:cNvPr id="5" name="Elipse 4">
+            <a:extLst>
+              <a:ext uri="{FF2B5EF4-FFF2-40B4-BE49-F238E27FC236}">
+                <a16:creationId xmlns:a16="http://schemas.microsoft.com/office/drawing/2014/main" id="{39C22ED0-BBEE-43EB-8AEB-C84BA90D5633}"/>
+              </a:ext>
+            </a:extLst>
+          </p:cNvPr>
+          <p:cNvSpPr/>
+          <p:nvPr/>
+        </p:nvSpPr>
+        <p:spPr>
+          <a:xfrm>
+            <a:off x="5258075" y="5367606"/>
+            <a:ext cx="1675849" cy="1285461"/>
+          </a:xfrm>
+          <a:prstGeom prst="ellipse">
+            <a:avLst/>
+          </a:prstGeom>
+        </p:spPr>
+        <p:style>
+          <a:lnRef idx="2">
+            <a:schemeClr val="accent1">
+              <a:shade val="50000"/>
+            </a:schemeClr>
+          </a:lnRef>
+          <a:fillRef idx="1">
+            <a:schemeClr val="accent1"/>
+          </a:fillRef>
+          <a:effectRef idx="0">
+            <a:schemeClr val="accent1"/>
+          </a:effectRef>
+          <a:fontRef idx="minor">
+            <a:schemeClr val="lt1"/>
+          </a:fontRef>
+        </p:style>
+        <p:txBody>
+          <a:bodyPr rtlCol="0" anchor="ctr"/>
+          <a:lstStyle/>
+          <a:p>
+            <a:pPr algn="ctr"/>
+            <a:r>
+              <a:rPr lang="es-AR" dirty="0"/>
+              <a:t>BLOCKED</a:t>
+            </a:r>
+          </a:p>
+        </p:txBody>
+      </p:sp>
+      <p:sp>
+        <p:nvSpPr>
+          <p:cNvPr id="6" name="Elipse 5">
+            <a:extLst>
+              <a:ext uri="{FF2B5EF4-FFF2-40B4-BE49-F238E27FC236}">
+                <a16:creationId xmlns:a16="http://schemas.microsoft.com/office/drawing/2014/main" id="{93B278F0-1F7B-4C72-A738-0A89E4956C12}"/>
+              </a:ext>
+            </a:extLst>
+          </p:cNvPr>
+          <p:cNvSpPr/>
+          <p:nvPr/>
+        </p:nvSpPr>
+        <p:spPr>
+          <a:xfrm>
+            <a:off x="1433720" y="5129056"/>
+            <a:ext cx="1510748" cy="1285461"/>
+          </a:xfrm>
+          <a:prstGeom prst="ellipse">
+            <a:avLst/>
+          </a:prstGeom>
+        </p:spPr>
+        <p:style>
+          <a:lnRef idx="2">
+            <a:schemeClr val="accent1">
+              <a:shade val="50000"/>
+            </a:schemeClr>
+          </a:lnRef>
+          <a:fillRef idx="1">
+            <a:schemeClr val="accent1"/>
+          </a:fillRef>
+          <a:effectRef idx="0">
+            <a:schemeClr val="accent1"/>
+          </a:effectRef>
+          <a:fontRef idx="minor">
+            <a:schemeClr val="lt1"/>
+          </a:fontRef>
+        </p:style>
+        <p:txBody>
+          <a:bodyPr rtlCol="0" anchor="ctr"/>
+          <a:lstStyle/>
+          <a:p>
+            <a:pPr algn="ctr"/>
+            <a:r>
+              <a:rPr lang="es-AR" dirty="0"/>
+              <a:t>GLOW</a:t>
+            </a:r>
+          </a:p>
+        </p:txBody>
+      </p:sp>
+      <p:sp>
+        <p:nvSpPr>
+          <p:cNvPr id="7" name="Elipse 6">
+            <a:extLst>
+              <a:ext uri="{FF2B5EF4-FFF2-40B4-BE49-F238E27FC236}">
+                <a16:creationId xmlns:a16="http://schemas.microsoft.com/office/drawing/2014/main" id="{BE068FCA-C128-4D52-A533-0E9541BAB911}"/>
+              </a:ext>
+            </a:extLst>
+          </p:cNvPr>
+          <p:cNvSpPr/>
+          <p:nvPr/>
+        </p:nvSpPr>
+        <p:spPr>
+          <a:xfrm>
+            <a:off x="3235188" y="4486326"/>
+            <a:ext cx="1785300" cy="1285461"/>
+          </a:xfrm>
+          <a:prstGeom prst="ellipse">
+            <a:avLst/>
+          </a:prstGeom>
+        </p:spPr>
+        <p:style>
+          <a:lnRef idx="2">
+            <a:schemeClr val="accent1">
+              <a:shade val="50000"/>
+            </a:schemeClr>
+          </a:lnRef>
+          <a:fillRef idx="1">
+            <a:schemeClr val="accent1"/>
+          </a:fillRef>
+          <a:effectRef idx="0">
+            <a:schemeClr val="accent1"/>
+          </a:effectRef>
+          <a:fontRef idx="minor">
+            <a:schemeClr val="lt1"/>
+          </a:fontRef>
+        </p:style>
+        <p:txBody>
+          <a:bodyPr rtlCol="0" anchor="ctr"/>
+          <a:lstStyle/>
+          <a:p>
+            <a:pPr algn="ctr"/>
+            <a:r>
+              <a:rPr lang="es-AR" dirty="0"/>
+              <a:t>RECEIVING PIN</a:t>
+            </a:r>
+          </a:p>
+        </p:txBody>
+      </p:sp>
+      <p:sp>
+        <p:nvSpPr>
+          <p:cNvPr id="8" name="Elipse 7">
+            <a:extLst>
+              <a:ext uri="{FF2B5EF4-FFF2-40B4-BE49-F238E27FC236}">
+                <a16:creationId xmlns:a16="http://schemas.microsoft.com/office/drawing/2014/main" id="{6B718CB9-9A09-4859-B015-D0BD944DEBE0}"/>
+              </a:ext>
+            </a:extLst>
+          </p:cNvPr>
+          <p:cNvSpPr/>
+          <p:nvPr/>
+        </p:nvSpPr>
+        <p:spPr>
+          <a:xfrm>
+            <a:off x="9144015" y="2222415"/>
+            <a:ext cx="1510748" cy="1285461"/>
+          </a:xfrm>
+          <a:prstGeom prst="ellipse">
+            <a:avLst/>
+          </a:prstGeom>
+        </p:spPr>
+        <p:style>
+          <a:lnRef idx="2">
+            <a:schemeClr val="accent1">
+              <a:shade val="50000"/>
+            </a:schemeClr>
+          </a:lnRef>
+          <a:fillRef idx="1">
+            <a:schemeClr val="accent1"/>
+          </a:fillRef>
+          <a:effectRef idx="0">
+            <a:schemeClr val="accent1"/>
+          </a:effectRef>
+          <a:fontRef idx="minor">
+            <a:schemeClr val="lt1"/>
+          </a:fontRef>
+        </p:style>
+        <p:txBody>
+          <a:bodyPr rtlCol="0" anchor="ctr"/>
+          <a:lstStyle/>
+          <a:p>
+            <a:pPr algn="ctr"/>
+            <a:r>
+              <a:rPr lang="es-AR" dirty="0"/>
+              <a:t>ADDING USER</a:t>
+            </a:r>
+          </a:p>
+        </p:txBody>
+      </p:sp>
+      <p:sp>
+        <p:nvSpPr>
+          <p:cNvPr id="10" name="Elipse 9">
+            <a:extLst>
+              <a:ext uri="{FF2B5EF4-FFF2-40B4-BE49-F238E27FC236}">
+                <a16:creationId xmlns:a16="http://schemas.microsoft.com/office/drawing/2014/main" id="{CB74364F-0952-4914-93B0-2B34E95E2184}"/>
+              </a:ext>
+            </a:extLst>
+          </p:cNvPr>
+          <p:cNvSpPr/>
+          <p:nvPr/>
+        </p:nvSpPr>
+        <p:spPr>
+          <a:xfrm>
+            <a:off x="6561905" y="4082145"/>
+            <a:ext cx="1917442" cy="1285461"/>
+          </a:xfrm>
+          <a:prstGeom prst="ellipse">
+            <a:avLst/>
+          </a:prstGeom>
+        </p:spPr>
+        <p:style>
+          <a:lnRef idx="2">
+            <a:schemeClr val="accent1">
+              <a:shade val="50000"/>
+            </a:schemeClr>
+          </a:lnRef>
+          <a:fillRef idx="1">
+            <a:schemeClr val="accent1"/>
+          </a:fillRef>
+          <a:effectRef idx="0">
+            <a:schemeClr val="accent1"/>
+          </a:effectRef>
+          <a:fontRef idx="minor">
+            <a:schemeClr val="lt1"/>
+          </a:fontRef>
+        </p:style>
+        <p:txBody>
+          <a:bodyPr rtlCol="0" anchor="ctr"/>
+          <a:lstStyle/>
+          <a:p>
+            <a:pPr algn="ctr"/>
+            <a:r>
+              <a:rPr lang="es-AR" dirty="0"/>
+              <a:t>CHANGING PIN</a:t>
+            </a:r>
+          </a:p>
+        </p:txBody>
+      </p:sp>
+      <p:sp>
+        <p:nvSpPr>
+          <p:cNvPr id="11" name="Elipse 10">
+            <a:extLst>
+              <a:ext uri="{FF2B5EF4-FFF2-40B4-BE49-F238E27FC236}">
+                <a16:creationId xmlns:a16="http://schemas.microsoft.com/office/drawing/2014/main" id="{1D22E770-8A08-4ADB-B05E-5D07F8CE0CE7}"/>
+              </a:ext>
+            </a:extLst>
+          </p:cNvPr>
+          <p:cNvSpPr/>
+          <p:nvPr/>
+        </p:nvSpPr>
+        <p:spPr>
+          <a:xfrm>
+            <a:off x="9402144" y="3717221"/>
+            <a:ext cx="1784075" cy="1285461"/>
+          </a:xfrm>
+          <a:prstGeom prst="ellipse">
+            <a:avLst/>
+          </a:prstGeom>
+        </p:spPr>
+        <p:style>
+          <a:lnRef idx="2">
+            <a:schemeClr val="accent1">
+              <a:shade val="50000"/>
+            </a:schemeClr>
+          </a:lnRef>
+          <a:fillRef idx="1">
+            <a:schemeClr val="accent1"/>
+          </a:fillRef>
+          <a:effectRef idx="0">
+            <a:schemeClr val="accent1"/>
+          </a:effectRef>
+          <a:fontRef idx="minor">
+            <a:schemeClr val="lt1"/>
+          </a:fontRef>
+        </p:style>
+        <p:txBody>
+          <a:bodyPr rtlCol="0" anchor="ctr"/>
+          <a:lstStyle/>
+          <a:p>
+            <a:pPr algn="ctr"/>
+            <a:r>
+              <a:rPr lang="es-AR" dirty="0"/>
+              <a:t>REMOVING USER</a:t>
+            </a:r>
+          </a:p>
+        </p:txBody>
+      </p:sp>
+      <p:sp>
+        <p:nvSpPr>
+          <p:cNvPr id="12" name="Elipse 11">
+            <a:extLst>
+              <a:ext uri="{FF2B5EF4-FFF2-40B4-BE49-F238E27FC236}">
+                <a16:creationId xmlns:a16="http://schemas.microsoft.com/office/drawing/2014/main" id="{55785116-39C8-4B6E-A5C1-F578224FD4B8}"/>
+              </a:ext>
+            </a:extLst>
+          </p:cNvPr>
+          <p:cNvSpPr/>
+          <p:nvPr/>
+        </p:nvSpPr>
+        <p:spPr>
+          <a:xfrm>
+            <a:off x="4777830" y="3034270"/>
+            <a:ext cx="1784075" cy="1285461"/>
+          </a:xfrm>
+          <a:prstGeom prst="ellipse">
+            <a:avLst/>
+          </a:prstGeom>
+        </p:spPr>
+        <p:style>
+          <a:lnRef idx="2">
+            <a:schemeClr val="accent1">
+              <a:shade val="50000"/>
+            </a:schemeClr>
+          </a:lnRef>
+          <a:fillRef idx="1">
+            <a:schemeClr val="accent1"/>
+          </a:fillRef>
+          <a:effectRef idx="0">
+            <a:schemeClr val="accent1"/>
+          </a:effectRef>
+          <a:fontRef idx="minor">
+            <a:schemeClr val="lt1"/>
+          </a:fontRef>
+        </p:style>
+        <p:txBody>
+          <a:bodyPr rtlCol="0" anchor="ctr"/>
+          <a:lstStyle/>
+          <a:p>
+            <a:pPr algn="ctr"/>
+            <a:r>
+              <a:rPr lang="es-AR" dirty="0"/>
+              <a:t>USER APPROVED</a:t>
+            </a:r>
+          </a:p>
+        </p:txBody>
+      </p:sp>
+      <p:sp>
+        <p:nvSpPr>
+          <p:cNvPr id="13" name="Elipse 12">
+            <a:extLst>
+              <a:ext uri="{FF2B5EF4-FFF2-40B4-BE49-F238E27FC236}">
+                <a16:creationId xmlns:a16="http://schemas.microsoft.com/office/drawing/2014/main" id="{BD2342EB-AA50-4326-8594-CE01308572C9}"/>
+              </a:ext>
+            </a:extLst>
+          </p:cNvPr>
+          <p:cNvSpPr/>
+          <p:nvPr/>
+        </p:nvSpPr>
+        <p:spPr>
+          <a:xfrm>
+            <a:off x="6898346" y="2315425"/>
+            <a:ext cx="1510748" cy="1285461"/>
+          </a:xfrm>
+          <a:prstGeom prst="ellipse">
+            <a:avLst/>
+          </a:prstGeom>
+        </p:spPr>
+        <p:style>
+          <a:lnRef idx="2">
+            <a:schemeClr val="accent1">
+              <a:shade val="50000"/>
+            </a:schemeClr>
+          </a:lnRef>
+          <a:fillRef idx="1">
+            <a:schemeClr val="accent1"/>
+          </a:fillRef>
+          <a:effectRef idx="0">
+            <a:schemeClr val="accent1"/>
+          </a:effectRef>
+          <a:fontRef idx="minor">
+            <a:schemeClr val="lt1"/>
+          </a:fontRef>
+        </p:style>
+        <p:txBody>
+          <a:bodyPr rtlCol="0" anchor="ctr"/>
+          <a:lstStyle/>
+          <a:p>
+            <a:pPr algn="ctr"/>
+            <a:r>
+              <a:rPr lang="es-AR" dirty="0"/>
+              <a:t>ADMIN MODE</a:t>
+            </a:r>
+          </a:p>
+        </p:txBody>
+      </p:sp>
+      <p:cxnSp>
+        <p:nvCxnSpPr>
+          <p:cNvPr id="19" name="Conector: curvado 18">
+            <a:extLst>
+              <a:ext uri="{FF2B5EF4-FFF2-40B4-BE49-F238E27FC236}">
+                <a16:creationId xmlns:a16="http://schemas.microsoft.com/office/drawing/2014/main" id="{56ACD009-5B3A-4BEC-BF15-5B1A21ABBCA6}"/>
+              </a:ext>
+            </a:extLst>
+          </p:cNvPr>
+          <p:cNvCxnSpPr/>
+          <p:nvPr/>
+        </p:nvCxnSpPr>
+        <p:spPr>
+          <a:xfrm flipV="1">
+            <a:off x="1433720" y="2909559"/>
+            <a:ext cx="978176" cy="518731"/>
+          </a:xfrm>
+          <a:prstGeom prst="curvedConnector3">
+            <a:avLst>
+              <a:gd name="adj1" fmla="val 21549"/>
+            </a:avLst>
+          </a:prstGeom>
+          <a:ln>
+            <a:solidFill>
+              <a:schemeClr val="bg1"/>
+            </a:solidFill>
+            <a:tailEnd type="triangle"/>
+          </a:ln>
+        </p:spPr>
+        <p:style>
+          <a:lnRef idx="1">
+            <a:schemeClr val="accent1"/>
+          </a:lnRef>
+          <a:fillRef idx="0">
+            <a:schemeClr val="accent1"/>
+          </a:fillRef>
+          <a:effectRef idx="0">
+            <a:schemeClr val="accent1"/>
+          </a:effectRef>
+          <a:fontRef idx="minor">
+            <a:schemeClr val="tx1"/>
+          </a:fontRef>
+        </p:style>
+      </p:cxnSp>
+      <p:cxnSp>
+        <p:nvCxnSpPr>
+          <p:cNvPr id="24" name="Conector: curvado 23">
+            <a:extLst>
+              <a:ext uri="{FF2B5EF4-FFF2-40B4-BE49-F238E27FC236}">
+                <a16:creationId xmlns:a16="http://schemas.microsoft.com/office/drawing/2014/main" id="{DE9D2ACC-74F7-4438-A308-01A6BEADC646}"/>
+              </a:ext>
+            </a:extLst>
+          </p:cNvPr>
+          <p:cNvCxnSpPr/>
+          <p:nvPr/>
+        </p:nvCxnSpPr>
+        <p:spPr>
+          <a:xfrm rot="16200000" flipH="1">
+            <a:off x="3466133" y="4085193"/>
+            <a:ext cx="598317" cy="203947"/>
+          </a:xfrm>
+          <a:prstGeom prst="curvedConnector3">
+            <a:avLst/>
+          </a:prstGeom>
+          <a:ln>
+            <a:solidFill>
+              <a:schemeClr val="bg1"/>
+            </a:solidFill>
+            <a:tailEnd type="triangle"/>
+          </a:ln>
+        </p:spPr>
+        <p:style>
+          <a:lnRef idx="1">
+            <a:schemeClr val="accent1"/>
+          </a:lnRef>
+          <a:fillRef idx="0">
+            <a:schemeClr val="accent1"/>
+          </a:fillRef>
+          <a:effectRef idx="0">
+            <a:schemeClr val="accent1"/>
+          </a:effectRef>
+          <a:fontRef idx="minor">
+            <a:schemeClr val="tx1"/>
+          </a:fontRef>
+        </p:style>
+      </p:cxnSp>
+      <p:cxnSp>
+        <p:nvCxnSpPr>
+          <p:cNvPr id="26" name="Conector: curvado 25">
+            <a:extLst>
+              <a:ext uri="{FF2B5EF4-FFF2-40B4-BE49-F238E27FC236}">
+                <a16:creationId xmlns:a16="http://schemas.microsoft.com/office/drawing/2014/main" id="{D8390069-A0BE-4C22-8EB0-8BFA7F8544AA}"/>
+              </a:ext>
+            </a:extLst>
+          </p:cNvPr>
+          <p:cNvCxnSpPr/>
+          <p:nvPr/>
+        </p:nvCxnSpPr>
+        <p:spPr>
+          <a:xfrm rot="5400000" flipH="1" flipV="1">
+            <a:off x="4762237" y="4409284"/>
+            <a:ext cx="607042" cy="221973"/>
+          </a:xfrm>
+          <a:prstGeom prst="curvedConnector3">
+            <a:avLst/>
+          </a:prstGeom>
+          <a:ln>
+            <a:solidFill>
+              <a:schemeClr val="bg1"/>
+            </a:solidFill>
+            <a:tailEnd type="triangle"/>
+          </a:ln>
+        </p:spPr>
+        <p:style>
+          <a:lnRef idx="1">
+            <a:schemeClr val="accent1"/>
+          </a:lnRef>
+          <a:fillRef idx="0">
+            <a:schemeClr val="accent1"/>
+          </a:fillRef>
+          <a:effectRef idx="0">
+            <a:schemeClr val="accent1"/>
+          </a:effectRef>
+          <a:fontRef idx="minor">
+            <a:schemeClr val="tx1"/>
+          </a:fontRef>
+        </p:style>
+      </p:cxnSp>
+      <p:cxnSp>
+        <p:nvCxnSpPr>
+          <p:cNvPr id="28" name="Conector: curvado 27">
+            <a:extLst>
+              <a:ext uri="{FF2B5EF4-FFF2-40B4-BE49-F238E27FC236}">
+                <a16:creationId xmlns:a16="http://schemas.microsoft.com/office/drawing/2014/main" id="{5E834FFA-B1C2-4D91-8CD0-972DDEC4394D}"/>
+              </a:ext>
+            </a:extLst>
+          </p:cNvPr>
+          <p:cNvCxnSpPr/>
+          <p:nvPr/>
+        </p:nvCxnSpPr>
+        <p:spPr>
+          <a:xfrm flipV="1">
+            <a:off x="6122728" y="2744753"/>
+            <a:ext cx="816316" cy="379636"/>
+          </a:xfrm>
+          <a:prstGeom prst="curvedConnector3">
+            <a:avLst/>
+          </a:prstGeom>
+          <a:ln>
+            <a:solidFill>
+              <a:schemeClr val="bg1"/>
+            </a:solidFill>
+            <a:tailEnd type="triangle"/>
+          </a:ln>
+        </p:spPr>
+        <p:style>
+          <a:lnRef idx="1">
+            <a:schemeClr val="accent1"/>
+          </a:lnRef>
+          <a:fillRef idx="0">
+            <a:schemeClr val="accent1"/>
+          </a:fillRef>
+          <a:effectRef idx="0">
+            <a:schemeClr val="accent1"/>
+          </a:effectRef>
+          <a:fontRef idx="minor">
+            <a:schemeClr val="tx1"/>
+          </a:fontRef>
+        </p:style>
+      </p:cxnSp>
+      <p:cxnSp>
+        <p:nvCxnSpPr>
+          <p:cNvPr id="30" name="Conector: curvado 29">
+            <a:extLst>
+              <a:ext uri="{FF2B5EF4-FFF2-40B4-BE49-F238E27FC236}">
+                <a16:creationId xmlns:a16="http://schemas.microsoft.com/office/drawing/2014/main" id="{44E42827-3E00-439E-BD93-9196ABB910CD}"/>
+              </a:ext>
+            </a:extLst>
+          </p:cNvPr>
+          <p:cNvCxnSpPr/>
+          <p:nvPr/>
+        </p:nvCxnSpPr>
+        <p:spPr>
+          <a:xfrm>
+            <a:off x="6561905" y="3888008"/>
+            <a:ext cx="336441" cy="299158"/>
+          </a:xfrm>
+          <a:prstGeom prst="curvedConnector3">
+            <a:avLst/>
+          </a:prstGeom>
+          <a:ln>
+            <a:solidFill>
+              <a:schemeClr val="bg1"/>
+            </a:solidFill>
+            <a:tailEnd type="triangle"/>
+          </a:ln>
+        </p:spPr>
+        <p:style>
+          <a:lnRef idx="1">
+            <a:schemeClr val="accent1"/>
+          </a:lnRef>
+          <a:fillRef idx="0">
+            <a:schemeClr val="accent1"/>
+          </a:fillRef>
+          <a:effectRef idx="0">
+            <a:schemeClr val="accent1"/>
+          </a:effectRef>
+          <a:fontRef idx="minor">
+            <a:schemeClr val="tx1"/>
+          </a:fontRef>
+        </p:style>
+      </p:cxnSp>
+      <p:cxnSp>
+        <p:nvCxnSpPr>
+          <p:cNvPr id="35" name="Conector: curvado 34">
+            <a:extLst>
+              <a:ext uri="{FF2B5EF4-FFF2-40B4-BE49-F238E27FC236}">
+                <a16:creationId xmlns:a16="http://schemas.microsoft.com/office/drawing/2014/main" id="{45021C92-48D7-4C1B-8C79-927D10BC69B4}"/>
+              </a:ext>
+            </a:extLst>
+          </p:cNvPr>
+          <p:cNvCxnSpPr/>
+          <p:nvPr/>
+        </p:nvCxnSpPr>
+        <p:spPr>
+          <a:xfrm>
+            <a:off x="8357593" y="3260029"/>
+            <a:ext cx="1144216" cy="822116"/>
+          </a:xfrm>
+          <a:prstGeom prst="curvedConnector3">
+            <a:avLst/>
+          </a:prstGeom>
+          <a:ln>
+            <a:solidFill>
+              <a:schemeClr val="bg1"/>
+            </a:solidFill>
+            <a:tailEnd type="triangle"/>
+          </a:ln>
+        </p:spPr>
+        <p:style>
+          <a:lnRef idx="1">
+            <a:schemeClr val="accent1"/>
+          </a:lnRef>
+          <a:fillRef idx="0">
+            <a:schemeClr val="accent1"/>
+          </a:fillRef>
+          <a:effectRef idx="0">
+            <a:schemeClr val="accent1"/>
+          </a:effectRef>
+          <a:fontRef idx="minor">
+            <a:schemeClr val="tx1"/>
+          </a:fontRef>
+        </p:style>
+      </p:cxnSp>
+      <p:cxnSp>
+        <p:nvCxnSpPr>
+          <p:cNvPr id="37" name="Conector: curvado 36">
+            <a:extLst>
+              <a:ext uri="{FF2B5EF4-FFF2-40B4-BE49-F238E27FC236}">
+                <a16:creationId xmlns:a16="http://schemas.microsoft.com/office/drawing/2014/main" id="{B26E4BD7-2D8C-457E-810E-50619225E4E7}"/>
+              </a:ext>
+            </a:extLst>
+          </p:cNvPr>
+          <p:cNvCxnSpPr/>
+          <p:nvPr/>
+        </p:nvCxnSpPr>
+        <p:spPr>
+          <a:xfrm flipV="1">
+            <a:off x="8308554" y="2564927"/>
+            <a:ext cx="889425" cy="127454"/>
+          </a:xfrm>
+          <a:prstGeom prst="curvedConnector3">
+            <a:avLst/>
+          </a:prstGeom>
+          <a:ln>
+            <a:solidFill>
+              <a:schemeClr val="bg1"/>
+            </a:solidFill>
+            <a:tailEnd type="triangle"/>
+          </a:ln>
+        </p:spPr>
+        <p:style>
+          <a:lnRef idx="1">
+            <a:schemeClr val="accent1"/>
+          </a:lnRef>
+          <a:fillRef idx="0">
+            <a:schemeClr val="accent1"/>
+          </a:fillRef>
+          <a:effectRef idx="0">
+            <a:schemeClr val="accent1"/>
+          </a:effectRef>
+          <a:fontRef idx="minor">
+            <a:schemeClr val="tx1"/>
+          </a:fontRef>
+        </p:style>
+      </p:cxnSp>
+      <p:cxnSp>
+        <p:nvCxnSpPr>
+          <p:cNvPr id="39" name="Conector: curvado 38">
+            <a:extLst>
+              <a:ext uri="{FF2B5EF4-FFF2-40B4-BE49-F238E27FC236}">
+                <a16:creationId xmlns:a16="http://schemas.microsoft.com/office/drawing/2014/main" id="{35D67D8B-7C52-4697-9B32-7EFE1A51B581}"/>
+              </a:ext>
+            </a:extLst>
+          </p:cNvPr>
+          <p:cNvCxnSpPr>
+            <a:cxnSpLocks/>
+          </p:cNvCxnSpPr>
+          <p:nvPr/>
+        </p:nvCxnSpPr>
+        <p:spPr>
+          <a:xfrm>
+            <a:off x="5004242" y="5129056"/>
+            <a:ext cx="623579" cy="371115"/>
+          </a:xfrm>
+          <a:prstGeom prst="curvedConnector3">
+            <a:avLst>
+              <a:gd name="adj1" fmla="val 50000"/>
+            </a:avLst>
+          </a:prstGeom>
+          <a:ln>
+            <a:solidFill>
+              <a:schemeClr val="bg1"/>
+            </a:solidFill>
+            <a:tailEnd type="triangle"/>
+          </a:ln>
+        </p:spPr>
+        <p:style>
+          <a:lnRef idx="1">
+            <a:schemeClr val="accent1"/>
+          </a:lnRef>
+          <a:fillRef idx="0">
+            <a:schemeClr val="accent1"/>
+          </a:fillRef>
+          <a:effectRef idx="0">
+            <a:schemeClr val="accent1"/>
+          </a:effectRef>
+          <a:fontRef idx="minor">
+            <a:schemeClr val="tx1"/>
+          </a:fontRef>
+        </p:style>
+      </p:cxnSp>
+      <p:cxnSp>
+        <p:nvCxnSpPr>
+          <p:cNvPr id="42" name="Conector: curvado 41">
+            <a:extLst>
+              <a:ext uri="{FF2B5EF4-FFF2-40B4-BE49-F238E27FC236}">
+                <a16:creationId xmlns:a16="http://schemas.microsoft.com/office/drawing/2014/main" id="{7B867338-BAAF-4ECF-B0CF-095C9ABB5992}"/>
+              </a:ext>
+            </a:extLst>
+          </p:cNvPr>
+          <p:cNvCxnSpPr>
+            <a:endCxn id="7" idx="5"/>
+          </p:cNvCxnSpPr>
+          <p:nvPr/>
+        </p:nvCxnSpPr>
+        <p:spPr>
+          <a:xfrm rot="10800000">
+            <a:off x="4759037" y="5583536"/>
+            <a:ext cx="556994" cy="188250"/>
+          </a:xfrm>
+          <a:prstGeom prst="curvedConnector4">
+            <a:avLst>
+              <a:gd name="adj1" fmla="val 26530"/>
+              <a:gd name="adj2" fmla="val -121435"/>
+            </a:avLst>
+          </a:prstGeom>
+          <a:ln>
+            <a:solidFill>
+              <a:schemeClr val="bg1"/>
+            </a:solidFill>
+            <a:tailEnd type="triangle"/>
+          </a:ln>
+        </p:spPr>
+        <p:style>
+          <a:lnRef idx="1">
+            <a:schemeClr val="accent1"/>
+          </a:lnRef>
+          <a:fillRef idx="0">
+            <a:schemeClr val="accent1"/>
+          </a:fillRef>
+          <a:effectRef idx="0">
+            <a:schemeClr val="accent1"/>
+          </a:effectRef>
+          <a:fontRef idx="minor">
+            <a:schemeClr val="tx1"/>
+          </a:fontRef>
+        </p:style>
+      </p:cxnSp>
+      <p:cxnSp>
+        <p:nvCxnSpPr>
+          <p:cNvPr id="44" name="Conector: curvado 43">
+            <a:extLst>
+              <a:ext uri="{FF2B5EF4-FFF2-40B4-BE49-F238E27FC236}">
+                <a16:creationId xmlns:a16="http://schemas.microsoft.com/office/drawing/2014/main" id="{8EE79135-B4DA-4768-9F9E-A75FB6A3B1FD}"/>
+              </a:ext>
+            </a:extLst>
+          </p:cNvPr>
+          <p:cNvCxnSpPr>
+            <a:endCxn id="6" idx="1"/>
+          </p:cNvCxnSpPr>
+          <p:nvPr/>
+        </p:nvCxnSpPr>
+        <p:spPr>
+          <a:xfrm rot="16200000" flipH="1">
+            <a:off x="1220357" y="4882700"/>
+            <a:ext cx="647970" cy="221244"/>
+          </a:xfrm>
+          <a:prstGeom prst="curvedConnector3">
+            <a:avLst/>
+          </a:prstGeom>
+          <a:ln>
+            <a:solidFill>
+              <a:schemeClr val="bg1"/>
+            </a:solidFill>
+            <a:tailEnd type="triangle"/>
+          </a:ln>
+        </p:spPr>
+        <p:style>
+          <a:lnRef idx="1">
+            <a:schemeClr val="accent1"/>
+          </a:lnRef>
+          <a:fillRef idx="0">
+            <a:schemeClr val="accent1"/>
+          </a:fillRef>
+          <a:effectRef idx="0">
+            <a:schemeClr val="accent1"/>
+          </a:effectRef>
+          <a:fontRef idx="minor">
+            <a:schemeClr val="tx1"/>
+          </a:fontRef>
+        </p:style>
+      </p:cxnSp>
     </p:spTree>
     <p:extLst>
       <p:ext uri="{BB962C8B-B14F-4D97-AF65-F5344CB8AC3E}">
@@ -23602,6 +25178,36 @@
           </a:p>
         </p:txBody>
       </p:sp>
+      <p:pic>
+        <p:nvPicPr>
+          <p:cNvPr id="4" name="Imagen 3" descr="Imagen que contiene captura de pantalla&#10;&#10;Descripción generada automáticamente">
+            <a:extLst>
+              <a:ext uri="{FF2B5EF4-FFF2-40B4-BE49-F238E27FC236}">
+                <a16:creationId xmlns:a16="http://schemas.microsoft.com/office/drawing/2014/main" id="{79783A38-9C69-409E-8DA3-70AD472556D3}"/>
+              </a:ext>
+            </a:extLst>
+          </p:cNvPr>
+          <p:cNvPicPr>
+            <a:picLocks noChangeAspect="1"/>
+          </p:cNvPicPr>
+          <p:nvPr/>
+        </p:nvPicPr>
+        <p:blipFill>
+          <a:blip r:embed="rId2"/>
+          <a:stretch>
+            <a:fillRect/>
+          </a:stretch>
+        </p:blipFill>
+        <p:spPr>
+          <a:xfrm>
+            <a:off x="680321" y="2039895"/>
+            <a:ext cx="10278411" cy="4677428"/>
+          </a:xfrm>
+          <a:prstGeom prst="rect">
+            <a:avLst/>
+          </a:prstGeom>
+        </p:spPr>
+      </p:pic>
     </p:spTree>
     <p:extLst>
       <p:ext uri="{BB962C8B-B14F-4D97-AF65-F5344CB8AC3E}">
@@ -24632,7 +26238,7 @@
           </p:cNvPicPr>
           <p:nvPr/>
         </p:nvPicPr>
-        <p:blipFill>
+        <p:blipFill rotWithShape="1">
           <a:blip r:embed="rId2">
             <a:extLst>
               <a:ext uri="{28A0092B-C50C-407E-A947-70E740481C1C}">
@@ -24640,14 +26246,13 @@
               </a:ext>
             </a:extLst>
           </a:blip>
-          <a:stretch>
-            <a:fillRect/>
-          </a:stretch>
+          <a:srcRect t="4262" r="994" b="7983"/>
+          <a:stretch/>
         </p:blipFill>
         <p:spPr>
           <a:xfrm>
-            <a:off x="6285680" y="2076994"/>
-            <a:ext cx="5728078" cy="4598125"/>
+            <a:off x="6285680" y="2272937"/>
+            <a:ext cx="5671189" cy="4035098"/>
           </a:xfrm>
           <a:prstGeom prst="rect">
             <a:avLst/>
@@ -24725,7 +26330,7 @@
           <p:nvPr>
             <p:extLst>
               <p:ext uri="{D42A27DB-BD31-4B8C-83A1-F6EECF244321}">
-                <p14:modId xmlns:p14="http://schemas.microsoft.com/office/powerpoint/2010/main" val="2756579975"/>
+                <p14:modId xmlns:p14="http://schemas.microsoft.com/office/powerpoint/2010/main" val="2747016530"/>
               </p:ext>
             </p:extLst>
           </p:nvPr>

</xml_diff>